<commit_message>
Final presentation + readme modifications¨
</commit_message>
<xml_diff>
--- a/presentation/presentation.pptx
+++ b/presentation/presentation.pptx
@@ -9,9 +9,13 @@
     <p:sldId id="257" r:id="rId3"/>
     <p:sldId id="258" r:id="rId4"/>
     <p:sldId id="261" r:id="rId5"/>
-    <p:sldId id="262" r:id="rId6"/>
-    <p:sldId id="263" r:id="rId7"/>
-    <p:sldId id="264" r:id="rId8"/>
+    <p:sldId id="265" r:id="rId6"/>
+    <p:sldId id="262" r:id="rId7"/>
+    <p:sldId id="263" r:id="rId8"/>
+    <p:sldId id="266" r:id="rId9"/>
+    <p:sldId id="267" r:id="rId10"/>
+    <p:sldId id="268" r:id="rId11"/>
+    <p:sldId id="269" r:id="rId12"/>
   </p:sldIdLst>
   <p:sldSz cx="12192000" cy="6858000"/>
   <p:notesSz cx="6858000" cy="9144000"/>
@@ -267,7 +271,7 @@
           <a:p>
             <a:fld id="{85321271-6040-2E4F-925C-CA786A662EDA}" type="datetimeFigureOut">
               <a:rPr lang="en-CH" smtClean="0"/>
-              <a:t>19.09.21</a:t>
+              <a:t>04.10.21</a:t>
             </a:fld>
             <a:endParaRPr lang="en-CH"/>
           </a:p>
@@ -467,7 +471,7 @@
           <a:p>
             <a:fld id="{85321271-6040-2E4F-925C-CA786A662EDA}" type="datetimeFigureOut">
               <a:rPr lang="en-CH" smtClean="0"/>
-              <a:t>19.09.21</a:t>
+              <a:t>04.10.21</a:t>
             </a:fld>
             <a:endParaRPr lang="en-CH"/>
           </a:p>
@@ -677,7 +681,7 @@
           <a:p>
             <a:fld id="{85321271-6040-2E4F-925C-CA786A662EDA}" type="datetimeFigureOut">
               <a:rPr lang="en-CH" smtClean="0"/>
-              <a:t>19.09.21</a:t>
+              <a:t>04.10.21</a:t>
             </a:fld>
             <a:endParaRPr lang="en-CH"/>
           </a:p>
@@ -877,7 +881,7 @@
           <a:p>
             <a:fld id="{85321271-6040-2E4F-925C-CA786A662EDA}" type="datetimeFigureOut">
               <a:rPr lang="en-CH" smtClean="0"/>
-              <a:t>19.09.21</a:t>
+              <a:t>04.10.21</a:t>
             </a:fld>
             <a:endParaRPr lang="en-CH"/>
           </a:p>
@@ -1153,7 +1157,7 @@
           <a:p>
             <a:fld id="{85321271-6040-2E4F-925C-CA786A662EDA}" type="datetimeFigureOut">
               <a:rPr lang="en-CH" smtClean="0"/>
-              <a:t>19.09.21</a:t>
+              <a:t>04.10.21</a:t>
             </a:fld>
             <a:endParaRPr lang="en-CH"/>
           </a:p>
@@ -1421,7 +1425,7 @@
           <a:p>
             <a:fld id="{85321271-6040-2E4F-925C-CA786A662EDA}" type="datetimeFigureOut">
               <a:rPr lang="en-CH" smtClean="0"/>
-              <a:t>19.09.21</a:t>
+              <a:t>04.10.21</a:t>
             </a:fld>
             <a:endParaRPr lang="en-CH"/>
           </a:p>
@@ -1836,7 +1840,7 @@
           <a:p>
             <a:fld id="{85321271-6040-2E4F-925C-CA786A662EDA}" type="datetimeFigureOut">
               <a:rPr lang="en-CH" smtClean="0"/>
-              <a:t>19.09.21</a:t>
+              <a:t>04.10.21</a:t>
             </a:fld>
             <a:endParaRPr lang="en-CH"/>
           </a:p>
@@ -1978,7 +1982,7 @@
           <a:p>
             <a:fld id="{85321271-6040-2E4F-925C-CA786A662EDA}" type="datetimeFigureOut">
               <a:rPr lang="en-CH" smtClean="0"/>
-              <a:t>19.09.21</a:t>
+              <a:t>04.10.21</a:t>
             </a:fld>
             <a:endParaRPr lang="en-CH"/>
           </a:p>
@@ -2091,7 +2095,7 @@
           <a:p>
             <a:fld id="{85321271-6040-2E4F-925C-CA786A662EDA}" type="datetimeFigureOut">
               <a:rPr lang="en-CH" smtClean="0"/>
-              <a:t>19.09.21</a:t>
+              <a:t>04.10.21</a:t>
             </a:fld>
             <a:endParaRPr lang="en-CH"/>
           </a:p>
@@ -2404,7 +2408,7 @@
           <a:p>
             <a:fld id="{85321271-6040-2E4F-925C-CA786A662EDA}" type="datetimeFigureOut">
               <a:rPr lang="en-CH" smtClean="0"/>
-              <a:t>19.09.21</a:t>
+              <a:t>04.10.21</a:t>
             </a:fld>
             <a:endParaRPr lang="en-CH"/>
           </a:p>
@@ -2693,7 +2697,7 @@
           <a:p>
             <a:fld id="{85321271-6040-2E4F-925C-CA786A662EDA}" type="datetimeFigureOut">
               <a:rPr lang="en-CH" smtClean="0"/>
-              <a:t>19.09.21</a:t>
+              <a:t>04.10.21</a:t>
             </a:fld>
             <a:endParaRPr lang="en-CH"/>
           </a:p>
@@ -2936,7 +2940,7 @@
           <a:p>
             <a:fld id="{85321271-6040-2E4F-925C-CA786A662EDA}" type="datetimeFigureOut">
               <a:rPr lang="en-CH" smtClean="0"/>
-              <a:t>19.09.21</a:t>
+              <a:t>04.10.21</a:t>
             </a:fld>
             <a:endParaRPr lang="en-CH"/>
           </a:p>
@@ -3455,7 +3459,7 @@
 </p:sld>
 </file>
 
-<file path=ppt/slides/slide2.xml><?xml version="1.0" encoding="utf-8"?>
+<file path=ppt/slides/slide10.xml><?xml version="1.0" encoding="utf-8"?>
 <p:sld xmlns:a="http://schemas.openxmlformats.org/drawingml/2006/main" xmlns:r="http://schemas.openxmlformats.org/officeDocument/2006/relationships" xmlns:p="http://schemas.openxmlformats.org/presentationml/2006/main">
   <p:cSld>
     <p:spTree>
@@ -3477,7 +3481,7 @@
           <p:cNvPr id="2" name="Title 1">
             <a:extLst>
               <a:ext uri="{FF2B5EF4-FFF2-40B4-BE49-F238E27FC236}">
-                <a16:creationId xmlns:a16="http://schemas.microsoft.com/office/drawing/2014/main" id="{5E611BD4-B398-264E-A636-02CFA2E667A0}"/>
+                <a16:creationId xmlns:a16="http://schemas.microsoft.com/office/drawing/2014/main" id="{CF2DE2F5-05C4-EC48-BB6A-68F63F7649E0}"/>
               </a:ext>
             </a:extLst>
           </p:cNvPr>
@@ -3495,1292 +3499,29 @@
           <a:p>
             <a:r>
               <a:rPr lang="en-CH" b="1" u="sng" dirty="0"/>
-              <a:t>The dataset</a:t>
-            </a:r>
-          </a:p>
-        </p:txBody>
-      </p:sp>
-      <p:sp>
-        <p:nvSpPr>
-          <p:cNvPr id="3" name="Content Placeholder 2">
-            <a:extLst>
-              <a:ext uri="{FF2B5EF4-FFF2-40B4-BE49-F238E27FC236}">
-                <a16:creationId xmlns:a16="http://schemas.microsoft.com/office/drawing/2014/main" id="{B1C4BA70-3407-C945-9CD3-B60899BC85D6}"/>
-              </a:ext>
-            </a:extLst>
-          </p:cNvPr>
-          <p:cNvSpPr>
-            <a:spLocks noGrp="1"/>
-          </p:cNvSpPr>
-          <p:nvPr>
-            <p:ph idx="1"/>
-          </p:nvPr>
-        </p:nvSpPr>
-        <p:spPr/>
-        <p:txBody>
-          <a:bodyPr>
-            <a:normAutofit fontScale="92500"/>
-          </a:bodyPr>
-          <a:lstStyle/>
-          <a:p>
-            <a:r>
-              <a:rPr lang="en-CH" dirty="0"/>
-              <a:t>KDD Cup 1999 dataset.</a:t>
-            </a:r>
-          </a:p>
-          <a:p>
-            <a:r>
-              <a:rPr lang="en-GB" dirty="0"/>
-              <a:t>Used for the Third International Knowledge Discovery and Data Mining Tools Competition in 1999. </a:t>
-            </a:r>
-          </a:p>
-          <a:p>
-            <a:r>
-              <a:rPr lang="en-GB" dirty="0"/>
-              <a:t>The dataset contains samples (</a:t>
-            </a:r>
-            <a:r>
-              <a:rPr lang="en-CH" dirty="0"/>
-              <a:t>4’898’430)</a:t>
-            </a:r>
-            <a:r>
-              <a:rPr lang="en-GB" dirty="0"/>
-              <a:t> representing network connections. </a:t>
-            </a:r>
-          </a:p>
-          <a:p>
-            <a:r>
-              <a:rPr lang="en-GB" dirty="0"/>
-              <a:t>Each sample is made of 41 features that can be used to predict the correct label. </a:t>
-            </a:r>
-          </a:p>
-          <a:p>
-            <a:r>
-              <a:rPr lang="en-GB" dirty="0"/>
-              <a:t>There are 23 different labels (normal, </a:t>
-            </a:r>
-            <a:r>
-              <a:rPr lang="en-GB" dirty="0" err="1"/>
-              <a:t>netptune</a:t>
-            </a:r>
-            <a:r>
-              <a:rPr lang="en-GB" dirty="0"/>
-              <a:t> attack, </a:t>
-            </a:r>
-            <a:r>
-              <a:rPr lang="en-GB" dirty="0" err="1"/>
-              <a:t>satan</a:t>
-            </a:r>
-            <a:r>
-              <a:rPr lang="en-GB" dirty="0"/>
-              <a:t> attack…). </a:t>
-            </a:r>
-          </a:p>
-          <a:p>
-            <a:r>
-              <a:rPr lang="en-GB" dirty="0"/>
-              <a:t>For more information: </a:t>
-            </a:r>
-            <a:r>
-              <a:rPr lang="en-GB" dirty="0">
-                <a:hlinkClick r:id="rId2"/>
-              </a:rPr>
-              <a:t>http://kdd.ics.uci.edu/databases/kddcup99/task.html</a:t>
-            </a:r>
-            <a:endParaRPr lang="en-GB" dirty="0"/>
-          </a:p>
-          <a:p>
-            <a:endParaRPr lang="en-CH" dirty="0"/>
-          </a:p>
-        </p:txBody>
-      </p:sp>
-    </p:spTree>
-    <p:extLst>
-      <p:ext uri="{BB962C8B-B14F-4D97-AF65-F5344CB8AC3E}">
-        <p14:creationId xmlns:p14="http://schemas.microsoft.com/office/powerpoint/2010/main" val="1144509280"/>
-      </p:ext>
-    </p:extLst>
-  </p:cSld>
-  <p:clrMapOvr>
-    <a:masterClrMapping/>
-  </p:clrMapOvr>
-</p:sld>
-</file>
-
-<file path=ppt/slides/slide3.xml><?xml version="1.0" encoding="utf-8"?>
-<p:sld xmlns:a="http://schemas.openxmlformats.org/drawingml/2006/main" xmlns:r="http://schemas.openxmlformats.org/officeDocument/2006/relationships" xmlns:p="http://schemas.openxmlformats.org/presentationml/2006/main">
-  <p:cSld>
-    <p:spTree>
-      <p:nvGrpSpPr>
-        <p:cNvPr id="1" name=""/>
-        <p:cNvGrpSpPr/>
-        <p:nvPr/>
-      </p:nvGrpSpPr>
-      <p:grpSpPr>
-        <a:xfrm>
-          <a:off x="0" y="0"/>
-          <a:ext cx="0" cy="0"/>
-          <a:chOff x="0" y="0"/>
-          <a:chExt cx="0" cy="0"/>
-        </a:xfrm>
-      </p:grpSpPr>
-      <p:sp>
-        <p:nvSpPr>
-          <p:cNvPr id="2" name="Title 1">
-            <a:extLst>
-              <a:ext uri="{FF2B5EF4-FFF2-40B4-BE49-F238E27FC236}">
-                <a16:creationId xmlns:a16="http://schemas.microsoft.com/office/drawing/2014/main" id="{73B34BCB-1FC3-D442-BF89-B69D3E2092FB}"/>
-              </a:ext>
-            </a:extLst>
-          </p:cNvPr>
-          <p:cNvSpPr>
-            <a:spLocks noGrp="1"/>
-          </p:cNvSpPr>
-          <p:nvPr>
-            <p:ph type="title"/>
-          </p:nvPr>
-        </p:nvSpPr>
-        <p:spPr/>
-        <p:txBody>
-          <a:bodyPr/>
-          <a:lstStyle/>
-          <a:p>
-            <a:r>
-              <a:rPr lang="en-CH" b="1" u="sng" dirty="0"/>
-              <a:t>The hypothesis</a:t>
-            </a:r>
-          </a:p>
-        </p:txBody>
-      </p:sp>
-      <p:sp>
-        <p:nvSpPr>
-          <p:cNvPr id="3" name="Content Placeholder 2">
-            <a:extLst>
-              <a:ext uri="{FF2B5EF4-FFF2-40B4-BE49-F238E27FC236}">
-                <a16:creationId xmlns:a16="http://schemas.microsoft.com/office/drawing/2014/main" id="{1DF4698C-3A39-EA45-8D8D-7B3220F82C70}"/>
-              </a:ext>
-            </a:extLst>
-          </p:cNvPr>
-          <p:cNvSpPr>
-            <a:spLocks noGrp="1"/>
-          </p:cNvSpPr>
-          <p:nvPr>
-            <p:ph idx="1"/>
-          </p:nvPr>
+              <a:t>Package and deployement</a:t>
+            </a:r>
+          </a:p>
+        </p:txBody>
+      </p:sp>
+      <p:sp>
+        <p:nvSpPr>
+          <p:cNvPr id="10" name="Content Placeholder 2">
+            <a:extLst>
+              <a:ext uri="{FF2B5EF4-FFF2-40B4-BE49-F238E27FC236}">
+                <a16:creationId xmlns:a16="http://schemas.microsoft.com/office/drawing/2014/main" id="{4DD26E11-6A91-1B4E-8646-871310983A02}"/>
+              </a:ext>
+            </a:extLst>
+          </p:cNvPr>
+          <p:cNvSpPr txBox="1">
+            <a:spLocks/>
+          </p:cNvSpPr>
+          <p:nvPr/>
         </p:nvSpPr>
         <p:spPr>
           <a:xfrm>
-            <a:off x="838200" y="1825625"/>
-            <a:ext cx="10515600" cy="3854928"/>
-          </a:xfrm>
-        </p:spPr>
-        <p:txBody>
-          <a:bodyPr>
-            <a:normAutofit fontScale="92500" lnSpcReduction="20000"/>
-          </a:bodyPr>
-          <a:lstStyle/>
-          <a:p>
-            <a:pPr marL="0" indent="0">
-              <a:buNone/>
-            </a:pPr>
-            <a:r>
-              <a:rPr lang="en-CH" dirty="0"/>
-              <a:t>Statements: </a:t>
-            </a:r>
-          </a:p>
-          <a:p>
-            <a:r>
-              <a:rPr lang="en-CH" dirty="0"/>
-              <a:t>In the 23 labels, 1 label is representing a normal connection and 22 a type of network attack. </a:t>
-            </a:r>
-          </a:p>
-          <a:p>
-            <a:r>
-              <a:rPr lang="en-CH" dirty="0"/>
-              <a:t>The normal connections represent 20% of the samples of the whole set. </a:t>
-            </a:r>
-          </a:p>
-          <a:p>
-            <a:r>
-              <a:rPr lang="en-CH" dirty="0"/>
-              <a:t>We believe it is possible to classify those connections using the 41 features available. </a:t>
-            </a:r>
-          </a:p>
-          <a:p>
-            <a:pPr marL="0" indent="0">
-              <a:buNone/>
-            </a:pPr>
-            <a:endParaRPr lang="en-CH" b="1" dirty="0"/>
-          </a:p>
-          <a:p>
-            <a:pPr marL="0" indent="0">
-              <a:buNone/>
-            </a:pPr>
-            <a:r>
-              <a:rPr lang="en-CH" dirty="0"/>
-              <a:t>Hypothesis: </a:t>
-            </a:r>
-            <a:endParaRPr lang="en-CH" b="1" dirty="0"/>
-          </a:p>
-          <a:p>
-            <a:pPr marL="0" indent="0">
-              <a:buNone/>
-            </a:pPr>
-            <a:r>
-              <a:rPr lang="en-CH" b="1" dirty="0"/>
-              <a:t>“We can achieve a good classification accuracy (&gt; 95% on the test set) in classifying the network connections into the correct labels.” </a:t>
-            </a:r>
-          </a:p>
-        </p:txBody>
-      </p:sp>
-    </p:spTree>
-    <p:extLst>
-      <p:ext uri="{BB962C8B-B14F-4D97-AF65-F5344CB8AC3E}">
-        <p14:creationId xmlns:p14="http://schemas.microsoft.com/office/powerpoint/2010/main" val="1697104218"/>
-      </p:ext>
-    </p:extLst>
-  </p:cSld>
-  <p:clrMapOvr>
-    <a:masterClrMapping/>
-  </p:clrMapOvr>
-</p:sld>
-</file>
-
-<file path=ppt/slides/slide4.xml><?xml version="1.0" encoding="utf-8"?>
-<p:sld xmlns:a="http://schemas.openxmlformats.org/drawingml/2006/main" xmlns:r="http://schemas.openxmlformats.org/officeDocument/2006/relationships" xmlns:p="http://schemas.openxmlformats.org/presentationml/2006/main">
-  <p:cSld>
-    <p:spTree>
-      <p:nvGrpSpPr>
-        <p:cNvPr id="1" name=""/>
-        <p:cNvGrpSpPr/>
-        <p:nvPr/>
-      </p:nvGrpSpPr>
-      <p:grpSpPr>
-        <a:xfrm>
-          <a:off x="0" y="0"/>
-          <a:ext cx="0" cy="0"/>
-          <a:chOff x="0" y="0"/>
-          <a:chExt cx="0" cy="0"/>
-        </a:xfrm>
-      </p:grpSpPr>
-      <p:sp>
-        <p:nvSpPr>
-          <p:cNvPr id="2" name="Title 1">
-            <a:extLst>
-              <a:ext uri="{FF2B5EF4-FFF2-40B4-BE49-F238E27FC236}">
-                <a16:creationId xmlns:a16="http://schemas.microsoft.com/office/drawing/2014/main" id="{92482DA4-79F1-5A4A-A8E4-CC5BE4EFF066}"/>
-              </a:ext>
-            </a:extLst>
-          </p:cNvPr>
-          <p:cNvSpPr>
-            <a:spLocks noGrp="1"/>
-          </p:cNvSpPr>
-          <p:nvPr>
-            <p:ph type="title"/>
-          </p:nvPr>
-        </p:nvSpPr>
-        <p:spPr/>
-        <p:txBody>
-          <a:bodyPr/>
-          <a:lstStyle/>
-          <a:p>
-            <a:r>
-              <a:rPr lang="en-CH" b="1" u="sng" dirty="0"/>
-              <a:t>Framework organization</a:t>
-            </a:r>
-          </a:p>
-        </p:txBody>
-      </p:sp>
-      <p:pic>
-        <p:nvPicPr>
-          <p:cNvPr id="4" name="Picture 3" descr="Text&#10;&#10;Description automatically generated">
-            <a:extLst>
-              <a:ext uri="{FF2B5EF4-FFF2-40B4-BE49-F238E27FC236}">
-                <a16:creationId xmlns:a16="http://schemas.microsoft.com/office/drawing/2014/main" id="{23C96291-C05D-0A4D-885A-00C9AA36DC6C}"/>
-              </a:ext>
-            </a:extLst>
-          </p:cNvPr>
-          <p:cNvPicPr>
-            <a:picLocks noChangeAspect="1"/>
-          </p:cNvPicPr>
-          <p:nvPr/>
-        </p:nvPicPr>
-        <p:blipFill>
-          <a:blip r:embed="rId2"/>
-          <a:stretch>
-            <a:fillRect/>
-          </a:stretch>
-        </p:blipFill>
-        <p:spPr>
-          <a:xfrm>
-            <a:off x="1047549" y="1690688"/>
-            <a:ext cx="10096901" cy="4937837"/>
-          </a:xfrm>
-          <a:prstGeom prst="rect">
-            <a:avLst/>
-          </a:prstGeom>
-        </p:spPr>
-      </p:pic>
-    </p:spTree>
-    <p:extLst>
-      <p:ext uri="{BB962C8B-B14F-4D97-AF65-F5344CB8AC3E}">
-        <p14:creationId xmlns:p14="http://schemas.microsoft.com/office/powerpoint/2010/main" val="627469460"/>
-      </p:ext>
-    </p:extLst>
-  </p:cSld>
-  <p:clrMapOvr>
-    <a:masterClrMapping/>
-  </p:clrMapOvr>
-</p:sld>
-</file>
-
-<file path=ppt/slides/slide5.xml><?xml version="1.0" encoding="utf-8"?>
-<p:sld xmlns:a="http://schemas.openxmlformats.org/drawingml/2006/main" xmlns:r="http://schemas.openxmlformats.org/officeDocument/2006/relationships" xmlns:p="http://schemas.openxmlformats.org/presentationml/2006/main">
-  <p:cSld>
-    <p:spTree>
-      <p:nvGrpSpPr>
-        <p:cNvPr id="1" name=""/>
-        <p:cNvGrpSpPr/>
-        <p:nvPr/>
-      </p:nvGrpSpPr>
-      <p:grpSpPr>
-        <a:xfrm>
-          <a:off x="0" y="0"/>
-          <a:ext cx="0" cy="0"/>
-          <a:chOff x="0" y="0"/>
-          <a:chExt cx="0" cy="0"/>
-        </a:xfrm>
-      </p:grpSpPr>
-      <p:sp>
-        <p:nvSpPr>
-          <p:cNvPr id="2" name="Title 1">
-            <a:extLst>
-              <a:ext uri="{FF2B5EF4-FFF2-40B4-BE49-F238E27FC236}">
-                <a16:creationId xmlns:a16="http://schemas.microsoft.com/office/drawing/2014/main" id="{9E9AB15D-099A-3745-95E3-A34E1D9543AC}"/>
-              </a:ext>
-            </a:extLst>
-          </p:cNvPr>
-          <p:cNvSpPr>
-            <a:spLocks noGrp="1"/>
-          </p:cNvSpPr>
-          <p:nvPr>
-            <p:ph type="title"/>
-          </p:nvPr>
-        </p:nvSpPr>
-        <p:spPr/>
-        <p:txBody>
-          <a:bodyPr/>
-          <a:lstStyle/>
-          <a:p>
-            <a:r>
-              <a:rPr lang="en-CH" b="1" u="sng" dirty="0"/>
-              <a:t>Project structure</a:t>
-            </a:r>
-          </a:p>
-        </p:txBody>
-      </p:sp>
-      <p:pic>
-        <p:nvPicPr>
-          <p:cNvPr id="5" name="Content Placeholder 4">
-            <a:extLst>
-              <a:ext uri="{FF2B5EF4-FFF2-40B4-BE49-F238E27FC236}">
-                <a16:creationId xmlns:a16="http://schemas.microsoft.com/office/drawing/2014/main" id="{D94E5D41-BFF3-8247-9CCD-0D6DD04089BF}"/>
-              </a:ext>
-            </a:extLst>
-          </p:cNvPr>
-          <p:cNvPicPr>
-            <a:picLocks noGrp="1" noChangeAspect="1"/>
-          </p:cNvPicPr>
-          <p:nvPr>
-            <p:ph idx="1"/>
-          </p:nvPr>
-        </p:nvPicPr>
-        <p:blipFill>
-          <a:blip r:embed="rId2"/>
-          <a:stretch>
-            <a:fillRect/>
-          </a:stretch>
-        </p:blipFill>
-        <p:spPr>
-          <a:xfrm>
-            <a:off x="1044718" y="1503887"/>
-            <a:ext cx="2006573" cy="4988988"/>
-          </a:xfrm>
-        </p:spPr>
-      </p:pic>
-      <p:sp>
-        <p:nvSpPr>
-          <p:cNvPr id="6" name="Right Bracket 5">
-            <a:extLst>
-              <a:ext uri="{FF2B5EF4-FFF2-40B4-BE49-F238E27FC236}">
-                <a16:creationId xmlns:a16="http://schemas.microsoft.com/office/drawing/2014/main" id="{70E328F9-15E2-A744-AC9B-5BEA9CC92DA1}"/>
-              </a:ext>
-            </a:extLst>
-          </p:cNvPr>
-          <p:cNvSpPr/>
-          <p:nvPr/>
-        </p:nvSpPr>
-        <p:spPr>
-          <a:xfrm>
-            <a:off x="2524464" y="3237989"/>
-            <a:ext cx="402609" cy="1188158"/>
-          </a:xfrm>
-          <a:prstGeom prst="rightBracket">
-            <a:avLst/>
-          </a:prstGeom>
-          <a:noFill/>
-          <a:ln w="38100">
-            <a:solidFill>
-              <a:srgbClr val="FF0000"/>
-            </a:solidFill>
-          </a:ln>
-        </p:spPr>
-        <p:style>
-          <a:lnRef idx="1">
-            <a:schemeClr val="accent1"/>
-          </a:lnRef>
-          <a:fillRef idx="0">
-            <a:schemeClr val="accent1"/>
-          </a:fillRef>
-          <a:effectRef idx="0">
-            <a:schemeClr val="accent1"/>
-          </a:effectRef>
-          <a:fontRef idx="minor">
-            <a:schemeClr val="tx1"/>
-          </a:fontRef>
-        </p:style>
-        <p:txBody>
-          <a:bodyPr rtlCol="0" anchor="ctr"/>
-          <a:lstStyle/>
-          <a:p>
-            <a:pPr algn="ctr"/>
-            <a:endParaRPr lang="en-CH"/>
-          </a:p>
-        </p:txBody>
-      </p:sp>
-      <p:cxnSp>
-        <p:nvCxnSpPr>
-          <p:cNvPr id="7" name="Straight Arrow Connector 6">
-            <a:extLst>
-              <a:ext uri="{FF2B5EF4-FFF2-40B4-BE49-F238E27FC236}">
-                <a16:creationId xmlns:a16="http://schemas.microsoft.com/office/drawing/2014/main" id="{1AC312B0-0868-9948-9967-F12608B97A2E}"/>
-              </a:ext>
-            </a:extLst>
-          </p:cNvPr>
-          <p:cNvCxnSpPr>
-            <a:cxnSpLocks/>
-          </p:cNvCxnSpPr>
-          <p:nvPr/>
-        </p:nvCxnSpPr>
-        <p:spPr>
-          <a:xfrm>
-            <a:off x="2927073" y="3821791"/>
-            <a:ext cx="592741" cy="0"/>
-          </a:xfrm>
-          <a:prstGeom prst="straightConnector1">
-            <a:avLst/>
-          </a:prstGeom>
-          <a:ln w="38100">
-            <a:solidFill>
-              <a:srgbClr val="FF0000"/>
-            </a:solidFill>
-            <a:tailEnd type="triangle"/>
-          </a:ln>
-        </p:spPr>
-        <p:style>
-          <a:lnRef idx="1">
-            <a:schemeClr val="accent1"/>
-          </a:lnRef>
-          <a:fillRef idx="0">
-            <a:schemeClr val="accent1"/>
-          </a:fillRef>
-          <a:effectRef idx="0">
-            <a:schemeClr val="accent1"/>
-          </a:effectRef>
-          <a:fontRef idx="minor">
-            <a:schemeClr val="tx1"/>
-          </a:fontRef>
-        </p:style>
-      </p:cxnSp>
-      <p:cxnSp>
-        <p:nvCxnSpPr>
-          <p:cNvPr id="9" name="Straight Arrow Connector 8">
-            <a:extLst>
-              <a:ext uri="{FF2B5EF4-FFF2-40B4-BE49-F238E27FC236}">
-                <a16:creationId xmlns:a16="http://schemas.microsoft.com/office/drawing/2014/main" id="{A8B9952F-1526-8C4A-BA03-12036D996753}"/>
-              </a:ext>
-            </a:extLst>
-          </p:cNvPr>
-          <p:cNvCxnSpPr>
-            <a:cxnSpLocks/>
-          </p:cNvCxnSpPr>
-          <p:nvPr/>
-        </p:nvCxnSpPr>
-        <p:spPr>
-          <a:xfrm>
-            <a:off x="1908452" y="1907397"/>
-            <a:ext cx="1632559" cy="0"/>
-          </a:xfrm>
-          <a:prstGeom prst="straightConnector1">
-            <a:avLst/>
-          </a:prstGeom>
-          <a:ln w="38100">
-            <a:solidFill>
-              <a:srgbClr val="FF0000"/>
-            </a:solidFill>
-            <a:tailEnd type="triangle"/>
-          </a:ln>
-        </p:spPr>
-        <p:style>
-          <a:lnRef idx="1">
-            <a:schemeClr val="accent1"/>
-          </a:lnRef>
-          <a:fillRef idx="0">
-            <a:schemeClr val="accent1"/>
-          </a:fillRef>
-          <a:effectRef idx="0">
-            <a:schemeClr val="accent1"/>
-          </a:effectRef>
-          <a:fontRef idx="minor">
-            <a:schemeClr val="tx1"/>
-          </a:fontRef>
-        </p:style>
-      </p:cxnSp>
-      <p:cxnSp>
-        <p:nvCxnSpPr>
-          <p:cNvPr id="11" name="Straight Arrow Connector 10">
-            <a:extLst>
-              <a:ext uri="{FF2B5EF4-FFF2-40B4-BE49-F238E27FC236}">
-                <a16:creationId xmlns:a16="http://schemas.microsoft.com/office/drawing/2014/main" id="{F8F37C0E-3E76-764D-A9F9-21938FAD19FA}"/>
-              </a:ext>
-            </a:extLst>
-          </p:cNvPr>
-          <p:cNvCxnSpPr>
-            <a:cxnSpLocks/>
-          </p:cNvCxnSpPr>
-          <p:nvPr/>
-        </p:nvCxnSpPr>
-        <p:spPr>
-          <a:xfrm>
-            <a:off x="1898163" y="2185057"/>
-            <a:ext cx="1632559" cy="0"/>
-          </a:xfrm>
-          <a:prstGeom prst="straightConnector1">
-            <a:avLst/>
-          </a:prstGeom>
-          <a:ln w="38100">
-            <a:solidFill>
-              <a:srgbClr val="FF0000"/>
-            </a:solidFill>
-            <a:tailEnd type="triangle"/>
-          </a:ln>
-        </p:spPr>
-        <p:style>
-          <a:lnRef idx="1">
-            <a:schemeClr val="accent1"/>
-          </a:lnRef>
-          <a:fillRef idx="0">
-            <a:schemeClr val="accent1"/>
-          </a:fillRef>
-          <a:effectRef idx="0">
-            <a:schemeClr val="accent1"/>
-          </a:effectRef>
-          <a:fontRef idx="minor">
-            <a:schemeClr val="tx1"/>
-          </a:fontRef>
-        </p:style>
-      </p:cxnSp>
-      <p:cxnSp>
-        <p:nvCxnSpPr>
-          <p:cNvPr id="13" name="Straight Arrow Connector 12">
-            <a:extLst>
-              <a:ext uri="{FF2B5EF4-FFF2-40B4-BE49-F238E27FC236}">
-                <a16:creationId xmlns:a16="http://schemas.microsoft.com/office/drawing/2014/main" id="{B62DF67F-9722-074B-B2AC-A5ECB5781B31}"/>
-              </a:ext>
-            </a:extLst>
-          </p:cNvPr>
-          <p:cNvCxnSpPr>
-            <a:cxnSpLocks/>
-          </p:cNvCxnSpPr>
-          <p:nvPr/>
-        </p:nvCxnSpPr>
-        <p:spPr>
-          <a:xfrm>
-            <a:off x="2020866" y="2443928"/>
-            <a:ext cx="1498948" cy="0"/>
-          </a:xfrm>
-          <a:prstGeom prst="straightConnector1">
-            <a:avLst/>
-          </a:prstGeom>
-          <a:ln w="38100">
-            <a:solidFill>
-              <a:srgbClr val="FF0000"/>
-            </a:solidFill>
-            <a:tailEnd type="triangle"/>
-          </a:ln>
-        </p:spPr>
-        <p:style>
-          <a:lnRef idx="1">
-            <a:schemeClr val="accent1"/>
-          </a:lnRef>
-          <a:fillRef idx="0">
-            <a:schemeClr val="accent1"/>
-          </a:fillRef>
-          <a:effectRef idx="0">
-            <a:schemeClr val="accent1"/>
-          </a:effectRef>
-          <a:fontRef idx="minor">
-            <a:schemeClr val="tx1"/>
-          </a:fontRef>
-        </p:style>
-      </p:cxnSp>
-      <p:cxnSp>
-        <p:nvCxnSpPr>
-          <p:cNvPr id="15" name="Straight Arrow Connector 14">
-            <a:extLst>
-              <a:ext uri="{FF2B5EF4-FFF2-40B4-BE49-F238E27FC236}">
-                <a16:creationId xmlns:a16="http://schemas.microsoft.com/office/drawing/2014/main" id="{095C8D7D-A001-DA49-AA04-AC32DDF81453}"/>
-              </a:ext>
-            </a:extLst>
-          </p:cNvPr>
-          <p:cNvCxnSpPr>
-            <a:cxnSpLocks/>
-          </p:cNvCxnSpPr>
-          <p:nvPr/>
-        </p:nvCxnSpPr>
-        <p:spPr>
-          <a:xfrm>
-            <a:off x="2242159" y="2727851"/>
-            <a:ext cx="1277655" cy="0"/>
-          </a:xfrm>
-          <a:prstGeom prst="straightConnector1">
-            <a:avLst/>
-          </a:prstGeom>
-          <a:ln w="38100">
-            <a:solidFill>
-              <a:srgbClr val="FF0000"/>
-            </a:solidFill>
-            <a:tailEnd type="triangle"/>
-          </a:ln>
-        </p:spPr>
-        <p:style>
-          <a:lnRef idx="1">
-            <a:schemeClr val="accent1"/>
-          </a:lnRef>
-          <a:fillRef idx="0">
-            <a:schemeClr val="accent1"/>
-          </a:fillRef>
-          <a:effectRef idx="0">
-            <a:schemeClr val="accent1"/>
-          </a:effectRef>
-          <a:fontRef idx="minor">
-            <a:schemeClr val="tx1"/>
-          </a:fontRef>
-        </p:style>
-      </p:cxnSp>
-      <p:cxnSp>
-        <p:nvCxnSpPr>
-          <p:cNvPr id="17" name="Straight Arrow Connector 16">
-            <a:extLst>
-              <a:ext uri="{FF2B5EF4-FFF2-40B4-BE49-F238E27FC236}">
-                <a16:creationId xmlns:a16="http://schemas.microsoft.com/office/drawing/2014/main" id="{CAB4EAE0-58BD-1F49-B402-3692CBDEA6E6}"/>
-              </a:ext>
-            </a:extLst>
-          </p:cNvPr>
-          <p:cNvCxnSpPr>
-            <a:cxnSpLocks/>
-          </p:cNvCxnSpPr>
-          <p:nvPr/>
-        </p:nvCxnSpPr>
-        <p:spPr>
-          <a:xfrm>
-            <a:off x="2020866" y="3028974"/>
-            <a:ext cx="1498948" cy="0"/>
-          </a:xfrm>
-          <a:prstGeom prst="straightConnector1">
-            <a:avLst/>
-          </a:prstGeom>
-          <a:ln w="38100">
-            <a:solidFill>
-              <a:srgbClr val="FF0000"/>
-            </a:solidFill>
-            <a:tailEnd type="triangle"/>
-          </a:ln>
-        </p:spPr>
-        <p:style>
-          <a:lnRef idx="1">
-            <a:schemeClr val="accent1"/>
-          </a:lnRef>
-          <a:fillRef idx="0">
-            <a:schemeClr val="accent1"/>
-          </a:fillRef>
-          <a:effectRef idx="0">
-            <a:schemeClr val="accent1"/>
-          </a:effectRef>
-          <a:fontRef idx="minor">
-            <a:schemeClr val="tx1"/>
-          </a:fontRef>
-        </p:style>
-      </p:cxnSp>
-      <p:cxnSp>
-        <p:nvCxnSpPr>
-          <p:cNvPr id="19" name="Straight Arrow Connector 18">
-            <a:extLst>
-              <a:ext uri="{FF2B5EF4-FFF2-40B4-BE49-F238E27FC236}">
-                <a16:creationId xmlns:a16="http://schemas.microsoft.com/office/drawing/2014/main" id="{8833185C-E844-0945-816E-06889F5A6370}"/>
-              </a:ext>
-            </a:extLst>
-          </p:cNvPr>
-          <p:cNvCxnSpPr>
-            <a:cxnSpLocks/>
-          </p:cNvCxnSpPr>
-          <p:nvPr/>
-        </p:nvCxnSpPr>
-        <p:spPr>
-          <a:xfrm>
-            <a:off x="1862524" y="4961659"/>
-            <a:ext cx="1657290" cy="0"/>
-          </a:xfrm>
-          <a:prstGeom prst="straightConnector1">
-            <a:avLst/>
-          </a:prstGeom>
-          <a:ln w="38100">
-            <a:solidFill>
-              <a:srgbClr val="FF0000"/>
-            </a:solidFill>
-            <a:tailEnd type="triangle"/>
-          </a:ln>
-        </p:spPr>
-        <p:style>
-          <a:lnRef idx="1">
-            <a:schemeClr val="accent1"/>
-          </a:lnRef>
-          <a:fillRef idx="0">
-            <a:schemeClr val="accent1"/>
-          </a:fillRef>
-          <a:effectRef idx="0">
-            <a:schemeClr val="accent1"/>
-          </a:effectRef>
-          <a:fontRef idx="minor">
-            <a:schemeClr val="tx1"/>
-          </a:fontRef>
-        </p:style>
-      </p:cxnSp>
-      <p:cxnSp>
-        <p:nvCxnSpPr>
-          <p:cNvPr id="22" name="Straight Arrow Connector 21">
-            <a:extLst>
-              <a:ext uri="{FF2B5EF4-FFF2-40B4-BE49-F238E27FC236}">
-                <a16:creationId xmlns:a16="http://schemas.microsoft.com/office/drawing/2014/main" id="{5E7B57ED-D690-CE42-94B4-3DD4AD57B26A}"/>
-              </a:ext>
-            </a:extLst>
-          </p:cNvPr>
-          <p:cNvCxnSpPr>
-            <a:cxnSpLocks/>
-          </p:cNvCxnSpPr>
-          <p:nvPr/>
-        </p:nvCxnSpPr>
-        <p:spPr>
-          <a:xfrm>
-            <a:off x="2110793" y="6072300"/>
-            <a:ext cx="1430218" cy="0"/>
-          </a:xfrm>
-          <a:prstGeom prst="straightConnector1">
-            <a:avLst/>
-          </a:prstGeom>
-          <a:ln w="38100">
-            <a:solidFill>
-              <a:srgbClr val="FF0000"/>
-            </a:solidFill>
-            <a:tailEnd type="triangle"/>
-          </a:ln>
-        </p:spPr>
-        <p:style>
-          <a:lnRef idx="1">
-            <a:schemeClr val="accent1"/>
-          </a:lnRef>
-          <a:fillRef idx="0">
-            <a:schemeClr val="accent1"/>
-          </a:fillRef>
-          <a:effectRef idx="0">
-            <a:schemeClr val="accent1"/>
-          </a:effectRef>
-          <a:fontRef idx="minor">
-            <a:schemeClr val="tx1"/>
-          </a:fontRef>
-        </p:style>
-      </p:cxnSp>
-      <p:cxnSp>
-        <p:nvCxnSpPr>
-          <p:cNvPr id="23" name="Straight Arrow Connector 22">
-            <a:extLst>
-              <a:ext uri="{FF2B5EF4-FFF2-40B4-BE49-F238E27FC236}">
-                <a16:creationId xmlns:a16="http://schemas.microsoft.com/office/drawing/2014/main" id="{FB493C9D-8736-944B-9167-378FBCA8EB82}"/>
-              </a:ext>
-            </a:extLst>
-          </p:cNvPr>
-          <p:cNvCxnSpPr>
-            <a:cxnSpLocks/>
-          </p:cNvCxnSpPr>
-          <p:nvPr/>
-        </p:nvCxnSpPr>
-        <p:spPr>
-          <a:xfrm>
-            <a:off x="2952609" y="6387538"/>
-            <a:ext cx="588402" cy="0"/>
-          </a:xfrm>
-          <a:prstGeom prst="straightConnector1">
-            <a:avLst/>
-          </a:prstGeom>
-          <a:ln w="38100">
-            <a:solidFill>
-              <a:srgbClr val="FF0000"/>
-            </a:solidFill>
-            <a:tailEnd type="triangle"/>
-          </a:ln>
-        </p:spPr>
-        <p:style>
-          <a:lnRef idx="1">
-            <a:schemeClr val="accent1"/>
-          </a:lnRef>
-          <a:fillRef idx="0">
-            <a:schemeClr val="accent1"/>
-          </a:fillRef>
-          <a:effectRef idx="0">
-            <a:schemeClr val="accent1"/>
-          </a:effectRef>
-          <a:fontRef idx="minor">
-            <a:schemeClr val="tx1"/>
-          </a:fontRef>
-        </p:style>
-      </p:cxnSp>
-      <p:sp>
-        <p:nvSpPr>
-          <p:cNvPr id="31" name="TextBox 30">
-            <a:extLst>
-              <a:ext uri="{FF2B5EF4-FFF2-40B4-BE49-F238E27FC236}">
-                <a16:creationId xmlns:a16="http://schemas.microsoft.com/office/drawing/2014/main" id="{28D28C1C-C134-954A-B190-9D23B0F79B38}"/>
-              </a:ext>
-            </a:extLst>
-          </p:cNvPr>
-          <p:cNvSpPr txBox="1"/>
-          <p:nvPr/>
-        </p:nvSpPr>
-        <p:spPr>
-          <a:xfrm>
-            <a:off x="3519814" y="1754855"/>
-            <a:ext cx="3169085" cy="307777"/>
-          </a:xfrm>
-          <a:prstGeom prst="rect">
-            <a:avLst/>
-          </a:prstGeom>
-          <a:noFill/>
-        </p:spPr>
-        <p:txBody>
-          <a:bodyPr wrap="square" rtlCol="0">
-            <a:spAutoFit/>
-          </a:bodyPr>
-          <a:lstStyle/>
-          <a:p>
-            <a:r>
-              <a:rPr lang="en-CH" sz="1400" dirty="0"/>
-              <a:t>Data files compressed</a:t>
-            </a:r>
-          </a:p>
-        </p:txBody>
-      </p:sp>
-      <p:sp>
-        <p:nvSpPr>
-          <p:cNvPr id="32" name="TextBox 31">
-            <a:extLst>
-              <a:ext uri="{FF2B5EF4-FFF2-40B4-BE49-F238E27FC236}">
-                <a16:creationId xmlns:a16="http://schemas.microsoft.com/office/drawing/2014/main" id="{00120D1A-4E43-A043-B70F-5B35B4752BFF}"/>
-              </a:ext>
-            </a:extLst>
-          </p:cNvPr>
-          <p:cNvSpPr txBox="1"/>
-          <p:nvPr/>
-        </p:nvSpPr>
-        <p:spPr>
-          <a:xfrm>
-            <a:off x="3519814" y="2021549"/>
-            <a:ext cx="3169085" cy="307777"/>
-          </a:xfrm>
-          <a:prstGeom prst="rect">
-            <a:avLst/>
-          </a:prstGeom>
-          <a:noFill/>
-        </p:spPr>
-        <p:txBody>
-          <a:bodyPr wrap="square" rtlCol="0">
-            <a:spAutoFit/>
-          </a:bodyPr>
-          <a:lstStyle/>
-          <a:p>
-            <a:r>
-              <a:rPr lang="en-CH" sz="1400" dirty="0"/>
-              <a:t>Documentation</a:t>
-            </a:r>
-          </a:p>
-        </p:txBody>
-      </p:sp>
-      <p:sp>
-        <p:nvSpPr>
-          <p:cNvPr id="33" name="TextBox 32">
-            <a:extLst>
-              <a:ext uri="{FF2B5EF4-FFF2-40B4-BE49-F238E27FC236}">
-                <a16:creationId xmlns:a16="http://schemas.microsoft.com/office/drawing/2014/main" id="{2F796A0E-260F-2B46-B405-09DFCA7920FE}"/>
-              </a:ext>
-            </a:extLst>
-          </p:cNvPr>
-          <p:cNvSpPr txBox="1"/>
-          <p:nvPr/>
-        </p:nvSpPr>
-        <p:spPr>
-          <a:xfrm>
-            <a:off x="3541011" y="2288243"/>
-            <a:ext cx="3169085" cy="307777"/>
-          </a:xfrm>
-          <a:prstGeom prst="rect">
-            <a:avLst/>
-          </a:prstGeom>
-          <a:noFill/>
-        </p:spPr>
-        <p:txBody>
-          <a:bodyPr wrap="square" rtlCol="0">
-            <a:spAutoFit/>
-          </a:bodyPr>
-          <a:lstStyle/>
-          <a:p>
-            <a:r>
-              <a:rPr lang="en-CH" sz="1400" dirty="0"/>
-              <a:t>Models in pickle format</a:t>
-            </a:r>
-          </a:p>
-        </p:txBody>
-      </p:sp>
-      <p:sp>
-        <p:nvSpPr>
-          <p:cNvPr id="34" name="TextBox 33">
-            <a:extLst>
-              <a:ext uri="{FF2B5EF4-FFF2-40B4-BE49-F238E27FC236}">
-                <a16:creationId xmlns:a16="http://schemas.microsoft.com/office/drawing/2014/main" id="{F8D9741A-5DFD-474E-BA61-AE22C4F3AA99}"/>
-              </a:ext>
-            </a:extLst>
-          </p:cNvPr>
-          <p:cNvSpPr txBox="1"/>
-          <p:nvPr/>
-        </p:nvSpPr>
-        <p:spPr>
-          <a:xfrm>
-            <a:off x="3541011" y="2593197"/>
-            <a:ext cx="6241816" cy="307777"/>
-          </a:xfrm>
-          <a:prstGeom prst="rect">
-            <a:avLst/>
-          </a:prstGeom>
-          <a:noFill/>
-        </p:spPr>
-        <p:txBody>
-          <a:bodyPr wrap="square" rtlCol="0">
-            <a:spAutoFit/>
-          </a:bodyPr>
-          <a:lstStyle/>
-          <a:p>
-            <a:r>
-              <a:rPr lang="en-CH" sz="1400" dirty="0"/>
-              <a:t>Main pipeline of the project (preprocessing, training, evaluation…)</a:t>
-            </a:r>
-          </a:p>
-        </p:txBody>
-      </p:sp>
-      <p:sp>
-        <p:nvSpPr>
-          <p:cNvPr id="35" name="TextBox 34">
-            <a:extLst>
-              <a:ext uri="{FF2B5EF4-FFF2-40B4-BE49-F238E27FC236}">
-                <a16:creationId xmlns:a16="http://schemas.microsoft.com/office/drawing/2014/main" id="{511EFA51-4B54-5E4A-AC01-85C9A260EA81}"/>
-              </a:ext>
-            </a:extLst>
-          </p:cNvPr>
-          <p:cNvSpPr txBox="1"/>
-          <p:nvPr/>
-        </p:nvSpPr>
-        <p:spPr>
-          <a:xfrm>
-            <a:off x="3541011" y="2868446"/>
-            <a:ext cx="6241816" cy="307777"/>
-          </a:xfrm>
-          <a:prstGeom prst="rect">
-            <a:avLst/>
-          </a:prstGeom>
-          <a:noFill/>
-        </p:spPr>
-        <p:txBody>
-          <a:bodyPr wrap="square" rtlCol="0">
-            <a:spAutoFit/>
-          </a:bodyPr>
-          <a:lstStyle/>
-          <a:p>
-            <a:r>
-              <a:rPr lang="en-CH" sz="1400" dirty="0"/>
-              <a:t>R</a:t>
-            </a:r>
-            <a:r>
-              <a:rPr lang="en-GB" sz="1400" dirty="0"/>
-              <a:t>e</a:t>
-            </a:r>
-            <a:r>
-              <a:rPr lang="en-CH" sz="1400" dirty="0"/>
-              <a:t>ports and images of the final results</a:t>
-            </a:r>
-          </a:p>
-        </p:txBody>
-      </p:sp>
-      <p:sp>
-        <p:nvSpPr>
-          <p:cNvPr id="36" name="TextBox 35">
-            <a:extLst>
-              <a:ext uri="{FF2B5EF4-FFF2-40B4-BE49-F238E27FC236}">
-                <a16:creationId xmlns:a16="http://schemas.microsoft.com/office/drawing/2014/main" id="{6CB24853-A007-0D47-AD1D-3756FC7DD547}"/>
-              </a:ext>
-            </a:extLst>
-          </p:cNvPr>
-          <p:cNvSpPr txBox="1"/>
-          <p:nvPr/>
-        </p:nvSpPr>
-        <p:spPr>
-          <a:xfrm>
-            <a:off x="3541011" y="3667902"/>
-            <a:ext cx="7118638" cy="307777"/>
-          </a:xfrm>
-          <a:prstGeom prst="rect">
-            <a:avLst/>
-          </a:prstGeom>
-          <a:noFill/>
-        </p:spPr>
-        <p:txBody>
-          <a:bodyPr wrap="square" rtlCol="0">
-            <a:spAutoFit/>
-          </a:bodyPr>
-          <a:lstStyle/>
-          <a:p>
-            <a:r>
-              <a:rPr lang="en-CH" sz="1400" dirty="0"/>
-              <a:t>Python packages which are loaded and used in the pipeline notebook to modularize the code</a:t>
-            </a:r>
-          </a:p>
-        </p:txBody>
-      </p:sp>
-      <p:sp>
-        <p:nvSpPr>
-          <p:cNvPr id="37" name="TextBox 36">
-            <a:extLst>
-              <a:ext uri="{FF2B5EF4-FFF2-40B4-BE49-F238E27FC236}">
-                <a16:creationId xmlns:a16="http://schemas.microsoft.com/office/drawing/2014/main" id="{2AC6DC68-9FD4-9C49-B7A5-989E5367F50A}"/>
-              </a:ext>
-            </a:extLst>
-          </p:cNvPr>
-          <p:cNvSpPr txBox="1"/>
-          <p:nvPr/>
-        </p:nvSpPr>
-        <p:spPr>
-          <a:xfrm>
-            <a:off x="3530722" y="4804820"/>
-            <a:ext cx="7118638" cy="307777"/>
-          </a:xfrm>
-          <a:prstGeom prst="rect">
-            <a:avLst/>
-          </a:prstGeom>
-          <a:noFill/>
-        </p:spPr>
-        <p:txBody>
-          <a:bodyPr wrap="square" rtlCol="0">
-            <a:spAutoFit/>
-          </a:bodyPr>
-          <a:lstStyle/>
-          <a:p>
-            <a:r>
-              <a:rPr lang="en-CH" sz="1400" dirty="0"/>
-              <a:t>Unit testing</a:t>
-            </a:r>
-          </a:p>
-        </p:txBody>
-      </p:sp>
-      <p:sp>
-        <p:nvSpPr>
-          <p:cNvPr id="38" name="TextBox 37">
-            <a:extLst>
-              <a:ext uri="{FF2B5EF4-FFF2-40B4-BE49-F238E27FC236}">
-                <a16:creationId xmlns:a16="http://schemas.microsoft.com/office/drawing/2014/main" id="{4643DDA1-6948-9F4E-8848-429739DB824C}"/>
-              </a:ext>
-            </a:extLst>
-          </p:cNvPr>
-          <p:cNvSpPr txBox="1"/>
-          <p:nvPr/>
-        </p:nvSpPr>
-        <p:spPr>
-          <a:xfrm>
-            <a:off x="3541011" y="5918411"/>
-            <a:ext cx="7118638" cy="307777"/>
-          </a:xfrm>
-          <a:prstGeom prst="rect">
-            <a:avLst/>
-          </a:prstGeom>
-          <a:noFill/>
-        </p:spPr>
-        <p:txBody>
-          <a:bodyPr wrap="square" rtlCol="0">
-            <a:spAutoFit/>
-          </a:bodyPr>
-          <a:lstStyle/>
-          <a:p>
-            <a:r>
-              <a:rPr lang="en-CH" sz="1400" dirty="0"/>
-              <a:t>Used to load src modules using pip install</a:t>
-            </a:r>
-          </a:p>
-        </p:txBody>
-      </p:sp>
-      <p:sp>
-        <p:nvSpPr>
-          <p:cNvPr id="39" name="TextBox 38">
-            <a:extLst>
-              <a:ext uri="{FF2B5EF4-FFF2-40B4-BE49-F238E27FC236}">
-                <a16:creationId xmlns:a16="http://schemas.microsoft.com/office/drawing/2014/main" id="{960B0DA1-0878-EE49-9599-4A84E3AF75B0}"/>
-              </a:ext>
-            </a:extLst>
-          </p:cNvPr>
-          <p:cNvSpPr txBox="1"/>
-          <p:nvPr/>
-        </p:nvSpPr>
-        <p:spPr>
-          <a:xfrm>
-            <a:off x="3541011" y="6226188"/>
-            <a:ext cx="7118638" cy="307777"/>
-          </a:xfrm>
-          <a:prstGeom prst="rect">
-            <a:avLst/>
-          </a:prstGeom>
-          <a:noFill/>
-        </p:spPr>
-        <p:txBody>
-          <a:bodyPr wrap="square" rtlCol="0">
-            <a:spAutoFit/>
-          </a:bodyPr>
-          <a:lstStyle/>
-          <a:p>
-            <a:r>
-              <a:rPr lang="en-CH" sz="1400" dirty="0"/>
-              <a:t>Script to test if the environment meets the project requirements</a:t>
-            </a:r>
-          </a:p>
-        </p:txBody>
-      </p:sp>
-    </p:spTree>
-    <p:extLst>
-      <p:ext uri="{BB962C8B-B14F-4D97-AF65-F5344CB8AC3E}">
-        <p14:creationId xmlns:p14="http://schemas.microsoft.com/office/powerpoint/2010/main" val="4150572316"/>
-      </p:ext>
-    </p:extLst>
-  </p:cSld>
-  <p:clrMapOvr>
-    <a:masterClrMapping/>
-  </p:clrMapOvr>
-</p:sld>
-</file>
-
-<file path=ppt/slides/slide6.xml><?xml version="1.0" encoding="utf-8"?>
-<p:sld xmlns:a="http://schemas.openxmlformats.org/drawingml/2006/main" xmlns:r="http://schemas.openxmlformats.org/officeDocument/2006/relationships" xmlns:p="http://schemas.openxmlformats.org/presentationml/2006/main">
-  <p:cSld>
-    <p:spTree>
-      <p:nvGrpSpPr>
-        <p:cNvPr id="1" name=""/>
-        <p:cNvGrpSpPr/>
-        <p:nvPr/>
-      </p:nvGrpSpPr>
-      <p:grpSpPr>
-        <a:xfrm>
-          <a:off x="0" y="0"/>
-          <a:ext cx="0" cy="0"/>
-          <a:chOff x="0" y="0"/>
-          <a:chExt cx="0" cy="0"/>
-        </a:xfrm>
-      </p:grpSpPr>
-      <p:sp>
-        <p:nvSpPr>
-          <p:cNvPr id="2" name="Title 1">
-            <a:extLst>
-              <a:ext uri="{FF2B5EF4-FFF2-40B4-BE49-F238E27FC236}">
-                <a16:creationId xmlns:a16="http://schemas.microsoft.com/office/drawing/2014/main" id="{CF2DE2F5-05C4-EC48-BB6A-68F63F7649E0}"/>
-              </a:ext>
-            </a:extLst>
-          </p:cNvPr>
-          <p:cNvSpPr>
-            <a:spLocks noGrp="1"/>
-          </p:cNvSpPr>
-          <p:nvPr>
-            <p:ph type="title"/>
-          </p:nvPr>
-        </p:nvSpPr>
-        <p:spPr/>
-        <p:txBody>
-          <a:bodyPr/>
-          <a:lstStyle/>
-          <a:p>
-            <a:r>
-              <a:rPr lang="en-CH" b="1" u="sng" dirty="0"/>
-              <a:t>Unit testing</a:t>
-            </a:r>
-          </a:p>
-        </p:txBody>
-      </p:sp>
-      <p:pic>
-        <p:nvPicPr>
-          <p:cNvPr id="9" name="Content Placeholder 8" descr="A screenshot of a computer&#10;&#10;Description automatically generated with medium confidence">
-            <a:extLst>
-              <a:ext uri="{FF2B5EF4-FFF2-40B4-BE49-F238E27FC236}">
-                <a16:creationId xmlns:a16="http://schemas.microsoft.com/office/drawing/2014/main" id="{3C29E91E-D24A-1D41-A81A-4013D8099322}"/>
-              </a:ext>
-            </a:extLst>
-          </p:cNvPr>
-          <p:cNvPicPr>
-            <a:picLocks noGrp="1" noChangeAspect="1"/>
-          </p:cNvPicPr>
-          <p:nvPr>
-            <p:ph idx="1"/>
-          </p:nvPr>
-        </p:nvPicPr>
-        <p:blipFill rotWithShape="1">
-          <a:blip r:embed="rId2"/>
-          <a:srcRect l="2646" r="654"/>
-          <a:stretch/>
-        </p:blipFill>
-        <p:spPr>
-          <a:xfrm>
-            <a:off x="922665" y="1491032"/>
-            <a:ext cx="3527415" cy="5001843"/>
-          </a:xfrm>
-        </p:spPr>
-      </p:pic>
-      <p:sp>
-        <p:nvSpPr>
-          <p:cNvPr id="10" name="Content Placeholder 2">
-            <a:extLst>
-              <a:ext uri="{FF2B5EF4-FFF2-40B4-BE49-F238E27FC236}">
-                <a16:creationId xmlns:a16="http://schemas.microsoft.com/office/drawing/2014/main" id="{4DD26E11-6A91-1B4E-8646-871310983A02}"/>
-              </a:ext>
-            </a:extLst>
-          </p:cNvPr>
-          <p:cNvSpPr txBox="1">
-            <a:spLocks/>
-          </p:cNvSpPr>
-          <p:nvPr/>
-        </p:nvSpPr>
-        <p:spPr>
-          <a:xfrm>
-            <a:off x="5095581" y="1491032"/>
-            <a:ext cx="6667794" cy="4375150"/>
+            <a:off x="5094514" y="1608908"/>
+            <a:ext cx="6668861" cy="4147535"/>
           </a:xfrm>
           <a:prstGeom prst="rect">
             <a:avLst/>
@@ -4957,27 +3698,1984 @@
           <a:p>
             <a:r>
               <a:rPr lang="en-CH" dirty="0"/>
-              <a:t>The Unittest runner is used but we plan to switch to Pytest. </a:t>
+              <a:t>A file named ”test_environment.py” is executed to check the basic python requirements. </a:t>
             </a:r>
           </a:p>
           <a:p>
             <a:r>
               <a:rPr lang="en-CH" dirty="0"/>
-              <a:t>One class of tests per module. </a:t>
-            </a:r>
-          </a:p>
-          <a:p>
+              <a:t>T</a:t>
+            </a:r>
+            <a:r>
+              <a:rPr lang="en-GB" dirty="0"/>
+              <a:t>h</a:t>
+            </a:r>
             <a:r>
               <a:rPr lang="en-CH" dirty="0"/>
-              <a:t>Each class contains many tests aiming to cover 100% of the code. </a:t>
-            </a:r>
-          </a:p>
-        </p:txBody>
-      </p:sp>
+              <a:t>e project and its dependencies are deployed using pip with a requirements.txt file. </a:t>
+            </a:r>
+          </a:p>
+          <a:p>
+            <a:r>
+              <a:rPr lang="en-CH" dirty="0"/>
+              <a:t>The tests must be run to ensure the full project functionalities. </a:t>
+            </a:r>
+          </a:p>
+          <a:p>
+            <a:endParaRPr lang="en-CH" dirty="0"/>
+          </a:p>
+        </p:txBody>
+      </p:sp>
+      <p:pic>
+        <p:nvPicPr>
+          <p:cNvPr id="5" name="Picture 4" descr="Text&#10;&#10;Description automatically generated">
+            <a:extLst>
+              <a:ext uri="{FF2B5EF4-FFF2-40B4-BE49-F238E27FC236}">
+                <a16:creationId xmlns:a16="http://schemas.microsoft.com/office/drawing/2014/main" id="{B92AFF09-5DFB-A447-84DD-B72803E0D26E}"/>
+              </a:ext>
+            </a:extLst>
+          </p:cNvPr>
+          <p:cNvPicPr>
+            <a:picLocks noChangeAspect="1"/>
+          </p:cNvPicPr>
+          <p:nvPr/>
+        </p:nvPicPr>
+        <p:blipFill>
+          <a:blip r:embed="rId2"/>
+          <a:stretch>
+            <a:fillRect/>
+          </a:stretch>
+        </p:blipFill>
+        <p:spPr>
+          <a:xfrm>
+            <a:off x="935809" y="1525089"/>
+            <a:ext cx="3365060" cy="3125289"/>
+          </a:xfrm>
+          <a:prstGeom prst="rect">
+            <a:avLst/>
+          </a:prstGeom>
+        </p:spPr>
+      </p:pic>
     </p:spTree>
     <p:extLst>
       <p:ext uri="{BB962C8B-B14F-4D97-AF65-F5344CB8AC3E}">
-        <p14:creationId xmlns:p14="http://schemas.microsoft.com/office/powerpoint/2010/main" val="3994066588"/>
+        <p14:creationId xmlns:p14="http://schemas.microsoft.com/office/powerpoint/2010/main" val="2891001310"/>
+      </p:ext>
+    </p:extLst>
+  </p:cSld>
+  <p:clrMapOvr>
+    <a:masterClrMapping/>
+  </p:clrMapOvr>
+</p:sld>
+</file>
+
+<file path=ppt/slides/slide11.xml><?xml version="1.0" encoding="utf-8"?>
+<p:sld xmlns:a="http://schemas.openxmlformats.org/drawingml/2006/main" xmlns:r="http://schemas.openxmlformats.org/officeDocument/2006/relationships" xmlns:p="http://schemas.openxmlformats.org/presentationml/2006/main">
+  <p:cSld>
+    <p:spTree>
+      <p:nvGrpSpPr>
+        <p:cNvPr id="1" name=""/>
+        <p:cNvGrpSpPr/>
+        <p:nvPr/>
+      </p:nvGrpSpPr>
+      <p:grpSpPr>
+        <a:xfrm>
+          <a:off x="0" y="0"/>
+          <a:ext cx="0" cy="0"/>
+          <a:chOff x="0" y="0"/>
+          <a:chExt cx="0" cy="0"/>
+        </a:xfrm>
+      </p:grpSpPr>
+      <p:sp>
+        <p:nvSpPr>
+          <p:cNvPr id="2" name="Title 1">
+            <a:extLst>
+              <a:ext uri="{FF2B5EF4-FFF2-40B4-BE49-F238E27FC236}">
+                <a16:creationId xmlns:a16="http://schemas.microsoft.com/office/drawing/2014/main" id="{CF2DE2F5-05C4-EC48-BB6A-68F63F7649E0}"/>
+              </a:ext>
+            </a:extLst>
+          </p:cNvPr>
+          <p:cNvSpPr>
+            <a:spLocks noGrp="1"/>
+          </p:cNvSpPr>
+          <p:nvPr>
+            <p:ph type="title"/>
+          </p:nvPr>
+        </p:nvSpPr>
+        <p:spPr/>
+        <p:txBody>
+          <a:bodyPr/>
+          <a:lstStyle/>
+          <a:p>
+            <a:r>
+              <a:rPr lang="en-CH" b="1" u="sng" dirty="0"/>
+              <a:t>Conclusions and results</a:t>
+            </a:r>
+          </a:p>
+        </p:txBody>
+      </p:sp>
+      <p:sp>
+        <p:nvSpPr>
+          <p:cNvPr id="10" name="Content Placeholder 2">
+            <a:extLst>
+              <a:ext uri="{FF2B5EF4-FFF2-40B4-BE49-F238E27FC236}">
+                <a16:creationId xmlns:a16="http://schemas.microsoft.com/office/drawing/2014/main" id="{4DD26E11-6A91-1B4E-8646-871310983A02}"/>
+              </a:ext>
+            </a:extLst>
+          </p:cNvPr>
+          <p:cNvSpPr txBox="1">
+            <a:spLocks/>
+          </p:cNvSpPr>
+          <p:nvPr/>
+        </p:nvSpPr>
+        <p:spPr>
+          <a:xfrm>
+            <a:off x="959395" y="3794760"/>
+            <a:ext cx="10788468" cy="4147535"/>
+          </a:xfrm>
+          <a:prstGeom prst="rect">
+            <a:avLst/>
+          </a:prstGeom>
+        </p:spPr>
+        <p:txBody>
+          <a:bodyPr vert="horz" lIns="91440" tIns="45720" rIns="91440" bIns="45720" rtlCol="0">
+            <a:normAutofit/>
+          </a:bodyPr>
+          <a:lstStyle>
+            <a:lvl1pPr marL="228600" indent="-228600" algn="l" defTabSz="914400" rtl="0" eaLnBrk="1" latinLnBrk="0" hangingPunct="1">
+              <a:lnSpc>
+                <a:spcPct val="90000"/>
+              </a:lnSpc>
+              <a:spcBef>
+                <a:spcPts val="1000"/>
+              </a:spcBef>
+              <a:buFont typeface="Arial" panose="020B0604020202020204" pitchFamily="34" charset="0"/>
+              <a:buChar char="•"/>
+              <a:defRPr sz="2800" kern="1200">
+                <a:solidFill>
+                  <a:schemeClr val="tx1"/>
+                </a:solidFill>
+                <a:latin typeface="+mn-lt"/>
+                <a:ea typeface="+mn-ea"/>
+                <a:cs typeface="+mn-cs"/>
+              </a:defRPr>
+            </a:lvl1pPr>
+            <a:lvl2pPr marL="685800" indent="-228600" algn="l" defTabSz="914400" rtl="0" eaLnBrk="1" latinLnBrk="0" hangingPunct="1">
+              <a:lnSpc>
+                <a:spcPct val="90000"/>
+              </a:lnSpc>
+              <a:spcBef>
+                <a:spcPts val="500"/>
+              </a:spcBef>
+              <a:buFont typeface="Arial" panose="020B0604020202020204" pitchFamily="34" charset="0"/>
+              <a:buChar char="•"/>
+              <a:defRPr sz="2400" kern="1200">
+                <a:solidFill>
+                  <a:schemeClr val="tx1"/>
+                </a:solidFill>
+                <a:latin typeface="+mn-lt"/>
+                <a:ea typeface="+mn-ea"/>
+                <a:cs typeface="+mn-cs"/>
+              </a:defRPr>
+            </a:lvl2pPr>
+            <a:lvl3pPr marL="1143000" indent="-228600" algn="l" defTabSz="914400" rtl="0" eaLnBrk="1" latinLnBrk="0" hangingPunct="1">
+              <a:lnSpc>
+                <a:spcPct val="90000"/>
+              </a:lnSpc>
+              <a:spcBef>
+                <a:spcPts val="500"/>
+              </a:spcBef>
+              <a:buFont typeface="Arial" panose="020B0604020202020204" pitchFamily="34" charset="0"/>
+              <a:buChar char="•"/>
+              <a:defRPr sz="2000" kern="1200">
+                <a:solidFill>
+                  <a:schemeClr val="tx1"/>
+                </a:solidFill>
+                <a:latin typeface="+mn-lt"/>
+                <a:ea typeface="+mn-ea"/>
+                <a:cs typeface="+mn-cs"/>
+              </a:defRPr>
+            </a:lvl3pPr>
+            <a:lvl4pPr marL="1600200" indent="-228600" algn="l" defTabSz="914400" rtl="0" eaLnBrk="1" latinLnBrk="0" hangingPunct="1">
+              <a:lnSpc>
+                <a:spcPct val="90000"/>
+              </a:lnSpc>
+              <a:spcBef>
+                <a:spcPts val="500"/>
+              </a:spcBef>
+              <a:buFont typeface="Arial" panose="020B0604020202020204" pitchFamily="34" charset="0"/>
+              <a:buChar char="•"/>
+              <a:defRPr sz="1800" kern="1200">
+                <a:solidFill>
+                  <a:schemeClr val="tx1"/>
+                </a:solidFill>
+                <a:latin typeface="+mn-lt"/>
+                <a:ea typeface="+mn-ea"/>
+                <a:cs typeface="+mn-cs"/>
+              </a:defRPr>
+            </a:lvl4pPr>
+            <a:lvl5pPr marL="2057400" indent="-228600" algn="l" defTabSz="914400" rtl="0" eaLnBrk="1" latinLnBrk="0" hangingPunct="1">
+              <a:lnSpc>
+                <a:spcPct val="90000"/>
+              </a:lnSpc>
+              <a:spcBef>
+                <a:spcPts val="500"/>
+              </a:spcBef>
+              <a:buFont typeface="Arial" panose="020B0604020202020204" pitchFamily="34" charset="0"/>
+              <a:buChar char="•"/>
+              <a:defRPr sz="1800" kern="1200">
+                <a:solidFill>
+                  <a:schemeClr val="tx1"/>
+                </a:solidFill>
+                <a:latin typeface="+mn-lt"/>
+                <a:ea typeface="+mn-ea"/>
+                <a:cs typeface="+mn-cs"/>
+              </a:defRPr>
+            </a:lvl5pPr>
+            <a:lvl6pPr marL="2514600" indent="-228600" algn="l" defTabSz="914400" rtl="0" eaLnBrk="1" latinLnBrk="0" hangingPunct="1">
+              <a:lnSpc>
+                <a:spcPct val="90000"/>
+              </a:lnSpc>
+              <a:spcBef>
+                <a:spcPts val="500"/>
+              </a:spcBef>
+              <a:buFont typeface="Arial" panose="020B0604020202020204" pitchFamily="34" charset="0"/>
+              <a:buChar char="•"/>
+              <a:defRPr sz="1800" kern="1200">
+                <a:solidFill>
+                  <a:schemeClr val="tx1"/>
+                </a:solidFill>
+                <a:latin typeface="+mn-lt"/>
+                <a:ea typeface="+mn-ea"/>
+                <a:cs typeface="+mn-cs"/>
+              </a:defRPr>
+            </a:lvl6pPr>
+            <a:lvl7pPr marL="2971800" indent="-228600" algn="l" defTabSz="914400" rtl="0" eaLnBrk="1" latinLnBrk="0" hangingPunct="1">
+              <a:lnSpc>
+                <a:spcPct val="90000"/>
+              </a:lnSpc>
+              <a:spcBef>
+                <a:spcPts val="500"/>
+              </a:spcBef>
+              <a:buFont typeface="Arial" panose="020B0604020202020204" pitchFamily="34" charset="0"/>
+              <a:buChar char="•"/>
+              <a:defRPr sz="1800" kern="1200">
+                <a:solidFill>
+                  <a:schemeClr val="tx1"/>
+                </a:solidFill>
+                <a:latin typeface="+mn-lt"/>
+                <a:ea typeface="+mn-ea"/>
+                <a:cs typeface="+mn-cs"/>
+              </a:defRPr>
+            </a:lvl7pPr>
+            <a:lvl8pPr marL="3429000" indent="-228600" algn="l" defTabSz="914400" rtl="0" eaLnBrk="1" latinLnBrk="0" hangingPunct="1">
+              <a:lnSpc>
+                <a:spcPct val="90000"/>
+              </a:lnSpc>
+              <a:spcBef>
+                <a:spcPts val="500"/>
+              </a:spcBef>
+              <a:buFont typeface="Arial" panose="020B0604020202020204" pitchFamily="34" charset="0"/>
+              <a:buChar char="•"/>
+              <a:defRPr sz="1800" kern="1200">
+                <a:solidFill>
+                  <a:schemeClr val="tx1"/>
+                </a:solidFill>
+                <a:latin typeface="+mn-lt"/>
+                <a:ea typeface="+mn-ea"/>
+                <a:cs typeface="+mn-cs"/>
+              </a:defRPr>
+            </a:lvl8pPr>
+            <a:lvl9pPr marL="3886200" indent="-228600" algn="l" defTabSz="914400" rtl="0" eaLnBrk="1" latinLnBrk="0" hangingPunct="1">
+              <a:lnSpc>
+                <a:spcPct val="90000"/>
+              </a:lnSpc>
+              <a:spcBef>
+                <a:spcPts val="500"/>
+              </a:spcBef>
+              <a:buFont typeface="Arial" panose="020B0604020202020204" pitchFamily="34" charset="0"/>
+              <a:buChar char="•"/>
+              <a:defRPr sz="1800" kern="1200">
+                <a:solidFill>
+                  <a:schemeClr val="tx1"/>
+                </a:solidFill>
+                <a:latin typeface="+mn-lt"/>
+                <a:ea typeface="+mn-ea"/>
+                <a:cs typeface="+mn-cs"/>
+              </a:defRPr>
+            </a:lvl9pPr>
+          </a:lstStyle>
+          <a:p>
+            <a:r>
+              <a:rPr lang="fr-CH" dirty="0"/>
+              <a:t>On a test set </a:t>
+            </a:r>
+            <a:r>
+              <a:rPr lang="fr-CH" dirty="0" err="1"/>
+              <a:t>with</a:t>
+            </a:r>
+            <a:r>
+              <a:rPr lang="fr-CH" dirty="0"/>
+              <a:t> 20% of the total </a:t>
+            </a:r>
+            <a:r>
+              <a:rPr lang="fr-CH" dirty="0" err="1"/>
+              <a:t>samples</a:t>
+            </a:r>
+            <a:r>
+              <a:rPr lang="fr-CH" dirty="0"/>
+              <a:t>, </a:t>
+            </a:r>
+            <a:r>
+              <a:rPr lang="fr-CH" dirty="0" err="1"/>
+              <a:t>we</a:t>
+            </a:r>
+            <a:r>
+              <a:rPr lang="fr-CH" dirty="0"/>
+              <a:t> </a:t>
+            </a:r>
+            <a:r>
+              <a:rPr lang="fr-CH" dirty="0" err="1"/>
+              <a:t>achieve</a:t>
+            </a:r>
+            <a:r>
+              <a:rPr lang="fr-CH" dirty="0"/>
+              <a:t> a final </a:t>
+            </a:r>
+            <a:r>
+              <a:rPr lang="fr-CH" dirty="0" err="1"/>
+              <a:t>accuracy</a:t>
+            </a:r>
+            <a:r>
+              <a:rPr lang="fr-CH" dirty="0"/>
+              <a:t> of 0.9999%. </a:t>
+            </a:r>
+          </a:p>
+          <a:p>
+            <a:r>
+              <a:rPr lang="fr-CH" b="1" dirty="0"/>
+              <a:t>The initial </a:t>
+            </a:r>
+            <a:r>
+              <a:rPr lang="fr-CH" b="1" dirty="0" err="1"/>
+              <a:t>hypothesis</a:t>
+            </a:r>
+            <a:r>
+              <a:rPr lang="fr-CH" b="1" dirty="0"/>
+              <a:t> </a:t>
+            </a:r>
+            <a:r>
+              <a:rPr lang="fr-CH" b="1" dirty="0" err="1"/>
+              <a:t>is</a:t>
+            </a:r>
+            <a:r>
+              <a:rPr lang="fr-CH" b="1" dirty="0"/>
+              <a:t> </a:t>
+            </a:r>
+            <a:r>
+              <a:rPr lang="fr-CH" b="1" dirty="0" err="1"/>
+              <a:t>thus</a:t>
+            </a:r>
+            <a:r>
+              <a:rPr lang="fr-CH" b="1" dirty="0"/>
+              <a:t> </a:t>
+            </a:r>
+            <a:r>
+              <a:rPr lang="fr-CH" b="1" dirty="0" err="1"/>
+              <a:t>verified</a:t>
+            </a:r>
+            <a:r>
+              <a:rPr lang="fr-CH" b="1" dirty="0"/>
+              <a:t>. </a:t>
+            </a:r>
+            <a:endParaRPr lang="en-CH" b="1" dirty="0"/>
+          </a:p>
+          <a:p>
+            <a:endParaRPr lang="en-CH" dirty="0"/>
+          </a:p>
+        </p:txBody>
+      </p:sp>
+      <p:pic>
+        <p:nvPicPr>
+          <p:cNvPr id="4" name="Picture 3" descr="Graphical user interface, text, application, chat or text message&#10;&#10;Description automatically generated">
+            <a:extLst>
+              <a:ext uri="{FF2B5EF4-FFF2-40B4-BE49-F238E27FC236}">
+                <a16:creationId xmlns:a16="http://schemas.microsoft.com/office/drawing/2014/main" id="{054F69D7-401C-7B40-B476-40CFDBF85D98}"/>
+              </a:ext>
+            </a:extLst>
+          </p:cNvPr>
+          <p:cNvPicPr>
+            <a:picLocks noChangeAspect="1"/>
+          </p:cNvPicPr>
+          <p:nvPr/>
+        </p:nvPicPr>
+        <p:blipFill>
+          <a:blip r:embed="rId2"/>
+          <a:stretch>
+            <a:fillRect/>
+          </a:stretch>
+        </p:blipFill>
+        <p:spPr>
+          <a:xfrm>
+            <a:off x="3688806" y="1760356"/>
+            <a:ext cx="4814388" cy="1499025"/>
+          </a:xfrm>
+          <a:prstGeom prst="rect">
+            <a:avLst/>
+          </a:prstGeom>
+        </p:spPr>
+      </p:pic>
+    </p:spTree>
+    <p:extLst>
+      <p:ext uri="{BB962C8B-B14F-4D97-AF65-F5344CB8AC3E}">
+        <p14:creationId xmlns:p14="http://schemas.microsoft.com/office/powerpoint/2010/main" val="3370513905"/>
+      </p:ext>
+    </p:extLst>
+  </p:cSld>
+  <p:clrMapOvr>
+    <a:masterClrMapping/>
+  </p:clrMapOvr>
+</p:sld>
+</file>
+
+<file path=ppt/slides/slide2.xml><?xml version="1.0" encoding="utf-8"?>
+<p:sld xmlns:a="http://schemas.openxmlformats.org/drawingml/2006/main" xmlns:r="http://schemas.openxmlformats.org/officeDocument/2006/relationships" xmlns:p="http://schemas.openxmlformats.org/presentationml/2006/main">
+  <p:cSld>
+    <p:spTree>
+      <p:nvGrpSpPr>
+        <p:cNvPr id="1" name=""/>
+        <p:cNvGrpSpPr/>
+        <p:nvPr/>
+      </p:nvGrpSpPr>
+      <p:grpSpPr>
+        <a:xfrm>
+          <a:off x="0" y="0"/>
+          <a:ext cx="0" cy="0"/>
+          <a:chOff x="0" y="0"/>
+          <a:chExt cx="0" cy="0"/>
+        </a:xfrm>
+      </p:grpSpPr>
+      <p:sp>
+        <p:nvSpPr>
+          <p:cNvPr id="2" name="Title 1">
+            <a:extLst>
+              <a:ext uri="{FF2B5EF4-FFF2-40B4-BE49-F238E27FC236}">
+                <a16:creationId xmlns:a16="http://schemas.microsoft.com/office/drawing/2014/main" id="{5E611BD4-B398-264E-A636-02CFA2E667A0}"/>
+              </a:ext>
+            </a:extLst>
+          </p:cNvPr>
+          <p:cNvSpPr>
+            <a:spLocks noGrp="1"/>
+          </p:cNvSpPr>
+          <p:nvPr>
+            <p:ph type="title"/>
+          </p:nvPr>
+        </p:nvSpPr>
+        <p:spPr/>
+        <p:txBody>
+          <a:bodyPr/>
+          <a:lstStyle/>
+          <a:p>
+            <a:r>
+              <a:rPr lang="en-CH" b="1" u="sng" dirty="0"/>
+              <a:t>The dataset</a:t>
+            </a:r>
+          </a:p>
+        </p:txBody>
+      </p:sp>
+      <p:sp>
+        <p:nvSpPr>
+          <p:cNvPr id="3" name="Content Placeholder 2">
+            <a:extLst>
+              <a:ext uri="{FF2B5EF4-FFF2-40B4-BE49-F238E27FC236}">
+                <a16:creationId xmlns:a16="http://schemas.microsoft.com/office/drawing/2014/main" id="{B1C4BA70-3407-C945-9CD3-B60899BC85D6}"/>
+              </a:ext>
+            </a:extLst>
+          </p:cNvPr>
+          <p:cNvSpPr>
+            <a:spLocks noGrp="1"/>
+          </p:cNvSpPr>
+          <p:nvPr>
+            <p:ph idx="1"/>
+          </p:nvPr>
+        </p:nvSpPr>
+        <p:spPr/>
+        <p:txBody>
+          <a:bodyPr>
+            <a:normAutofit fontScale="92500"/>
+          </a:bodyPr>
+          <a:lstStyle/>
+          <a:p>
+            <a:r>
+              <a:rPr lang="en-CH" dirty="0"/>
+              <a:t>KDD Cup 1999 dataset.</a:t>
+            </a:r>
+          </a:p>
+          <a:p>
+            <a:r>
+              <a:rPr lang="en-GB" dirty="0"/>
+              <a:t>Used for the Third International Knowledge Discovery and Data Mining Tools Competition in 1999. </a:t>
+            </a:r>
+          </a:p>
+          <a:p>
+            <a:r>
+              <a:rPr lang="en-GB" dirty="0"/>
+              <a:t>The dataset contains approximately </a:t>
+            </a:r>
+            <a:r>
+              <a:rPr lang="fr-CH" dirty="0"/>
+              <a:t>5 millions of </a:t>
+            </a:r>
+            <a:r>
+              <a:rPr lang="fr-CH" dirty="0" err="1"/>
+              <a:t>samples</a:t>
+            </a:r>
+            <a:r>
+              <a:rPr lang="fr-CH" dirty="0"/>
+              <a:t> </a:t>
+            </a:r>
+            <a:r>
+              <a:rPr lang="en-GB" dirty="0"/>
+              <a:t>representing network connections. </a:t>
+            </a:r>
+          </a:p>
+          <a:p>
+            <a:r>
+              <a:rPr lang="en-GB" dirty="0"/>
+              <a:t>Each sample is made of 41 features that can be used to predict the correct label. </a:t>
+            </a:r>
+          </a:p>
+          <a:p>
+            <a:r>
+              <a:rPr lang="en-GB" dirty="0"/>
+              <a:t>There are 23 different labels (normal, </a:t>
+            </a:r>
+            <a:r>
+              <a:rPr lang="en-GB" dirty="0" err="1"/>
+              <a:t>netptune</a:t>
+            </a:r>
+            <a:r>
+              <a:rPr lang="en-GB" dirty="0"/>
+              <a:t> attack, </a:t>
+            </a:r>
+            <a:r>
+              <a:rPr lang="en-GB" dirty="0" err="1"/>
+              <a:t>satan</a:t>
+            </a:r>
+            <a:r>
+              <a:rPr lang="en-GB" dirty="0"/>
+              <a:t> attack…). </a:t>
+            </a:r>
+          </a:p>
+          <a:p>
+            <a:r>
+              <a:rPr lang="en-GB" dirty="0"/>
+              <a:t>For more information: </a:t>
+            </a:r>
+            <a:r>
+              <a:rPr lang="en-GB" dirty="0">
+                <a:hlinkClick r:id="rId2"/>
+              </a:rPr>
+              <a:t>http://kdd.ics.uci.edu/databases/kddcup99/task.html</a:t>
+            </a:r>
+            <a:endParaRPr lang="en-GB" dirty="0"/>
+          </a:p>
+          <a:p>
+            <a:endParaRPr lang="en-CH" dirty="0"/>
+          </a:p>
+        </p:txBody>
+      </p:sp>
+    </p:spTree>
+    <p:extLst>
+      <p:ext uri="{BB962C8B-B14F-4D97-AF65-F5344CB8AC3E}">
+        <p14:creationId xmlns:p14="http://schemas.microsoft.com/office/powerpoint/2010/main" val="1144509280"/>
+      </p:ext>
+    </p:extLst>
+  </p:cSld>
+  <p:clrMapOvr>
+    <a:masterClrMapping/>
+  </p:clrMapOvr>
+</p:sld>
+</file>
+
+<file path=ppt/slides/slide3.xml><?xml version="1.0" encoding="utf-8"?>
+<p:sld xmlns:a="http://schemas.openxmlformats.org/drawingml/2006/main" xmlns:r="http://schemas.openxmlformats.org/officeDocument/2006/relationships" xmlns:p="http://schemas.openxmlformats.org/presentationml/2006/main">
+  <p:cSld>
+    <p:spTree>
+      <p:nvGrpSpPr>
+        <p:cNvPr id="1" name=""/>
+        <p:cNvGrpSpPr/>
+        <p:nvPr/>
+      </p:nvGrpSpPr>
+      <p:grpSpPr>
+        <a:xfrm>
+          <a:off x="0" y="0"/>
+          <a:ext cx="0" cy="0"/>
+          <a:chOff x="0" y="0"/>
+          <a:chExt cx="0" cy="0"/>
+        </a:xfrm>
+      </p:grpSpPr>
+      <p:sp>
+        <p:nvSpPr>
+          <p:cNvPr id="2" name="Title 1">
+            <a:extLst>
+              <a:ext uri="{FF2B5EF4-FFF2-40B4-BE49-F238E27FC236}">
+                <a16:creationId xmlns:a16="http://schemas.microsoft.com/office/drawing/2014/main" id="{73B34BCB-1FC3-D442-BF89-B69D3E2092FB}"/>
+              </a:ext>
+            </a:extLst>
+          </p:cNvPr>
+          <p:cNvSpPr>
+            <a:spLocks noGrp="1"/>
+          </p:cNvSpPr>
+          <p:nvPr>
+            <p:ph type="title"/>
+          </p:nvPr>
+        </p:nvSpPr>
+        <p:spPr/>
+        <p:txBody>
+          <a:bodyPr/>
+          <a:lstStyle/>
+          <a:p>
+            <a:r>
+              <a:rPr lang="en-CH" b="1" u="sng" dirty="0"/>
+              <a:t>The hypothesis</a:t>
+            </a:r>
+          </a:p>
+        </p:txBody>
+      </p:sp>
+      <p:sp>
+        <p:nvSpPr>
+          <p:cNvPr id="3" name="Content Placeholder 2">
+            <a:extLst>
+              <a:ext uri="{FF2B5EF4-FFF2-40B4-BE49-F238E27FC236}">
+                <a16:creationId xmlns:a16="http://schemas.microsoft.com/office/drawing/2014/main" id="{1DF4698C-3A39-EA45-8D8D-7B3220F82C70}"/>
+              </a:ext>
+            </a:extLst>
+          </p:cNvPr>
+          <p:cNvSpPr>
+            <a:spLocks noGrp="1"/>
+          </p:cNvSpPr>
+          <p:nvPr>
+            <p:ph idx="1"/>
+          </p:nvPr>
+        </p:nvSpPr>
+        <p:spPr>
+          <a:xfrm>
+            <a:off x="838200" y="1825625"/>
+            <a:ext cx="10515600" cy="3854928"/>
+          </a:xfrm>
+        </p:spPr>
+        <p:txBody>
+          <a:bodyPr>
+            <a:normAutofit fontScale="92500" lnSpcReduction="20000"/>
+          </a:bodyPr>
+          <a:lstStyle/>
+          <a:p>
+            <a:pPr marL="0" indent="0">
+              <a:buNone/>
+            </a:pPr>
+            <a:r>
+              <a:rPr lang="en-CH" dirty="0"/>
+              <a:t>Statements: </a:t>
+            </a:r>
+          </a:p>
+          <a:p>
+            <a:r>
+              <a:rPr lang="en-CH" dirty="0"/>
+              <a:t>In the 23 labels, 1 label is representing a normal connection and 22 a type of network attack. </a:t>
+            </a:r>
+          </a:p>
+          <a:p>
+            <a:r>
+              <a:rPr lang="en-CH" dirty="0"/>
+              <a:t>The normal connections represent 20% of the samples of the whole set. </a:t>
+            </a:r>
+          </a:p>
+          <a:p>
+            <a:r>
+              <a:rPr lang="en-CH" dirty="0"/>
+              <a:t>We believe it is possible to classify those connections using the 41 features available. </a:t>
+            </a:r>
+          </a:p>
+          <a:p>
+            <a:pPr marL="0" indent="0">
+              <a:buNone/>
+            </a:pPr>
+            <a:endParaRPr lang="en-CH" b="1" dirty="0"/>
+          </a:p>
+          <a:p>
+            <a:pPr marL="0" indent="0">
+              <a:buNone/>
+            </a:pPr>
+            <a:r>
+              <a:rPr lang="en-CH" dirty="0"/>
+              <a:t>Hypothesis: </a:t>
+            </a:r>
+            <a:endParaRPr lang="en-CH" b="1" dirty="0"/>
+          </a:p>
+          <a:p>
+            <a:pPr marL="0" indent="0">
+              <a:buNone/>
+            </a:pPr>
+            <a:r>
+              <a:rPr lang="en-CH" b="1" dirty="0"/>
+              <a:t>“We can achieve a good classification accuracy (&gt; 90% on the test set) in classifying the network connections into the correct labels.” </a:t>
+            </a:r>
+          </a:p>
+        </p:txBody>
+      </p:sp>
+    </p:spTree>
+    <p:extLst>
+      <p:ext uri="{BB962C8B-B14F-4D97-AF65-F5344CB8AC3E}">
+        <p14:creationId xmlns:p14="http://schemas.microsoft.com/office/powerpoint/2010/main" val="1697104218"/>
+      </p:ext>
+    </p:extLst>
+  </p:cSld>
+  <p:clrMapOvr>
+    <a:masterClrMapping/>
+  </p:clrMapOvr>
+</p:sld>
+</file>
+
+<file path=ppt/slides/slide4.xml><?xml version="1.0" encoding="utf-8"?>
+<p:sld xmlns:a="http://schemas.openxmlformats.org/drawingml/2006/main" xmlns:r="http://schemas.openxmlformats.org/officeDocument/2006/relationships" xmlns:p="http://schemas.openxmlformats.org/presentationml/2006/main">
+  <p:cSld>
+    <p:spTree>
+      <p:nvGrpSpPr>
+        <p:cNvPr id="1" name=""/>
+        <p:cNvGrpSpPr/>
+        <p:nvPr/>
+      </p:nvGrpSpPr>
+      <p:grpSpPr>
+        <a:xfrm>
+          <a:off x="0" y="0"/>
+          <a:ext cx="0" cy="0"/>
+          <a:chOff x="0" y="0"/>
+          <a:chExt cx="0" cy="0"/>
+        </a:xfrm>
+      </p:grpSpPr>
+      <p:sp>
+        <p:nvSpPr>
+          <p:cNvPr id="2" name="Title 1">
+            <a:extLst>
+              <a:ext uri="{FF2B5EF4-FFF2-40B4-BE49-F238E27FC236}">
+                <a16:creationId xmlns:a16="http://schemas.microsoft.com/office/drawing/2014/main" id="{92482DA4-79F1-5A4A-A8E4-CC5BE4EFF066}"/>
+              </a:ext>
+            </a:extLst>
+          </p:cNvPr>
+          <p:cNvSpPr>
+            <a:spLocks noGrp="1"/>
+          </p:cNvSpPr>
+          <p:nvPr>
+            <p:ph type="title"/>
+          </p:nvPr>
+        </p:nvSpPr>
+        <p:spPr/>
+        <p:txBody>
+          <a:bodyPr/>
+          <a:lstStyle/>
+          <a:p>
+            <a:r>
+              <a:rPr lang="en-CH" b="1" u="sng" dirty="0"/>
+              <a:t>Framework organization</a:t>
+            </a:r>
+          </a:p>
+        </p:txBody>
+      </p:sp>
+      <p:pic>
+        <p:nvPicPr>
+          <p:cNvPr id="4" name="Picture 3" descr="Text&#10;&#10;Description automatically generated">
+            <a:extLst>
+              <a:ext uri="{FF2B5EF4-FFF2-40B4-BE49-F238E27FC236}">
+                <a16:creationId xmlns:a16="http://schemas.microsoft.com/office/drawing/2014/main" id="{23C96291-C05D-0A4D-885A-00C9AA36DC6C}"/>
+              </a:ext>
+            </a:extLst>
+          </p:cNvPr>
+          <p:cNvPicPr>
+            <a:picLocks noChangeAspect="1"/>
+          </p:cNvPicPr>
+          <p:nvPr/>
+        </p:nvPicPr>
+        <p:blipFill>
+          <a:blip r:embed="rId2"/>
+          <a:stretch>
+            <a:fillRect/>
+          </a:stretch>
+        </p:blipFill>
+        <p:spPr>
+          <a:xfrm>
+            <a:off x="1047549" y="1690688"/>
+            <a:ext cx="10096901" cy="4937837"/>
+          </a:xfrm>
+          <a:prstGeom prst="rect">
+            <a:avLst/>
+          </a:prstGeom>
+        </p:spPr>
+      </p:pic>
+    </p:spTree>
+    <p:extLst>
+      <p:ext uri="{BB962C8B-B14F-4D97-AF65-F5344CB8AC3E}">
+        <p14:creationId xmlns:p14="http://schemas.microsoft.com/office/powerpoint/2010/main" val="627469460"/>
+      </p:ext>
+    </p:extLst>
+  </p:cSld>
+  <p:clrMapOvr>
+    <a:masterClrMapping/>
+  </p:clrMapOvr>
+</p:sld>
+</file>
+
+<file path=ppt/slides/slide5.xml><?xml version="1.0" encoding="utf-8"?>
+<p:sld xmlns:a="http://schemas.openxmlformats.org/drawingml/2006/main" xmlns:r="http://schemas.openxmlformats.org/officeDocument/2006/relationships" xmlns:p="http://schemas.openxmlformats.org/presentationml/2006/main">
+  <p:cSld>
+    <p:spTree>
+      <p:nvGrpSpPr>
+        <p:cNvPr id="1" name=""/>
+        <p:cNvGrpSpPr/>
+        <p:nvPr/>
+      </p:nvGrpSpPr>
+      <p:grpSpPr>
+        <a:xfrm>
+          <a:off x="0" y="0"/>
+          <a:ext cx="0" cy="0"/>
+          <a:chOff x="0" y="0"/>
+          <a:chExt cx="0" cy="0"/>
+        </a:xfrm>
+      </p:grpSpPr>
+      <p:sp>
+        <p:nvSpPr>
+          <p:cNvPr id="2" name="Title 1">
+            <a:extLst>
+              <a:ext uri="{FF2B5EF4-FFF2-40B4-BE49-F238E27FC236}">
+                <a16:creationId xmlns:a16="http://schemas.microsoft.com/office/drawing/2014/main" id="{92482DA4-79F1-5A4A-A8E4-CC5BE4EFF066}"/>
+              </a:ext>
+            </a:extLst>
+          </p:cNvPr>
+          <p:cNvSpPr>
+            <a:spLocks noGrp="1"/>
+          </p:cNvSpPr>
+          <p:nvPr>
+            <p:ph type="title"/>
+          </p:nvPr>
+        </p:nvSpPr>
+        <p:spPr>
+          <a:xfrm>
+            <a:off x="838200" y="365125"/>
+            <a:ext cx="10515600" cy="1325563"/>
+          </a:xfrm>
+        </p:spPr>
+        <p:txBody>
+          <a:bodyPr/>
+          <a:lstStyle/>
+          <a:p>
+            <a:r>
+              <a:rPr lang="en-CH" b="1" u="sng" dirty="0"/>
+              <a:t>Version control</a:t>
+            </a:r>
+          </a:p>
+        </p:txBody>
+      </p:sp>
+      <p:pic>
+        <p:nvPicPr>
+          <p:cNvPr id="5" name="Picture 4" descr="Text&#10;&#10;Description automatically generated">
+            <a:extLst>
+              <a:ext uri="{FF2B5EF4-FFF2-40B4-BE49-F238E27FC236}">
+                <a16:creationId xmlns:a16="http://schemas.microsoft.com/office/drawing/2014/main" id="{F2B74197-515D-4F4B-ACF5-0022F2C01162}"/>
+              </a:ext>
+            </a:extLst>
+          </p:cNvPr>
+          <p:cNvPicPr>
+            <a:picLocks noChangeAspect="1"/>
+          </p:cNvPicPr>
+          <p:nvPr/>
+        </p:nvPicPr>
+        <p:blipFill>
+          <a:blip r:embed="rId2"/>
+          <a:stretch>
+            <a:fillRect/>
+          </a:stretch>
+        </p:blipFill>
+        <p:spPr>
+          <a:xfrm>
+            <a:off x="838200" y="1882276"/>
+            <a:ext cx="4625835" cy="2591163"/>
+          </a:xfrm>
+          <a:prstGeom prst="rect">
+            <a:avLst/>
+          </a:prstGeom>
+        </p:spPr>
+      </p:pic>
+      <p:sp>
+        <p:nvSpPr>
+          <p:cNvPr id="6" name="Content Placeholder 2">
+            <a:extLst>
+              <a:ext uri="{FF2B5EF4-FFF2-40B4-BE49-F238E27FC236}">
+                <a16:creationId xmlns:a16="http://schemas.microsoft.com/office/drawing/2014/main" id="{225A4D80-8CBC-6E4C-9BDA-F7E737D83576}"/>
+              </a:ext>
+            </a:extLst>
+          </p:cNvPr>
+          <p:cNvSpPr txBox="1">
+            <a:spLocks/>
+          </p:cNvSpPr>
+          <p:nvPr/>
+        </p:nvSpPr>
+        <p:spPr>
+          <a:xfrm>
+            <a:off x="6156961" y="1690688"/>
+            <a:ext cx="5921828" cy="5111945"/>
+          </a:xfrm>
+          <a:prstGeom prst="rect">
+            <a:avLst/>
+          </a:prstGeom>
+        </p:spPr>
+        <p:txBody>
+          <a:bodyPr vert="horz" lIns="91440" tIns="45720" rIns="91440" bIns="45720" rtlCol="0">
+            <a:normAutofit/>
+          </a:bodyPr>
+          <a:lstStyle>
+            <a:lvl1pPr marL="228600" indent="-228600" algn="l" defTabSz="914400" rtl="0" eaLnBrk="1" latinLnBrk="0" hangingPunct="1">
+              <a:lnSpc>
+                <a:spcPct val="90000"/>
+              </a:lnSpc>
+              <a:spcBef>
+                <a:spcPts val="1000"/>
+              </a:spcBef>
+              <a:buFont typeface="Arial" panose="020B0604020202020204" pitchFamily="34" charset="0"/>
+              <a:buChar char="•"/>
+              <a:defRPr sz="2800" kern="1200">
+                <a:solidFill>
+                  <a:schemeClr val="tx1"/>
+                </a:solidFill>
+                <a:latin typeface="+mn-lt"/>
+                <a:ea typeface="+mn-ea"/>
+                <a:cs typeface="+mn-cs"/>
+              </a:defRPr>
+            </a:lvl1pPr>
+            <a:lvl2pPr marL="685800" indent="-228600" algn="l" defTabSz="914400" rtl="0" eaLnBrk="1" latinLnBrk="0" hangingPunct="1">
+              <a:lnSpc>
+                <a:spcPct val="90000"/>
+              </a:lnSpc>
+              <a:spcBef>
+                <a:spcPts val="500"/>
+              </a:spcBef>
+              <a:buFont typeface="Arial" panose="020B0604020202020204" pitchFamily="34" charset="0"/>
+              <a:buChar char="•"/>
+              <a:defRPr sz="2400" kern="1200">
+                <a:solidFill>
+                  <a:schemeClr val="tx1"/>
+                </a:solidFill>
+                <a:latin typeface="+mn-lt"/>
+                <a:ea typeface="+mn-ea"/>
+                <a:cs typeface="+mn-cs"/>
+              </a:defRPr>
+            </a:lvl2pPr>
+            <a:lvl3pPr marL="1143000" indent="-228600" algn="l" defTabSz="914400" rtl="0" eaLnBrk="1" latinLnBrk="0" hangingPunct="1">
+              <a:lnSpc>
+                <a:spcPct val="90000"/>
+              </a:lnSpc>
+              <a:spcBef>
+                <a:spcPts val="500"/>
+              </a:spcBef>
+              <a:buFont typeface="Arial" panose="020B0604020202020204" pitchFamily="34" charset="0"/>
+              <a:buChar char="•"/>
+              <a:defRPr sz="2000" kern="1200">
+                <a:solidFill>
+                  <a:schemeClr val="tx1"/>
+                </a:solidFill>
+                <a:latin typeface="+mn-lt"/>
+                <a:ea typeface="+mn-ea"/>
+                <a:cs typeface="+mn-cs"/>
+              </a:defRPr>
+            </a:lvl3pPr>
+            <a:lvl4pPr marL="1600200" indent="-228600" algn="l" defTabSz="914400" rtl="0" eaLnBrk="1" latinLnBrk="0" hangingPunct="1">
+              <a:lnSpc>
+                <a:spcPct val="90000"/>
+              </a:lnSpc>
+              <a:spcBef>
+                <a:spcPts val="500"/>
+              </a:spcBef>
+              <a:buFont typeface="Arial" panose="020B0604020202020204" pitchFamily="34" charset="0"/>
+              <a:buChar char="•"/>
+              <a:defRPr sz="1800" kern="1200">
+                <a:solidFill>
+                  <a:schemeClr val="tx1"/>
+                </a:solidFill>
+                <a:latin typeface="+mn-lt"/>
+                <a:ea typeface="+mn-ea"/>
+                <a:cs typeface="+mn-cs"/>
+              </a:defRPr>
+            </a:lvl4pPr>
+            <a:lvl5pPr marL="2057400" indent="-228600" algn="l" defTabSz="914400" rtl="0" eaLnBrk="1" latinLnBrk="0" hangingPunct="1">
+              <a:lnSpc>
+                <a:spcPct val="90000"/>
+              </a:lnSpc>
+              <a:spcBef>
+                <a:spcPts val="500"/>
+              </a:spcBef>
+              <a:buFont typeface="Arial" panose="020B0604020202020204" pitchFamily="34" charset="0"/>
+              <a:buChar char="•"/>
+              <a:defRPr sz="1800" kern="1200">
+                <a:solidFill>
+                  <a:schemeClr val="tx1"/>
+                </a:solidFill>
+                <a:latin typeface="+mn-lt"/>
+                <a:ea typeface="+mn-ea"/>
+                <a:cs typeface="+mn-cs"/>
+              </a:defRPr>
+            </a:lvl5pPr>
+            <a:lvl6pPr marL="2514600" indent="-228600" algn="l" defTabSz="914400" rtl="0" eaLnBrk="1" latinLnBrk="0" hangingPunct="1">
+              <a:lnSpc>
+                <a:spcPct val="90000"/>
+              </a:lnSpc>
+              <a:spcBef>
+                <a:spcPts val="500"/>
+              </a:spcBef>
+              <a:buFont typeface="Arial" panose="020B0604020202020204" pitchFamily="34" charset="0"/>
+              <a:buChar char="•"/>
+              <a:defRPr sz="1800" kern="1200">
+                <a:solidFill>
+                  <a:schemeClr val="tx1"/>
+                </a:solidFill>
+                <a:latin typeface="+mn-lt"/>
+                <a:ea typeface="+mn-ea"/>
+                <a:cs typeface="+mn-cs"/>
+              </a:defRPr>
+            </a:lvl6pPr>
+            <a:lvl7pPr marL="2971800" indent="-228600" algn="l" defTabSz="914400" rtl="0" eaLnBrk="1" latinLnBrk="0" hangingPunct="1">
+              <a:lnSpc>
+                <a:spcPct val="90000"/>
+              </a:lnSpc>
+              <a:spcBef>
+                <a:spcPts val="500"/>
+              </a:spcBef>
+              <a:buFont typeface="Arial" panose="020B0604020202020204" pitchFamily="34" charset="0"/>
+              <a:buChar char="•"/>
+              <a:defRPr sz="1800" kern="1200">
+                <a:solidFill>
+                  <a:schemeClr val="tx1"/>
+                </a:solidFill>
+                <a:latin typeface="+mn-lt"/>
+                <a:ea typeface="+mn-ea"/>
+                <a:cs typeface="+mn-cs"/>
+              </a:defRPr>
+            </a:lvl7pPr>
+            <a:lvl8pPr marL="3429000" indent="-228600" algn="l" defTabSz="914400" rtl="0" eaLnBrk="1" latinLnBrk="0" hangingPunct="1">
+              <a:lnSpc>
+                <a:spcPct val="90000"/>
+              </a:lnSpc>
+              <a:spcBef>
+                <a:spcPts val="500"/>
+              </a:spcBef>
+              <a:buFont typeface="Arial" panose="020B0604020202020204" pitchFamily="34" charset="0"/>
+              <a:buChar char="•"/>
+              <a:defRPr sz="1800" kern="1200">
+                <a:solidFill>
+                  <a:schemeClr val="tx1"/>
+                </a:solidFill>
+                <a:latin typeface="+mn-lt"/>
+                <a:ea typeface="+mn-ea"/>
+                <a:cs typeface="+mn-cs"/>
+              </a:defRPr>
+            </a:lvl8pPr>
+            <a:lvl9pPr marL="3886200" indent="-228600" algn="l" defTabSz="914400" rtl="0" eaLnBrk="1" latinLnBrk="0" hangingPunct="1">
+              <a:lnSpc>
+                <a:spcPct val="90000"/>
+              </a:lnSpc>
+              <a:spcBef>
+                <a:spcPts val="500"/>
+              </a:spcBef>
+              <a:buFont typeface="Arial" panose="020B0604020202020204" pitchFamily="34" charset="0"/>
+              <a:buChar char="•"/>
+              <a:defRPr sz="1800" kern="1200">
+                <a:solidFill>
+                  <a:schemeClr val="tx1"/>
+                </a:solidFill>
+                <a:latin typeface="+mn-lt"/>
+                <a:ea typeface="+mn-ea"/>
+                <a:cs typeface="+mn-cs"/>
+              </a:defRPr>
+            </a:lvl9pPr>
+          </a:lstStyle>
+          <a:p>
+            <a:r>
+              <a:rPr lang="en-CH" dirty="0"/>
+              <a:t>Github is used. </a:t>
+            </a:r>
+          </a:p>
+          <a:p>
+            <a:r>
+              <a:rPr lang="en-CH" dirty="0"/>
+              <a:t>Branch are created for all new features. </a:t>
+            </a:r>
+          </a:p>
+          <a:p>
+            <a:r>
+              <a:rPr lang="en-CH" dirty="0"/>
+              <a:t>Once ready and tested, branches are merged into the main branch and deleted. </a:t>
+            </a:r>
+          </a:p>
+        </p:txBody>
+      </p:sp>
+    </p:spTree>
+    <p:extLst>
+      <p:ext uri="{BB962C8B-B14F-4D97-AF65-F5344CB8AC3E}">
+        <p14:creationId xmlns:p14="http://schemas.microsoft.com/office/powerpoint/2010/main" val="1258704914"/>
+      </p:ext>
+    </p:extLst>
+  </p:cSld>
+  <p:clrMapOvr>
+    <a:masterClrMapping/>
+  </p:clrMapOvr>
+</p:sld>
+</file>
+
+<file path=ppt/slides/slide6.xml><?xml version="1.0" encoding="utf-8"?>
+<p:sld xmlns:a="http://schemas.openxmlformats.org/drawingml/2006/main" xmlns:r="http://schemas.openxmlformats.org/officeDocument/2006/relationships" xmlns:p="http://schemas.openxmlformats.org/presentationml/2006/main">
+  <p:cSld>
+    <p:spTree>
+      <p:nvGrpSpPr>
+        <p:cNvPr id="1" name=""/>
+        <p:cNvGrpSpPr/>
+        <p:nvPr/>
+      </p:nvGrpSpPr>
+      <p:grpSpPr>
+        <a:xfrm>
+          <a:off x="0" y="0"/>
+          <a:ext cx="0" cy="0"/>
+          <a:chOff x="0" y="0"/>
+          <a:chExt cx="0" cy="0"/>
+        </a:xfrm>
+      </p:grpSpPr>
+      <p:sp>
+        <p:nvSpPr>
+          <p:cNvPr id="2" name="Title 1">
+            <a:extLst>
+              <a:ext uri="{FF2B5EF4-FFF2-40B4-BE49-F238E27FC236}">
+                <a16:creationId xmlns:a16="http://schemas.microsoft.com/office/drawing/2014/main" id="{9E9AB15D-099A-3745-95E3-A34E1D9543AC}"/>
+              </a:ext>
+            </a:extLst>
+          </p:cNvPr>
+          <p:cNvSpPr>
+            <a:spLocks noGrp="1"/>
+          </p:cNvSpPr>
+          <p:nvPr>
+            <p:ph type="title"/>
+          </p:nvPr>
+        </p:nvSpPr>
+        <p:spPr/>
+        <p:txBody>
+          <a:bodyPr/>
+          <a:lstStyle/>
+          <a:p>
+            <a:r>
+              <a:rPr lang="en-CH" b="1" u="sng" dirty="0"/>
+              <a:t>Project structure</a:t>
+            </a:r>
+          </a:p>
+        </p:txBody>
+      </p:sp>
+      <p:pic>
+        <p:nvPicPr>
+          <p:cNvPr id="5" name="Content Placeholder 4">
+            <a:extLst>
+              <a:ext uri="{FF2B5EF4-FFF2-40B4-BE49-F238E27FC236}">
+                <a16:creationId xmlns:a16="http://schemas.microsoft.com/office/drawing/2014/main" id="{D94E5D41-BFF3-8247-9CCD-0D6DD04089BF}"/>
+              </a:ext>
+            </a:extLst>
+          </p:cNvPr>
+          <p:cNvPicPr>
+            <a:picLocks noGrp="1" noChangeAspect="1"/>
+          </p:cNvPicPr>
+          <p:nvPr>
+            <p:ph idx="1"/>
+          </p:nvPr>
+        </p:nvPicPr>
+        <p:blipFill>
+          <a:blip r:embed="rId2"/>
+          <a:stretch>
+            <a:fillRect/>
+          </a:stretch>
+        </p:blipFill>
+        <p:spPr>
+          <a:xfrm>
+            <a:off x="1044718" y="1503887"/>
+            <a:ext cx="2006573" cy="4988988"/>
+          </a:xfrm>
+        </p:spPr>
+      </p:pic>
+      <p:sp>
+        <p:nvSpPr>
+          <p:cNvPr id="6" name="Right Bracket 5">
+            <a:extLst>
+              <a:ext uri="{FF2B5EF4-FFF2-40B4-BE49-F238E27FC236}">
+                <a16:creationId xmlns:a16="http://schemas.microsoft.com/office/drawing/2014/main" id="{70E328F9-15E2-A744-AC9B-5BEA9CC92DA1}"/>
+              </a:ext>
+            </a:extLst>
+          </p:cNvPr>
+          <p:cNvSpPr/>
+          <p:nvPr/>
+        </p:nvSpPr>
+        <p:spPr>
+          <a:xfrm>
+            <a:off x="2524464" y="3237989"/>
+            <a:ext cx="402609" cy="1188158"/>
+          </a:xfrm>
+          <a:prstGeom prst="rightBracket">
+            <a:avLst/>
+          </a:prstGeom>
+          <a:noFill/>
+          <a:ln w="38100">
+            <a:solidFill>
+              <a:srgbClr val="FF0000"/>
+            </a:solidFill>
+          </a:ln>
+        </p:spPr>
+        <p:style>
+          <a:lnRef idx="1">
+            <a:schemeClr val="accent1"/>
+          </a:lnRef>
+          <a:fillRef idx="0">
+            <a:schemeClr val="accent1"/>
+          </a:fillRef>
+          <a:effectRef idx="0">
+            <a:schemeClr val="accent1"/>
+          </a:effectRef>
+          <a:fontRef idx="minor">
+            <a:schemeClr val="tx1"/>
+          </a:fontRef>
+        </p:style>
+        <p:txBody>
+          <a:bodyPr rtlCol="0" anchor="ctr"/>
+          <a:lstStyle/>
+          <a:p>
+            <a:pPr algn="ctr"/>
+            <a:endParaRPr lang="en-CH"/>
+          </a:p>
+        </p:txBody>
+      </p:sp>
+      <p:cxnSp>
+        <p:nvCxnSpPr>
+          <p:cNvPr id="7" name="Straight Arrow Connector 6">
+            <a:extLst>
+              <a:ext uri="{FF2B5EF4-FFF2-40B4-BE49-F238E27FC236}">
+                <a16:creationId xmlns:a16="http://schemas.microsoft.com/office/drawing/2014/main" id="{1AC312B0-0868-9948-9967-F12608B97A2E}"/>
+              </a:ext>
+            </a:extLst>
+          </p:cNvPr>
+          <p:cNvCxnSpPr>
+            <a:cxnSpLocks/>
+          </p:cNvCxnSpPr>
+          <p:nvPr/>
+        </p:nvCxnSpPr>
+        <p:spPr>
+          <a:xfrm>
+            <a:off x="2927073" y="3821791"/>
+            <a:ext cx="592741" cy="0"/>
+          </a:xfrm>
+          <a:prstGeom prst="straightConnector1">
+            <a:avLst/>
+          </a:prstGeom>
+          <a:ln w="38100">
+            <a:solidFill>
+              <a:srgbClr val="FF0000"/>
+            </a:solidFill>
+            <a:tailEnd type="triangle"/>
+          </a:ln>
+        </p:spPr>
+        <p:style>
+          <a:lnRef idx="1">
+            <a:schemeClr val="accent1"/>
+          </a:lnRef>
+          <a:fillRef idx="0">
+            <a:schemeClr val="accent1"/>
+          </a:fillRef>
+          <a:effectRef idx="0">
+            <a:schemeClr val="accent1"/>
+          </a:effectRef>
+          <a:fontRef idx="minor">
+            <a:schemeClr val="tx1"/>
+          </a:fontRef>
+        </p:style>
+      </p:cxnSp>
+      <p:cxnSp>
+        <p:nvCxnSpPr>
+          <p:cNvPr id="9" name="Straight Arrow Connector 8">
+            <a:extLst>
+              <a:ext uri="{FF2B5EF4-FFF2-40B4-BE49-F238E27FC236}">
+                <a16:creationId xmlns:a16="http://schemas.microsoft.com/office/drawing/2014/main" id="{A8B9952F-1526-8C4A-BA03-12036D996753}"/>
+              </a:ext>
+            </a:extLst>
+          </p:cNvPr>
+          <p:cNvCxnSpPr>
+            <a:cxnSpLocks/>
+          </p:cNvCxnSpPr>
+          <p:nvPr/>
+        </p:nvCxnSpPr>
+        <p:spPr>
+          <a:xfrm>
+            <a:off x="1908452" y="1907397"/>
+            <a:ext cx="1632559" cy="0"/>
+          </a:xfrm>
+          <a:prstGeom prst="straightConnector1">
+            <a:avLst/>
+          </a:prstGeom>
+          <a:ln w="38100">
+            <a:solidFill>
+              <a:srgbClr val="FF0000"/>
+            </a:solidFill>
+            <a:tailEnd type="triangle"/>
+          </a:ln>
+        </p:spPr>
+        <p:style>
+          <a:lnRef idx="1">
+            <a:schemeClr val="accent1"/>
+          </a:lnRef>
+          <a:fillRef idx="0">
+            <a:schemeClr val="accent1"/>
+          </a:fillRef>
+          <a:effectRef idx="0">
+            <a:schemeClr val="accent1"/>
+          </a:effectRef>
+          <a:fontRef idx="minor">
+            <a:schemeClr val="tx1"/>
+          </a:fontRef>
+        </p:style>
+      </p:cxnSp>
+      <p:cxnSp>
+        <p:nvCxnSpPr>
+          <p:cNvPr id="11" name="Straight Arrow Connector 10">
+            <a:extLst>
+              <a:ext uri="{FF2B5EF4-FFF2-40B4-BE49-F238E27FC236}">
+                <a16:creationId xmlns:a16="http://schemas.microsoft.com/office/drawing/2014/main" id="{F8F37C0E-3E76-764D-A9F9-21938FAD19FA}"/>
+              </a:ext>
+            </a:extLst>
+          </p:cNvPr>
+          <p:cNvCxnSpPr>
+            <a:cxnSpLocks/>
+          </p:cNvCxnSpPr>
+          <p:nvPr/>
+        </p:nvCxnSpPr>
+        <p:spPr>
+          <a:xfrm>
+            <a:off x="1898163" y="2185057"/>
+            <a:ext cx="1632559" cy="0"/>
+          </a:xfrm>
+          <a:prstGeom prst="straightConnector1">
+            <a:avLst/>
+          </a:prstGeom>
+          <a:ln w="38100">
+            <a:solidFill>
+              <a:srgbClr val="FF0000"/>
+            </a:solidFill>
+            <a:tailEnd type="triangle"/>
+          </a:ln>
+        </p:spPr>
+        <p:style>
+          <a:lnRef idx="1">
+            <a:schemeClr val="accent1"/>
+          </a:lnRef>
+          <a:fillRef idx="0">
+            <a:schemeClr val="accent1"/>
+          </a:fillRef>
+          <a:effectRef idx="0">
+            <a:schemeClr val="accent1"/>
+          </a:effectRef>
+          <a:fontRef idx="minor">
+            <a:schemeClr val="tx1"/>
+          </a:fontRef>
+        </p:style>
+      </p:cxnSp>
+      <p:cxnSp>
+        <p:nvCxnSpPr>
+          <p:cNvPr id="13" name="Straight Arrow Connector 12">
+            <a:extLst>
+              <a:ext uri="{FF2B5EF4-FFF2-40B4-BE49-F238E27FC236}">
+                <a16:creationId xmlns:a16="http://schemas.microsoft.com/office/drawing/2014/main" id="{B62DF67F-9722-074B-B2AC-A5ECB5781B31}"/>
+              </a:ext>
+            </a:extLst>
+          </p:cNvPr>
+          <p:cNvCxnSpPr>
+            <a:cxnSpLocks/>
+          </p:cNvCxnSpPr>
+          <p:nvPr/>
+        </p:nvCxnSpPr>
+        <p:spPr>
+          <a:xfrm>
+            <a:off x="2020866" y="2443928"/>
+            <a:ext cx="1498948" cy="0"/>
+          </a:xfrm>
+          <a:prstGeom prst="straightConnector1">
+            <a:avLst/>
+          </a:prstGeom>
+          <a:ln w="38100">
+            <a:solidFill>
+              <a:srgbClr val="FF0000"/>
+            </a:solidFill>
+            <a:tailEnd type="triangle"/>
+          </a:ln>
+        </p:spPr>
+        <p:style>
+          <a:lnRef idx="1">
+            <a:schemeClr val="accent1"/>
+          </a:lnRef>
+          <a:fillRef idx="0">
+            <a:schemeClr val="accent1"/>
+          </a:fillRef>
+          <a:effectRef idx="0">
+            <a:schemeClr val="accent1"/>
+          </a:effectRef>
+          <a:fontRef idx="minor">
+            <a:schemeClr val="tx1"/>
+          </a:fontRef>
+        </p:style>
+      </p:cxnSp>
+      <p:cxnSp>
+        <p:nvCxnSpPr>
+          <p:cNvPr id="15" name="Straight Arrow Connector 14">
+            <a:extLst>
+              <a:ext uri="{FF2B5EF4-FFF2-40B4-BE49-F238E27FC236}">
+                <a16:creationId xmlns:a16="http://schemas.microsoft.com/office/drawing/2014/main" id="{095C8D7D-A001-DA49-AA04-AC32DDF81453}"/>
+              </a:ext>
+            </a:extLst>
+          </p:cNvPr>
+          <p:cNvCxnSpPr>
+            <a:cxnSpLocks/>
+          </p:cNvCxnSpPr>
+          <p:nvPr/>
+        </p:nvCxnSpPr>
+        <p:spPr>
+          <a:xfrm>
+            <a:off x="2242159" y="2727851"/>
+            <a:ext cx="1277655" cy="0"/>
+          </a:xfrm>
+          <a:prstGeom prst="straightConnector1">
+            <a:avLst/>
+          </a:prstGeom>
+          <a:ln w="38100">
+            <a:solidFill>
+              <a:srgbClr val="FF0000"/>
+            </a:solidFill>
+            <a:tailEnd type="triangle"/>
+          </a:ln>
+        </p:spPr>
+        <p:style>
+          <a:lnRef idx="1">
+            <a:schemeClr val="accent1"/>
+          </a:lnRef>
+          <a:fillRef idx="0">
+            <a:schemeClr val="accent1"/>
+          </a:fillRef>
+          <a:effectRef idx="0">
+            <a:schemeClr val="accent1"/>
+          </a:effectRef>
+          <a:fontRef idx="minor">
+            <a:schemeClr val="tx1"/>
+          </a:fontRef>
+        </p:style>
+      </p:cxnSp>
+      <p:cxnSp>
+        <p:nvCxnSpPr>
+          <p:cNvPr id="17" name="Straight Arrow Connector 16">
+            <a:extLst>
+              <a:ext uri="{FF2B5EF4-FFF2-40B4-BE49-F238E27FC236}">
+                <a16:creationId xmlns:a16="http://schemas.microsoft.com/office/drawing/2014/main" id="{CAB4EAE0-58BD-1F49-B402-3692CBDEA6E6}"/>
+              </a:ext>
+            </a:extLst>
+          </p:cNvPr>
+          <p:cNvCxnSpPr>
+            <a:cxnSpLocks/>
+          </p:cNvCxnSpPr>
+          <p:nvPr/>
+        </p:nvCxnSpPr>
+        <p:spPr>
+          <a:xfrm>
+            <a:off x="2020866" y="3028974"/>
+            <a:ext cx="1498948" cy="0"/>
+          </a:xfrm>
+          <a:prstGeom prst="straightConnector1">
+            <a:avLst/>
+          </a:prstGeom>
+          <a:ln w="38100">
+            <a:solidFill>
+              <a:srgbClr val="FF0000"/>
+            </a:solidFill>
+            <a:tailEnd type="triangle"/>
+          </a:ln>
+        </p:spPr>
+        <p:style>
+          <a:lnRef idx="1">
+            <a:schemeClr val="accent1"/>
+          </a:lnRef>
+          <a:fillRef idx="0">
+            <a:schemeClr val="accent1"/>
+          </a:fillRef>
+          <a:effectRef idx="0">
+            <a:schemeClr val="accent1"/>
+          </a:effectRef>
+          <a:fontRef idx="minor">
+            <a:schemeClr val="tx1"/>
+          </a:fontRef>
+        </p:style>
+      </p:cxnSp>
+      <p:cxnSp>
+        <p:nvCxnSpPr>
+          <p:cNvPr id="19" name="Straight Arrow Connector 18">
+            <a:extLst>
+              <a:ext uri="{FF2B5EF4-FFF2-40B4-BE49-F238E27FC236}">
+                <a16:creationId xmlns:a16="http://schemas.microsoft.com/office/drawing/2014/main" id="{8833185C-E844-0945-816E-06889F5A6370}"/>
+              </a:ext>
+            </a:extLst>
+          </p:cNvPr>
+          <p:cNvCxnSpPr>
+            <a:cxnSpLocks/>
+          </p:cNvCxnSpPr>
+          <p:nvPr/>
+        </p:nvCxnSpPr>
+        <p:spPr>
+          <a:xfrm>
+            <a:off x="1862524" y="4961659"/>
+            <a:ext cx="1657290" cy="0"/>
+          </a:xfrm>
+          <a:prstGeom prst="straightConnector1">
+            <a:avLst/>
+          </a:prstGeom>
+          <a:ln w="38100">
+            <a:solidFill>
+              <a:srgbClr val="FF0000"/>
+            </a:solidFill>
+            <a:tailEnd type="triangle"/>
+          </a:ln>
+        </p:spPr>
+        <p:style>
+          <a:lnRef idx="1">
+            <a:schemeClr val="accent1"/>
+          </a:lnRef>
+          <a:fillRef idx="0">
+            <a:schemeClr val="accent1"/>
+          </a:fillRef>
+          <a:effectRef idx="0">
+            <a:schemeClr val="accent1"/>
+          </a:effectRef>
+          <a:fontRef idx="minor">
+            <a:schemeClr val="tx1"/>
+          </a:fontRef>
+        </p:style>
+      </p:cxnSp>
+      <p:cxnSp>
+        <p:nvCxnSpPr>
+          <p:cNvPr id="22" name="Straight Arrow Connector 21">
+            <a:extLst>
+              <a:ext uri="{FF2B5EF4-FFF2-40B4-BE49-F238E27FC236}">
+                <a16:creationId xmlns:a16="http://schemas.microsoft.com/office/drawing/2014/main" id="{5E7B57ED-D690-CE42-94B4-3DD4AD57B26A}"/>
+              </a:ext>
+            </a:extLst>
+          </p:cNvPr>
+          <p:cNvCxnSpPr>
+            <a:cxnSpLocks/>
+          </p:cNvCxnSpPr>
+          <p:nvPr/>
+        </p:nvCxnSpPr>
+        <p:spPr>
+          <a:xfrm>
+            <a:off x="2110793" y="6072300"/>
+            <a:ext cx="1430218" cy="0"/>
+          </a:xfrm>
+          <a:prstGeom prst="straightConnector1">
+            <a:avLst/>
+          </a:prstGeom>
+          <a:ln w="38100">
+            <a:solidFill>
+              <a:srgbClr val="FF0000"/>
+            </a:solidFill>
+            <a:tailEnd type="triangle"/>
+          </a:ln>
+        </p:spPr>
+        <p:style>
+          <a:lnRef idx="1">
+            <a:schemeClr val="accent1"/>
+          </a:lnRef>
+          <a:fillRef idx="0">
+            <a:schemeClr val="accent1"/>
+          </a:fillRef>
+          <a:effectRef idx="0">
+            <a:schemeClr val="accent1"/>
+          </a:effectRef>
+          <a:fontRef idx="minor">
+            <a:schemeClr val="tx1"/>
+          </a:fontRef>
+        </p:style>
+      </p:cxnSp>
+      <p:cxnSp>
+        <p:nvCxnSpPr>
+          <p:cNvPr id="23" name="Straight Arrow Connector 22">
+            <a:extLst>
+              <a:ext uri="{FF2B5EF4-FFF2-40B4-BE49-F238E27FC236}">
+                <a16:creationId xmlns:a16="http://schemas.microsoft.com/office/drawing/2014/main" id="{FB493C9D-8736-944B-9167-378FBCA8EB82}"/>
+              </a:ext>
+            </a:extLst>
+          </p:cNvPr>
+          <p:cNvCxnSpPr>
+            <a:cxnSpLocks/>
+          </p:cNvCxnSpPr>
+          <p:nvPr/>
+        </p:nvCxnSpPr>
+        <p:spPr>
+          <a:xfrm>
+            <a:off x="2952609" y="6387538"/>
+            <a:ext cx="588402" cy="0"/>
+          </a:xfrm>
+          <a:prstGeom prst="straightConnector1">
+            <a:avLst/>
+          </a:prstGeom>
+          <a:ln w="38100">
+            <a:solidFill>
+              <a:srgbClr val="FF0000"/>
+            </a:solidFill>
+            <a:tailEnd type="triangle"/>
+          </a:ln>
+        </p:spPr>
+        <p:style>
+          <a:lnRef idx="1">
+            <a:schemeClr val="accent1"/>
+          </a:lnRef>
+          <a:fillRef idx="0">
+            <a:schemeClr val="accent1"/>
+          </a:fillRef>
+          <a:effectRef idx="0">
+            <a:schemeClr val="accent1"/>
+          </a:effectRef>
+          <a:fontRef idx="minor">
+            <a:schemeClr val="tx1"/>
+          </a:fontRef>
+        </p:style>
+      </p:cxnSp>
+      <p:sp>
+        <p:nvSpPr>
+          <p:cNvPr id="31" name="TextBox 30">
+            <a:extLst>
+              <a:ext uri="{FF2B5EF4-FFF2-40B4-BE49-F238E27FC236}">
+                <a16:creationId xmlns:a16="http://schemas.microsoft.com/office/drawing/2014/main" id="{28D28C1C-C134-954A-B190-9D23B0F79B38}"/>
+              </a:ext>
+            </a:extLst>
+          </p:cNvPr>
+          <p:cNvSpPr txBox="1"/>
+          <p:nvPr/>
+        </p:nvSpPr>
+        <p:spPr>
+          <a:xfrm>
+            <a:off x="3519814" y="1754855"/>
+            <a:ext cx="3169085" cy="307777"/>
+          </a:xfrm>
+          <a:prstGeom prst="rect">
+            <a:avLst/>
+          </a:prstGeom>
+          <a:noFill/>
+        </p:spPr>
+        <p:txBody>
+          <a:bodyPr wrap="square" rtlCol="0">
+            <a:spAutoFit/>
+          </a:bodyPr>
+          <a:lstStyle/>
+          <a:p>
+            <a:r>
+              <a:rPr lang="en-CH" sz="1400" dirty="0"/>
+              <a:t>Data files compressed</a:t>
+            </a:r>
+          </a:p>
+        </p:txBody>
+      </p:sp>
+      <p:sp>
+        <p:nvSpPr>
+          <p:cNvPr id="32" name="TextBox 31">
+            <a:extLst>
+              <a:ext uri="{FF2B5EF4-FFF2-40B4-BE49-F238E27FC236}">
+                <a16:creationId xmlns:a16="http://schemas.microsoft.com/office/drawing/2014/main" id="{00120D1A-4E43-A043-B70F-5B35B4752BFF}"/>
+              </a:ext>
+            </a:extLst>
+          </p:cNvPr>
+          <p:cNvSpPr txBox="1"/>
+          <p:nvPr/>
+        </p:nvSpPr>
+        <p:spPr>
+          <a:xfrm>
+            <a:off x="3519814" y="2021549"/>
+            <a:ext cx="3169085" cy="307777"/>
+          </a:xfrm>
+          <a:prstGeom prst="rect">
+            <a:avLst/>
+          </a:prstGeom>
+          <a:noFill/>
+        </p:spPr>
+        <p:txBody>
+          <a:bodyPr wrap="square" rtlCol="0">
+            <a:spAutoFit/>
+          </a:bodyPr>
+          <a:lstStyle/>
+          <a:p>
+            <a:r>
+              <a:rPr lang="en-CH" sz="1400" dirty="0"/>
+              <a:t>Documentation</a:t>
+            </a:r>
+          </a:p>
+        </p:txBody>
+      </p:sp>
+      <p:sp>
+        <p:nvSpPr>
+          <p:cNvPr id="33" name="TextBox 32">
+            <a:extLst>
+              <a:ext uri="{FF2B5EF4-FFF2-40B4-BE49-F238E27FC236}">
+                <a16:creationId xmlns:a16="http://schemas.microsoft.com/office/drawing/2014/main" id="{2F796A0E-260F-2B46-B405-09DFCA7920FE}"/>
+              </a:ext>
+            </a:extLst>
+          </p:cNvPr>
+          <p:cNvSpPr txBox="1"/>
+          <p:nvPr/>
+        </p:nvSpPr>
+        <p:spPr>
+          <a:xfrm>
+            <a:off x="3541011" y="2288243"/>
+            <a:ext cx="3169085" cy="307777"/>
+          </a:xfrm>
+          <a:prstGeom prst="rect">
+            <a:avLst/>
+          </a:prstGeom>
+          <a:noFill/>
+        </p:spPr>
+        <p:txBody>
+          <a:bodyPr wrap="square" rtlCol="0">
+            <a:spAutoFit/>
+          </a:bodyPr>
+          <a:lstStyle/>
+          <a:p>
+            <a:r>
+              <a:rPr lang="en-CH" sz="1400" dirty="0"/>
+              <a:t>Models in pickle format</a:t>
+            </a:r>
+          </a:p>
+        </p:txBody>
+      </p:sp>
+      <p:sp>
+        <p:nvSpPr>
+          <p:cNvPr id="34" name="TextBox 33">
+            <a:extLst>
+              <a:ext uri="{FF2B5EF4-FFF2-40B4-BE49-F238E27FC236}">
+                <a16:creationId xmlns:a16="http://schemas.microsoft.com/office/drawing/2014/main" id="{F8D9741A-5DFD-474E-BA61-AE22C4F3AA99}"/>
+              </a:ext>
+            </a:extLst>
+          </p:cNvPr>
+          <p:cNvSpPr txBox="1"/>
+          <p:nvPr/>
+        </p:nvSpPr>
+        <p:spPr>
+          <a:xfrm>
+            <a:off x="3541011" y="2593197"/>
+            <a:ext cx="6241816" cy="307777"/>
+          </a:xfrm>
+          <a:prstGeom prst="rect">
+            <a:avLst/>
+          </a:prstGeom>
+          <a:noFill/>
+        </p:spPr>
+        <p:txBody>
+          <a:bodyPr wrap="square" rtlCol="0">
+            <a:spAutoFit/>
+          </a:bodyPr>
+          <a:lstStyle/>
+          <a:p>
+            <a:r>
+              <a:rPr lang="en-CH" sz="1400" dirty="0"/>
+              <a:t>Main pipeline of the project (preprocessing, training, evaluation…)</a:t>
+            </a:r>
+          </a:p>
+        </p:txBody>
+      </p:sp>
+      <p:sp>
+        <p:nvSpPr>
+          <p:cNvPr id="35" name="TextBox 34">
+            <a:extLst>
+              <a:ext uri="{FF2B5EF4-FFF2-40B4-BE49-F238E27FC236}">
+                <a16:creationId xmlns:a16="http://schemas.microsoft.com/office/drawing/2014/main" id="{511EFA51-4B54-5E4A-AC01-85C9A260EA81}"/>
+              </a:ext>
+            </a:extLst>
+          </p:cNvPr>
+          <p:cNvSpPr txBox="1"/>
+          <p:nvPr/>
+        </p:nvSpPr>
+        <p:spPr>
+          <a:xfrm>
+            <a:off x="3541011" y="2868446"/>
+            <a:ext cx="6241816" cy="307777"/>
+          </a:xfrm>
+          <a:prstGeom prst="rect">
+            <a:avLst/>
+          </a:prstGeom>
+          <a:noFill/>
+        </p:spPr>
+        <p:txBody>
+          <a:bodyPr wrap="square" rtlCol="0">
+            <a:spAutoFit/>
+          </a:bodyPr>
+          <a:lstStyle/>
+          <a:p>
+            <a:r>
+              <a:rPr lang="en-CH" sz="1400" dirty="0"/>
+              <a:t>R</a:t>
+            </a:r>
+            <a:r>
+              <a:rPr lang="en-GB" sz="1400" dirty="0"/>
+              <a:t>e</a:t>
+            </a:r>
+            <a:r>
+              <a:rPr lang="en-CH" sz="1400" dirty="0"/>
+              <a:t>ports and images of the final results</a:t>
+            </a:r>
+          </a:p>
+        </p:txBody>
+      </p:sp>
+      <p:sp>
+        <p:nvSpPr>
+          <p:cNvPr id="36" name="TextBox 35">
+            <a:extLst>
+              <a:ext uri="{FF2B5EF4-FFF2-40B4-BE49-F238E27FC236}">
+                <a16:creationId xmlns:a16="http://schemas.microsoft.com/office/drawing/2014/main" id="{6CB24853-A007-0D47-AD1D-3756FC7DD547}"/>
+              </a:ext>
+            </a:extLst>
+          </p:cNvPr>
+          <p:cNvSpPr txBox="1"/>
+          <p:nvPr/>
+        </p:nvSpPr>
+        <p:spPr>
+          <a:xfrm>
+            <a:off x="3541011" y="3667902"/>
+            <a:ext cx="7118638" cy="307777"/>
+          </a:xfrm>
+          <a:prstGeom prst="rect">
+            <a:avLst/>
+          </a:prstGeom>
+          <a:noFill/>
+        </p:spPr>
+        <p:txBody>
+          <a:bodyPr wrap="square" rtlCol="0">
+            <a:spAutoFit/>
+          </a:bodyPr>
+          <a:lstStyle/>
+          <a:p>
+            <a:r>
+              <a:rPr lang="en-CH" sz="1400" dirty="0"/>
+              <a:t>Python packages which are loaded and used in the pipeline notebook to modularize the code</a:t>
+            </a:r>
+          </a:p>
+        </p:txBody>
+      </p:sp>
+      <p:sp>
+        <p:nvSpPr>
+          <p:cNvPr id="37" name="TextBox 36">
+            <a:extLst>
+              <a:ext uri="{FF2B5EF4-FFF2-40B4-BE49-F238E27FC236}">
+                <a16:creationId xmlns:a16="http://schemas.microsoft.com/office/drawing/2014/main" id="{2AC6DC68-9FD4-9C49-B7A5-989E5367F50A}"/>
+              </a:ext>
+            </a:extLst>
+          </p:cNvPr>
+          <p:cNvSpPr txBox="1"/>
+          <p:nvPr/>
+        </p:nvSpPr>
+        <p:spPr>
+          <a:xfrm>
+            <a:off x="3530722" y="4804820"/>
+            <a:ext cx="7118638" cy="307777"/>
+          </a:xfrm>
+          <a:prstGeom prst="rect">
+            <a:avLst/>
+          </a:prstGeom>
+          <a:noFill/>
+        </p:spPr>
+        <p:txBody>
+          <a:bodyPr wrap="square" rtlCol="0">
+            <a:spAutoFit/>
+          </a:bodyPr>
+          <a:lstStyle/>
+          <a:p>
+            <a:r>
+              <a:rPr lang="en-CH" sz="1400" dirty="0"/>
+              <a:t>Unit testing</a:t>
+            </a:r>
+          </a:p>
+        </p:txBody>
+      </p:sp>
+      <p:sp>
+        <p:nvSpPr>
+          <p:cNvPr id="38" name="TextBox 37">
+            <a:extLst>
+              <a:ext uri="{FF2B5EF4-FFF2-40B4-BE49-F238E27FC236}">
+                <a16:creationId xmlns:a16="http://schemas.microsoft.com/office/drawing/2014/main" id="{4643DDA1-6948-9F4E-8848-429739DB824C}"/>
+              </a:ext>
+            </a:extLst>
+          </p:cNvPr>
+          <p:cNvSpPr txBox="1"/>
+          <p:nvPr/>
+        </p:nvSpPr>
+        <p:spPr>
+          <a:xfrm>
+            <a:off x="3541011" y="5918411"/>
+            <a:ext cx="7118638" cy="307777"/>
+          </a:xfrm>
+          <a:prstGeom prst="rect">
+            <a:avLst/>
+          </a:prstGeom>
+          <a:noFill/>
+        </p:spPr>
+        <p:txBody>
+          <a:bodyPr wrap="square" rtlCol="0">
+            <a:spAutoFit/>
+          </a:bodyPr>
+          <a:lstStyle/>
+          <a:p>
+            <a:r>
+              <a:rPr lang="en-CH" sz="1400" dirty="0"/>
+              <a:t>Used to load src modules using pip install</a:t>
+            </a:r>
+          </a:p>
+        </p:txBody>
+      </p:sp>
+      <p:sp>
+        <p:nvSpPr>
+          <p:cNvPr id="39" name="TextBox 38">
+            <a:extLst>
+              <a:ext uri="{FF2B5EF4-FFF2-40B4-BE49-F238E27FC236}">
+                <a16:creationId xmlns:a16="http://schemas.microsoft.com/office/drawing/2014/main" id="{960B0DA1-0878-EE49-9599-4A84E3AF75B0}"/>
+              </a:ext>
+            </a:extLst>
+          </p:cNvPr>
+          <p:cNvSpPr txBox="1"/>
+          <p:nvPr/>
+        </p:nvSpPr>
+        <p:spPr>
+          <a:xfrm>
+            <a:off x="3541011" y="6226188"/>
+            <a:ext cx="7118638" cy="307777"/>
+          </a:xfrm>
+          <a:prstGeom prst="rect">
+            <a:avLst/>
+          </a:prstGeom>
+          <a:noFill/>
+        </p:spPr>
+        <p:txBody>
+          <a:bodyPr wrap="square" rtlCol="0">
+            <a:spAutoFit/>
+          </a:bodyPr>
+          <a:lstStyle/>
+          <a:p>
+            <a:r>
+              <a:rPr lang="en-CH" sz="1400" dirty="0"/>
+              <a:t>Script to test if the environment meets the project requirements</a:t>
+            </a:r>
+          </a:p>
+        </p:txBody>
+      </p:sp>
+    </p:spTree>
+    <p:extLst>
+      <p:ext uri="{BB962C8B-B14F-4D97-AF65-F5344CB8AC3E}">
+        <p14:creationId xmlns:p14="http://schemas.microsoft.com/office/powerpoint/2010/main" val="4150572316"/>
       </p:ext>
     </p:extLst>
   </p:cSld>
@@ -5027,111 +5725,883 @@
           <a:p>
             <a:r>
               <a:rPr lang="en-CH" b="1" u="sng" dirty="0"/>
-              <a:t>Plan</a:t>
-            </a:r>
-          </a:p>
-        </p:txBody>
-      </p:sp>
-      <p:sp>
-        <p:nvSpPr>
-          <p:cNvPr id="4" name="Content Placeholder 3">
-            <a:extLst>
-              <a:ext uri="{FF2B5EF4-FFF2-40B4-BE49-F238E27FC236}">
-                <a16:creationId xmlns:a16="http://schemas.microsoft.com/office/drawing/2014/main" id="{DE452802-ABF5-6F4C-A280-A0A4B25E4C05}"/>
-              </a:ext>
-            </a:extLst>
-          </p:cNvPr>
-          <p:cNvSpPr>
-            <a:spLocks noGrp="1"/>
-          </p:cNvSpPr>
+              <a:t>Unit testing</a:t>
+            </a:r>
+          </a:p>
+        </p:txBody>
+      </p:sp>
+      <p:sp>
+        <p:nvSpPr>
+          <p:cNvPr id="10" name="Content Placeholder 2">
+            <a:extLst>
+              <a:ext uri="{FF2B5EF4-FFF2-40B4-BE49-F238E27FC236}">
+                <a16:creationId xmlns:a16="http://schemas.microsoft.com/office/drawing/2014/main" id="{4DD26E11-6A91-1B4E-8646-871310983A02}"/>
+              </a:ext>
+            </a:extLst>
+          </p:cNvPr>
+          <p:cNvSpPr txBox="1">
+            <a:spLocks/>
+          </p:cNvSpPr>
+          <p:nvPr/>
+        </p:nvSpPr>
+        <p:spPr>
+          <a:xfrm>
+            <a:off x="6723017" y="1491032"/>
+            <a:ext cx="5040358" cy="5111945"/>
+          </a:xfrm>
+          <a:prstGeom prst="rect">
+            <a:avLst/>
+          </a:prstGeom>
+        </p:spPr>
+        <p:txBody>
+          <a:bodyPr vert="horz" lIns="91440" tIns="45720" rIns="91440" bIns="45720" rtlCol="0">
+            <a:normAutofit/>
+          </a:bodyPr>
+          <a:lstStyle>
+            <a:lvl1pPr marL="228600" indent="-228600" algn="l" defTabSz="914400" rtl="0" eaLnBrk="1" latinLnBrk="0" hangingPunct="1">
+              <a:lnSpc>
+                <a:spcPct val="90000"/>
+              </a:lnSpc>
+              <a:spcBef>
+                <a:spcPts val="1000"/>
+              </a:spcBef>
+              <a:buFont typeface="Arial" panose="020B0604020202020204" pitchFamily="34" charset="0"/>
+              <a:buChar char="•"/>
+              <a:defRPr sz="2800" kern="1200">
+                <a:solidFill>
+                  <a:schemeClr val="tx1"/>
+                </a:solidFill>
+                <a:latin typeface="+mn-lt"/>
+                <a:ea typeface="+mn-ea"/>
+                <a:cs typeface="+mn-cs"/>
+              </a:defRPr>
+            </a:lvl1pPr>
+            <a:lvl2pPr marL="685800" indent="-228600" algn="l" defTabSz="914400" rtl="0" eaLnBrk="1" latinLnBrk="0" hangingPunct="1">
+              <a:lnSpc>
+                <a:spcPct val="90000"/>
+              </a:lnSpc>
+              <a:spcBef>
+                <a:spcPts val="500"/>
+              </a:spcBef>
+              <a:buFont typeface="Arial" panose="020B0604020202020204" pitchFamily="34" charset="0"/>
+              <a:buChar char="•"/>
+              <a:defRPr sz="2400" kern="1200">
+                <a:solidFill>
+                  <a:schemeClr val="tx1"/>
+                </a:solidFill>
+                <a:latin typeface="+mn-lt"/>
+                <a:ea typeface="+mn-ea"/>
+                <a:cs typeface="+mn-cs"/>
+              </a:defRPr>
+            </a:lvl2pPr>
+            <a:lvl3pPr marL="1143000" indent="-228600" algn="l" defTabSz="914400" rtl="0" eaLnBrk="1" latinLnBrk="0" hangingPunct="1">
+              <a:lnSpc>
+                <a:spcPct val="90000"/>
+              </a:lnSpc>
+              <a:spcBef>
+                <a:spcPts val="500"/>
+              </a:spcBef>
+              <a:buFont typeface="Arial" panose="020B0604020202020204" pitchFamily="34" charset="0"/>
+              <a:buChar char="•"/>
+              <a:defRPr sz="2000" kern="1200">
+                <a:solidFill>
+                  <a:schemeClr val="tx1"/>
+                </a:solidFill>
+                <a:latin typeface="+mn-lt"/>
+                <a:ea typeface="+mn-ea"/>
+                <a:cs typeface="+mn-cs"/>
+              </a:defRPr>
+            </a:lvl3pPr>
+            <a:lvl4pPr marL="1600200" indent="-228600" algn="l" defTabSz="914400" rtl="0" eaLnBrk="1" latinLnBrk="0" hangingPunct="1">
+              <a:lnSpc>
+                <a:spcPct val="90000"/>
+              </a:lnSpc>
+              <a:spcBef>
+                <a:spcPts val="500"/>
+              </a:spcBef>
+              <a:buFont typeface="Arial" panose="020B0604020202020204" pitchFamily="34" charset="0"/>
+              <a:buChar char="•"/>
+              <a:defRPr sz="1800" kern="1200">
+                <a:solidFill>
+                  <a:schemeClr val="tx1"/>
+                </a:solidFill>
+                <a:latin typeface="+mn-lt"/>
+                <a:ea typeface="+mn-ea"/>
+                <a:cs typeface="+mn-cs"/>
+              </a:defRPr>
+            </a:lvl4pPr>
+            <a:lvl5pPr marL="2057400" indent="-228600" algn="l" defTabSz="914400" rtl="0" eaLnBrk="1" latinLnBrk="0" hangingPunct="1">
+              <a:lnSpc>
+                <a:spcPct val="90000"/>
+              </a:lnSpc>
+              <a:spcBef>
+                <a:spcPts val="500"/>
+              </a:spcBef>
+              <a:buFont typeface="Arial" panose="020B0604020202020204" pitchFamily="34" charset="0"/>
+              <a:buChar char="•"/>
+              <a:defRPr sz="1800" kern="1200">
+                <a:solidFill>
+                  <a:schemeClr val="tx1"/>
+                </a:solidFill>
+                <a:latin typeface="+mn-lt"/>
+                <a:ea typeface="+mn-ea"/>
+                <a:cs typeface="+mn-cs"/>
+              </a:defRPr>
+            </a:lvl5pPr>
+            <a:lvl6pPr marL="2514600" indent="-228600" algn="l" defTabSz="914400" rtl="0" eaLnBrk="1" latinLnBrk="0" hangingPunct="1">
+              <a:lnSpc>
+                <a:spcPct val="90000"/>
+              </a:lnSpc>
+              <a:spcBef>
+                <a:spcPts val="500"/>
+              </a:spcBef>
+              <a:buFont typeface="Arial" panose="020B0604020202020204" pitchFamily="34" charset="0"/>
+              <a:buChar char="•"/>
+              <a:defRPr sz="1800" kern="1200">
+                <a:solidFill>
+                  <a:schemeClr val="tx1"/>
+                </a:solidFill>
+                <a:latin typeface="+mn-lt"/>
+                <a:ea typeface="+mn-ea"/>
+                <a:cs typeface="+mn-cs"/>
+              </a:defRPr>
+            </a:lvl6pPr>
+            <a:lvl7pPr marL="2971800" indent="-228600" algn="l" defTabSz="914400" rtl="0" eaLnBrk="1" latinLnBrk="0" hangingPunct="1">
+              <a:lnSpc>
+                <a:spcPct val="90000"/>
+              </a:lnSpc>
+              <a:spcBef>
+                <a:spcPts val="500"/>
+              </a:spcBef>
+              <a:buFont typeface="Arial" panose="020B0604020202020204" pitchFamily="34" charset="0"/>
+              <a:buChar char="•"/>
+              <a:defRPr sz="1800" kern="1200">
+                <a:solidFill>
+                  <a:schemeClr val="tx1"/>
+                </a:solidFill>
+                <a:latin typeface="+mn-lt"/>
+                <a:ea typeface="+mn-ea"/>
+                <a:cs typeface="+mn-cs"/>
+              </a:defRPr>
+            </a:lvl7pPr>
+            <a:lvl8pPr marL="3429000" indent="-228600" algn="l" defTabSz="914400" rtl="0" eaLnBrk="1" latinLnBrk="0" hangingPunct="1">
+              <a:lnSpc>
+                <a:spcPct val="90000"/>
+              </a:lnSpc>
+              <a:spcBef>
+                <a:spcPts val="500"/>
+              </a:spcBef>
+              <a:buFont typeface="Arial" panose="020B0604020202020204" pitchFamily="34" charset="0"/>
+              <a:buChar char="•"/>
+              <a:defRPr sz="1800" kern="1200">
+                <a:solidFill>
+                  <a:schemeClr val="tx1"/>
+                </a:solidFill>
+                <a:latin typeface="+mn-lt"/>
+                <a:ea typeface="+mn-ea"/>
+                <a:cs typeface="+mn-cs"/>
+              </a:defRPr>
+            </a:lvl8pPr>
+            <a:lvl9pPr marL="3886200" indent="-228600" algn="l" defTabSz="914400" rtl="0" eaLnBrk="1" latinLnBrk="0" hangingPunct="1">
+              <a:lnSpc>
+                <a:spcPct val="90000"/>
+              </a:lnSpc>
+              <a:spcBef>
+                <a:spcPts val="500"/>
+              </a:spcBef>
+              <a:buFont typeface="Arial" panose="020B0604020202020204" pitchFamily="34" charset="0"/>
+              <a:buChar char="•"/>
+              <a:defRPr sz="1800" kern="1200">
+                <a:solidFill>
+                  <a:schemeClr val="tx1"/>
+                </a:solidFill>
+                <a:latin typeface="+mn-lt"/>
+                <a:ea typeface="+mn-ea"/>
+                <a:cs typeface="+mn-cs"/>
+              </a:defRPr>
+            </a:lvl9pPr>
+          </a:lstStyle>
+          <a:p>
+            <a:r>
+              <a:rPr lang="en-CH" dirty="0"/>
+              <a:t>The Pytest runner is used. </a:t>
+            </a:r>
+          </a:p>
+          <a:p>
+            <a:r>
+              <a:rPr lang="en-CH" dirty="0"/>
+              <a:t>One file per class of tests per module. </a:t>
+            </a:r>
+          </a:p>
+          <a:p>
+            <a:r>
+              <a:rPr lang="en-CH" dirty="0"/>
+              <a:t>100% of code covering. </a:t>
+            </a:r>
+          </a:p>
+        </p:txBody>
+      </p:sp>
+      <p:pic>
+        <p:nvPicPr>
+          <p:cNvPr id="6" name="Content Placeholder 5" descr="Graphical user interface, text&#10;&#10;Description automatically generated with medium confidence">
+            <a:extLst>
+              <a:ext uri="{FF2B5EF4-FFF2-40B4-BE49-F238E27FC236}">
+                <a16:creationId xmlns:a16="http://schemas.microsoft.com/office/drawing/2014/main" id="{2DAEC987-1513-7245-AC21-12682C01D483}"/>
+              </a:ext>
+            </a:extLst>
+          </p:cNvPr>
+          <p:cNvPicPr>
+            <a:picLocks noGrp="1" noChangeAspect="1"/>
+          </p:cNvPicPr>
           <p:nvPr>
             <p:ph idx="1"/>
           </p:nvPr>
-        </p:nvSpPr>
-        <p:spPr/>
-        <p:txBody>
-          <a:bodyPr/>
-          <a:lstStyle/>
-          <a:p>
-            <a:r>
-              <a:rPr lang="en-GB" dirty="0"/>
-              <a:t>Current situation: </a:t>
-            </a:r>
-          </a:p>
-          <a:p>
-            <a:pPr lvl="1"/>
-            <a:r>
-              <a:rPr lang="en-GB" dirty="0"/>
-              <a:t>The functional part of the project (</a:t>
-            </a:r>
-            <a:r>
-              <a:rPr lang="en-GB" dirty="0" err="1"/>
-              <a:t>preprocessing</a:t>
-            </a:r>
-            <a:r>
-              <a:rPr lang="en-GB"/>
-              <a:t> and training</a:t>
-            </a:r>
-            <a:r>
-              <a:rPr lang="en-GB" dirty="0"/>
-              <a:t>) is finished. </a:t>
-            </a:r>
-          </a:p>
-          <a:p>
-            <a:pPr lvl="1"/>
-            <a:r>
-              <a:rPr lang="en-GB" dirty="0"/>
-              <a:t>The testing part is almost done.</a:t>
-            </a:r>
-          </a:p>
-          <a:p>
-            <a:r>
-              <a:rPr lang="en-GB" dirty="0"/>
-              <a:t>Next steps: </a:t>
-            </a:r>
-          </a:p>
-          <a:p>
-            <a:pPr lvl="1"/>
-            <a:r>
-              <a:rPr lang="en-GB" dirty="0"/>
-              <a:t>Results analysing. </a:t>
-            </a:r>
-          </a:p>
-          <a:p>
-            <a:pPr lvl="1"/>
-            <a:r>
-              <a:rPr lang="en-GB" dirty="0"/>
-              <a:t>Tests improvement with </a:t>
-            </a:r>
-            <a:r>
-              <a:rPr lang="en-GB" dirty="0" err="1"/>
-              <a:t>Pytest</a:t>
-            </a:r>
-            <a:r>
-              <a:rPr lang="en-GB" dirty="0"/>
-              <a:t>. </a:t>
-            </a:r>
-          </a:p>
-          <a:p>
-            <a:pPr lvl="1"/>
-            <a:r>
-              <a:rPr lang="en-GB" dirty="0"/>
-              <a:t>CI/CD integration. </a:t>
-            </a:r>
-          </a:p>
-          <a:p>
-            <a:pPr lvl="1"/>
-            <a:r>
-              <a:rPr lang="en-GB" dirty="0"/>
-              <a:t>Documentations. </a:t>
-            </a:r>
-          </a:p>
-        </p:txBody>
-      </p:sp>
+        </p:nvPicPr>
+        <p:blipFill>
+          <a:blip r:embed="rId2"/>
+          <a:stretch>
+            <a:fillRect/>
+          </a:stretch>
+        </p:blipFill>
+        <p:spPr>
+          <a:xfrm>
+            <a:off x="917644" y="1491033"/>
+            <a:ext cx="5342292" cy="2175276"/>
+          </a:xfrm>
+        </p:spPr>
+      </p:pic>
+      <p:pic>
+        <p:nvPicPr>
+          <p:cNvPr id="8" name="Picture 7" descr="Text&#10;&#10;Description automatically generated">
+            <a:extLst>
+              <a:ext uri="{FF2B5EF4-FFF2-40B4-BE49-F238E27FC236}">
+                <a16:creationId xmlns:a16="http://schemas.microsoft.com/office/drawing/2014/main" id="{4331D172-1B95-9F4B-94E8-986773C5BF22}"/>
+              </a:ext>
+            </a:extLst>
+          </p:cNvPr>
+          <p:cNvPicPr>
+            <a:picLocks noChangeAspect="1"/>
+          </p:cNvPicPr>
+          <p:nvPr/>
+        </p:nvPicPr>
+        <p:blipFill>
+          <a:blip r:embed="rId3"/>
+          <a:stretch>
+            <a:fillRect/>
+          </a:stretch>
+        </p:blipFill>
+        <p:spPr>
+          <a:xfrm>
+            <a:off x="917644" y="3733903"/>
+            <a:ext cx="5342292" cy="2771135"/>
+          </a:xfrm>
+          <a:prstGeom prst="rect">
+            <a:avLst/>
+          </a:prstGeom>
+        </p:spPr>
+      </p:pic>
     </p:spTree>
     <p:extLst>
       <p:ext uri="{BB962C8B-B14F-4D97-AF65-F5344CB8AC3E}">
-        <p14:creationId xmlns:p14="http://schemas.microsoft.com/office/powerpoint/2010/main" val="2849052916"/>
+        <p14:creationId xmlns:p14="http://schemas.microsoft.com/office/powerpoint/2010/main" val="3994066588"/>
+      </p:ext>
+    </p:extLst>
+  </p:cSld>
+  <p:clrMapOvr>
+    <a:masterClrMapping/>
+  </p:clrMapOvr>
+</p:sld>
+</file>
+
+<file path=ppt/slides/slide8.xml><?xml version="1.0" encoding="utf-8"?>
+<p:sld xmlns:a="http://schemas.openxmlformats.org/drawingml/2006/main" xmlns:r="http://schemas.openxmlformats.org/officeDocument/2006/relationships" xmlns:p="http://schemas.openxmlformats.org/presentationml/2006/main">
+  <p:cSld>
+    <p:spTree>
+      <p:nvGrpSpPr>
+        <p:cNvPr id="1" name=""/>
+        <p:cNvGrpSpPr/>
+        <p:nvPr/>
+      </p:nvGrpSpPr>
+      <p:grpSpPr>
+        <a:xfrm>
+          <a:off x="0" y="0"/>
+          <a:ext cx="0" cy="0"/>
+          <a:chOff x="0" y="0"/>
+          <a:chExt cx="0" cy="0"/>
+        </a:xfrm>
+      </p:grpSpPr>
+      <p:sp>
+        <p:nvSpPr>
+          <p:cNvPr id="2" name="Title 1">
+            <a:extLst>
+              <a:ext uri="{FF2B5EF4-FFF2-40B4-BE49-F238E27FC236}">
+                <a16:creationId xmlns:a16="http://schemas.microsoft.com/office/drawing/2014/main" id="{CF2DE2F5-05C4-EC48-BB6A-68F63F7649E0}"/>
+              </a:ext>
+            </a:extLst>
+          </p:cNvPr>
+          <p:cNvSpPr>
+            <a:spLocks noGrp="1"/>
+          </p:cNvSpPr>
+          <p:nvPr>
+            <p:ph type="title"/>
+          </p:nvPr>
+        </p:nvSpPr>
+        <p:spPr/>
+        <p:txBody>
+          <a:bodyPr/>
+          <a:lstStyle/>
+          <a:p>
+            <a:r>
+              <a:rPr lang="en-CH" b="1" u="sng" dirty="0"/>
+              <a:t>Continuous integration</a:t>
+            </a:r>
+          </a:p>
+        </p:txBody>
+      </p:sp>
+      <p:sp>
+        <p:nvSpPr>
+          <p:cNvPr id="10" name="Content Placeholder 2">
+            <a:extLst>
+              <a:ext uri="{FF2B5EF4-FFF2-40B4-BE49-F238E27FC236}">
+                <a16:creationId xmlns:a16="http://schemas.microsoft.com/office/drawing/2014/main" id="{4DD26E11-6A91-1B4E-8646-871310983A02}"/>
+              </a:ext>
+            </a:extLst>
+          </p:cNvPr>
+          <p:cNvSpPr txBox="1">
+            <a:spLocks/>
+          </p:cNvSpPr>
+          <p:nvPr/>
+        </p:nvSpPr>
+        <p:spPr>
+          <a:xfrm>
+            <a:off x="6096000" y="1608908"/>
+            <a:ext cx="5667375" cy="4147535"/>
+          </a:xfrm>
+          <a:prstGeom prst="rect">
+            <a:avLst/>
+          </a:prstGeom>
+        </p:spPr>
+        <p:txBody>
+          <a:bodyPr vert="horz" lIns="91440" tIns="45720" rIns="91440" bIns="45720" rtlCol="0">
+            <a:normAutofit/>
+          </a:bodyPr>
+          <a:lstStyle>
+            <a:lvl1pPr marL="228600" indent="-228600" algn="l" defTabSz="914400" rtl="0" eaLnBrk="1" latinLnBrk="0" hangingPunct="1">
+              <a:lnSpc>
+                <a:spcPct val="90000"/>
+              </a:lnSpc>
+              <a:spcBef>
+                <a:spcPts val="1000"/>
+              </a:spcBef>
+              <a:buFont typeface="Arial" panose="020B0604020202020204" pitchFamily="34" charset="0"/>
+              <a:buChar char="•"/>
+              <a:defRPr sz="2800" kern="1200">
+                <a:solidFill>
+                  <a:schemeClr val="tx1"/>
+                </a:solidFill>
+                <a:latin typeface="+mn-lt"/>
+                <a:ea typeface="+mn-ea"/>
+                <a:cs typeface="+mn-cs"/>
+              </a:defRPr>
+            </a:lvl1pPr>
+            <a:lvl2pPr marL="685800" indent="-228600" algn="l" defTabSz="914400" rtl="0" eaLnBrk="1" latinLnBrk="0" hangingPunct="1">
+              <a:lnSpc>
+                <a:spcPct val="90000"/>
+              </a:lnSpc>
+              <a:spcBef>
+                <a:spcPts val="500"/>
+              </a:spcBef>
+              <a:buFont typeface="Arial" panose="020B0604020202020204" pitchFamily="34" charset="0"/>
+              <a:buChar char="•"/>
+              <a:defRPr sz="2400" kern="1200">
+                <a:solidFill>
+                  <a:schemeClr val="tx1"/>
+                </a:solidFill>
+                <a:latin typeface="+mn-lt"/>
+                <a:ea typeface="+mn-ea"/>
+                <a:cs typeface="+mn-cs"/>
+              </a:defRPr>
+            </a:lvl2pPr>
+            <a:lvl3pPr marL="1143000" indent="-228600" algn="l" defTabSz="914400" rtl="0" eaLnBrk="1" latinLnBrk="0" hangingPunct="1">
+              <a:lnSpc>
+                <a:spcPct val="90000"/>
+              </a:lnSpc>
+              <a:spcBef>
+                <a:spcPts val="500"/>
+              </a:spcBef>
+              <a:buFont typeface="Arial" panose="020B0604020202020204" pitchFamily="34" charset="0"/>
+              <a:buChar char="•"/>
+              <a:defRPr sz="2000" kern="1200">
+                <a:solidFill>
+                  <a:schemeClr val="tx1"/>
+                </a:solidFill>
+                <a:latin typeface="+mn-lt"/>
+                <a:ea typeface="+mn-ea"/>
+                <a:cs typeface="+mn-cs"/>
+              </a:defRPr>
+            </a:lvl3pPr>
+            <a:lvl4pPr marL="1600200" indent="-228600" algn="l" defTabSz="914400" rtl="0" eaLnBrk="1" latinLnBrk="0" hangingPunct="1">
+              <a:lnSpc>
+                <a:spcPct val="90000"/>
+              </a:lnSpc>
+              <a:spcBef>
+                <a:spcPts val="500"/>
+              </a:spcBef>
+              <a:buFont typeface="Arial" panose="020B0604020202020204" pitchFamily="34" charset="0"/>
+              <a:buChar char="•"/>
+              <a:defRPr sz="1800" kern="1200">
+                <a:solidFill>
+                  <a:schemeClr val="tx1"/>
+                </a:solidFill>
+                <a:latin typeface="+mn-lt"/>
+                <a:ea typeface="+mn-ea"/>
+                <a:cs typeface="+mn-cs"/>
+              </a:defRPr>
+            </a:lvl4pPr>
+            <a:lvl5pPr marL="2057400" indent="-228600" algn="l" defTabSz="914400" rtl="0" eaLnBrk="1" latinLnBrk="0" hangingPunct="1">
+              <a:lnSpc>
+                <a:spcPct val="90000"/>
+              </a:lnSpc>
+              <a:spcBef>
+                <a:spcPts val="500"/>
+              </a:spcBef>
+              <a:buFont typeface="Arial" panose="020B0604020202020204" pitchFamily="34" charset="0"/>
+              <a:buChar char="•"/>
+              <a:defRPr sz="1800" kern="1200">
+                <a:solidFill>
+                  <a:schemeClr val="tx1"/>
+                </a:solidFill>
+                <a:latin typeface="+mn-lt"/>
+                <a:ea typeface="+mn-ea"/>
+                <a:cs typeface="+mn-cs"/>
+              </a:defRPr>
+            </a:lvl5pPr>
+            <a:lvl6pPr marL="2514600" indent="-228600" algn="l" defTabSz="914400" rtl="0" eaLnBrk="1" latinLnBrk="0" hangingPunct="1">
+              <a:lnSpc>
+                <a:spcPct val="90000"/>
+              </a:lnSpc>
+              <a:spcBef>
+                <a:spcPts val="500"/>
+              </a:spcBef>
+              <a:buFont typeface="Arial" panose="020B0604020202020204" pitchFamily="34" charset="0"/>
+              <a:buChar char="•"/>
+              <a:defRPr sz="1800" kern="1200">
+                <a:solidFill>
+                  <a:schemeClr val="tx1"/>
+                </a:solidFill>
+                <a:latin typeface="+mn-lt"/>
+                <a:ea typeface="+mn-ea"/>
+                <a:cs typeface="+mn-cs"/>
+              </a:defRPr>
+            </a:lvl6pPr>
+            <a:lvl7pPr marL="2971800" indent="-228600" algn="l" defTabSz="914400" rtl="0" eaLnBrk="1" latinLnBrk="0" hangingPunct="1">
+              <a:lnSpc>
+                <a:spcPct val="90000"/>
+              </a:lnSpc>
+              <a:spcBef>
+                <a:spcPts val="500"/>
+              </a:spcBef>
+              <a:buFont typeface="Arial" panose="020B0604020202020204" pitchFamily="34" charset="0"/>
+              <a:buChar char="•"/>
+              <a:defRPr sz="1800" kern="1200">
+                <a:solidFill>
+                  <a:schemeClr val="tx1"/>
+                </a:solidFill>
+                <a:latin typeface="+mn-lt"/>
+                <a:ea typeface="+mn-ea"/>
+                <a:cs typeface="+mn-cs"/>
+              </a:defRPr>
+            </a:lvl7pPr>
+            <a:lvl8pPr marL="3429000" indent="-228600" algn="l" defTabSz="914400" rtl="0" eaLnBrk="1" latinLnBrk="0" hangingPunct="1">
+              <a:lnSpc>
+                <a:spcPct val="90000"/>
+              </a:lnSpc>
+              <a:spcBef>
+                <a:spcPts val="500"/>
+              </a:spcBef>
+              <a:buFont typeface="Arial" panose="020B0604020202020204" pitchFamily="34" charset="0"/>
+              <a:buChar char="•"/>
+              <a:defRPr sz="1800" kern="1200">
+                <a:solidFill>
+                  <a:schemeClr val="tx1"/>
+                </a:solidFill>
+                <a:latin typeface="+mn-lt"/>
+                <a:ea typeface="+mn-ea"/>
+                <a:cs typeface="+mn-cs"/>
+              </a:defRPr>
+            </a:lvl8pPr>
+            <a:lvl9pPr marL="3886200" indent="-228600" algn="l" defTabSz="914400" rtl="0" eaLnBrk="1" latinLnBrk="0" hangingPunct="1">
+              <a:lnSpc>
+                <a:spcPct val="90000"/>
+              </a:lnSpc>
+              <a:spcBef>
+                <a:spcPts val="500"/>
+              </a:spcBef>
+              <a:buFont typeface="Arial" panose="020B0604020202020204" pitchFamily="34" charset="0"/>
+              <a:buChar char="•"/>
+              <a:defRPr sz="1800" kern="1200">
+                <a:solidFill>
+                  <a:schemeClr val="tx1"/>
+                </a:solidFill>
+                <a:latin typeface="+mn-lt"/>
+                <a:ea typeface="+mn-ea"/>
+                <a:cs typeface="+mn-cs"/>
+              </a:defRPr>
+            </a:lvl9pPr>
+          </a:lstStyle>
+          <a:p>
+            <a:r>
+              <a:rPr lang="en-CH" dirty="0"/>
+              <a:t>Docker image created. </a:t>
+            </a:r>
+          </a:p>
+          <a:p>
+            <a:r>
+              <a:rPr lang="en-CH" dirty="0"/>
+              <a:t>An ubuntu virtual machine with python 3.8 is set up with the required dependencies. </a:t>
+            </a:r>
+          </a:p>
+          <a:p>
+            <a:r>
+              <a:rPr lang="en-CH" dirty="0"/>
+              <a:t>The tests are run and if one failed, an email is sent to the project authors. </a:t>
+            </a:r>
+          </a:p>
+          <a:p>
+            <a:endParaRPr lang="en-CH" dirty="0"/>
+          </a:p>
+        </p:txBody>
+      </p:sp>
+      <p:pic>
+        <p:nvPicPr>
+          <p:cNvPr id="11" name="Picture 10" descr="A picture containing text&#10;&#10;Description automatically generated">
+            <a:extLst>
+              <a:ext uri="{FF2B5EF4-FFF2-40B4-BE49-F238E27FC236}">
+                <a16:creationId xmlns:a16="http://schemas.microsoft.com/office/drawing/2014/main" id="{D87FC9CE-2F33-CC4D-BDBA-04F4A93854AF}"/>
+              </a:ext>
+            </a:extLst>
+          </p:cNvPr>
+          <p:cNvPicPr>
+            <a:picLocks noChangeAspect="1"/>
+          </p:cNvPicPr>
+          <p:nvPr/>
+        </p:nvPicPr>
+        <p:blipFill>
+          <a:blip r:embed="rId2"/>
+          <a:stretch>
+            <a:fillRect/>
+          </a:stretch>
+        </p:blipFill>
+        <p:spPr>
+          <a:xfrm>
+            <a:off x="925286" y="1471749"/>
+            <a:ext cx="3486813" cy="4873429"/>
+          </a:xfrm>
+          <a:prstGeom prst="rect">
+            <a:avLst/>
+          </a:prstGeom>
+        </p:spPr>
+      </p:pic>
+    </p:spTree>
+    <p:extLst>
+      <p:ext uri="{BB962C8B-B14F-4D97-AF65-F5344CB8AC3E}">
+        <p14:creationId xmlns:p14="http://schemas.microsoft.com/office/powerpoint/2010/main" val="2223706195"/>
+      </p:ext>
+    </p:extLst>
+  </p:cSld>
+  <p:clrMapOvr>
+    <a:masterClrMapping/>
+  </p:clrMapOvr>
+</p:sld>
+</file>
+
+<file path=ppt/slides/slide9.xml><?xml version="1.0" encoding="utf-8"?>
+<p:sld xmlns:a="http://schemas.openxmlformats.org/drawingml/2006/main" xmlns:r="http://schemas.openxmlformats.org/officeDocument/2006/relationships" xmlns:p="http://schemas.openxmlformats.org/presentationml/2006/main">
+  <p:cSld>
+    <p:spTree>
+      <p:nvGrpSpPr>
+        <p:cNvPr id="1" name=""/>
+        <p:cNvGrpSpPr/>
+        <p:nvPr/>
+      </p:nvGrpSpPr>
+      <p:grpSpPr>
+        <a:xfrm>
+          <a:off x="0" y="0"/>
+          <a:ext cx="0" cy="0"/>
+          <a:chOff x="0" y="0"/>
+          <a:chExt cx="0" cy="0"/>
+        </a:xfrm>
+      </p:grpSpPr>
+      <p:sp>
+        <p:nvSpPr>
+          <p:cNvPr id="2" name="Title 1">
+            <a:extLst>
+              <a:ext uri="{FF2B5EF4-FFF2-40B4-BE49-F238E27FC236}">
+                <a16:creationId xmlns:a16="http://schemas.microsoft.com/office/drawing/2014/main" id="{CF2DE2F5-05C4-EC48-BB6A-68F63F7649E0}"/>
+              </a:ext>
+            </a:extLst>
+          </p:cNvPr>
+          <p:cNvSpPr>
+            <a:spLocks noGrp="1"/>
+          </p:cNvSpPr>
+          <p:nvPr>
+            <p:ph type="title"/>
+          </p:nvPr>
+        </p:nvSpPr>
+        <p:spPr/>
+        <p:txBody>
+          <a:bodyPr/>
+          <a:lstStyle/>
+          <a:p>
+            <a:r>
+              <a:rPr lang="en-CH" b="1" u="sng" dirty="0"/>
+              <a:t>Documentation</a:t>
+            </a:r>
+          </a:p>
+        </p:txBody>
+      </p:sp>
+      <p:sp>
+        <p:nvSpPr>
+          <p:cNvPr id="10" name="Content Placeholder 2">
+            <a:extLst>
+              <a:ext uri="{FF2B5EF4-FFF2-40B4-BE49-F238E27FC236}">
+                <a16:creationId xmlns:a16="http://schemas.microsoft.com/office/drawing/2014/main" id="{4DD26E11-6A91-1B4E-8646-871310983A02}"/>
+              </a:ext>
+            </a:extLst>
+          </p:cNvPr>
+          <p:cNvSpPr txBox="1">
+            <a:spLocks/>
+          </p:cNvSpPr>
+          <p:nvPr/>
+        </p:nvSpPr>
+        <p:spPr>
+          <a:xfrm>
+            <a:off x="5704114" y="1608908"/>
+            <a:ext cx="6059261" cy="4147535"/>
+          </a:xfrm>
+          <a:prstGeom prst="rect">
+            <a:avLst/>
+          </a:prstGeom>
+        </p:spPr>
+        <p:txBody>
+          <a:bodyPr vert="horz" lIns="91440" tIns="45720" rIns="91440" bIns="45720" rtlCol="0">
+            <a:normAutofit/>
+          </a:bodyPr>
+          <a:lstStyle>
+            <a:lvl1pPr marL="228600" indent="-228600" algn="l" defTabSz="914400" rtl="0" eaLnBrk="1" latinLnBrk="0" hangingPunct="1">
+              <a:lnSpc>
+                <a:spcPct val="90000"/>
+              </a:lnSpc>
+              <a:spcBef>
+                <a:spcPts val="1000"/>
+              </a:spcBef>
+              <a:buFont typeface="Arial" panose="020B0604020202020204" pitchFamily="34" charset="0"/>
+              <a:buChar char="•"/>
+              <a:defRPr sz="2800" kern="1200">
+                <a:solidFill>
+                  <a:schemeClr val="tx1"/>
+                </a:solidFill>
+                <a:latin typeface="+mn-lt"/>
+                <a:ea typeface="+mn-ea"/>
+                <a:cs typeface="+mn-cs"/>
+              </a:defRPr>
+            </a:lvl1pPr>
+            <a:lvl2pPr marL="685800" indent="-228600" algn="l" defTabSz="914400" rtl="0" eaLnBrk="1" latinLnBrk="0" hangingPunct="1">
+              <a:lnSpc>
+                <a:spcPct val="90000"/>
+              </a:lnSpc>
+              <a:spcBef>
+                <a:spcPts val="500"/>
+              </a:spcBef>
+              <a:buFont typeface="Arial" panose="020B0604020202020204" pitchFamily="34" charset="0"/>
+              <a:buChar char="•"/>
+              <a:defRPr sz="2400" kern="1200">
+                <a:solidFill>
+                  <a:schemeClr val="tx1"/>
+                </a:solidFill>
+                <a:latin typeface="+mn-lt"/>
+                <a:ea typeface="+mn-ea"/>
+                <a:cs typeface="+mn-cs"/>
+              </a:defRPr>
+            </a:lvl2pPr>
+            <a:lvl3pPr marL="1143000" indent="-228600" algn="l" defTabSz="914400" rtl="0" eaLnBrk="1" latinLnBrk="0" hangingPunct="1">
+              <a:lnSpc>
+                <a:spcPct val="90000"/>
+              </a:lnSpc>
+              <a:spcBef>
+                <a:spcPts val="500"/>
+              </a:spcBef>
+              <a:buFont typeface="Arial" panose="020B0604020202020204" pitchFamily="34" charset="0"/>
+              <a:buChar char="•"/>
+              <a:defRPr sz="2000" kern="1200">
+                <a:solidFill>
+                  <a:schemeClr val="tx1"/>
+                </a:solidFill>
+                <a:latin typeface="+mn-lt"/>
+                <a:ea typeface="+mn-ea"/>
+                <a:cs typeface="+mn-cs"/>
+              </a:defRPr>
+            </a:lvl3pPr>
+            <a:lvl4pPr marL="1600200" indent="-228600" algn="l" defTabSz="914400" rtl="0" eaLnBrk="1" latinLnBrk="0" hangingPunct="1">
+              <a:lnSpc>
+                <a:spcPct val="90000"/>
+              </a:lnSpc>
+              <a:spcBef>
+                <a:spcPts val="500"/>
+              </a:spcBef>
+              <a:buFont typeface="Arial" panose="020B0604020202020204" pitchFamily="34" charset="0"/>
+              <a:buChar char="•"/>
+              <a:defRPr sz="1800" kern="1200">
+                <a:solidFill>
+                  <a:schemeClr val="tx1"/>
+                </a:solidFill>
+                <a:latin typeface="+mn-lt"/>
+                <a:ea typeface="+mn-ea"/>
+                <a:cs typeface="+mn-cs"/>
+              </a:defRPr>
+            </a:lvl4pPr>
+            <a:lvl5pPr marL="2057400" indent="-228600" algn="l" defTabSz="914400" rtl="0" eaLnBrk="1" latinLnBrk="0" hangingPunct="1">
+              <a:lnSpc>
+                <a:spcPct val="90000"/>
+              </a:lnSpc>
+              <a:spcBef>
+                <a:spcPts val="500"/>
+              </a:spcBef>
+              <a:buFont typeface="Arial" panose="020B0604020202020204" pitchFamily="34" charset="0"/>
+              <a:buChar char="•"/>
+              <a:defRPr sz="1800" kern="1200">
+                <a:solidFill>
+                  <a:schemeClr val="tx1"/>
+                </a:solidFill>
+                <a:latin typeface="+mn-lt"/>
+                <a:ea typeface="+mn-ea"/>
+                <a:cs typeface="+mn-cs"/>
+              </a:defRPr>
+            </a:lvl5pPr>
+            <a:lvl6pPr marL="2514600" indent="-228600" algn="l" defTabSz="914400" rtl="0" eaLnBrk="1" latinLnBrk="0" hangingPunct="1">
+              <a:lnSpc>
+                <a:spcPct val="90000"/>
+              </a:lnSpc>
+              <a:spcBef>
+                <a:spcPts val="500"/>
+              </a:spcBef>
+              <a:buFont typeface="Arial" panose="020B0604020202020204" pitchFamily="34" charset="0"/>
+              <a:buChar char="•"/>
+              <a:defRPr sz="1800" kern="1200">
+                <a:solidFill>
+                  <a:schemeClr val="tx1"/>
+                </a:solidFill>
+                <a:latin typeface="+mn-lt"/>
+                <a:ea typeface="+mn-ea"/>
+                <a:cs typeface="+mn-cs"/>
+              </a:defRPr>
+            </a:lvl6pPr>
+            <a:lvl7pPr marL="2971800" indent="-228600" algn="l" defTabSz="914400" rtl="0" eaLnBrk="1" latinLnBrk="0" hangingPunct="1">
+              <a:lnSpc>
+                <a:spcPct val="90000"/>
+              </a:lnSpc>
+              <a:spcBef>
+                <a:spcPts val="500"/>
+              </a:spcBef>
+              <a:buFont typeface="Arial" panose="020B0604020202020204" pitchFamily="34" charset="0"/>
+              <a:buChar char="•"/>
+              <a:defRPr sz="1800" kern="1200">
+                <a:solidFill>
+                  <a:schemeClr val="tx1"/>
+                </a:solidFill>
+                <a:latin typeface="+mn-lt"/>
+                <a:ea typeface="+mn-ea"/>
+                <a:cs typeface="+mn-cs"/>
+              </a:defRPr>
+            </a:lvl7pPr>
+            <a:lvl8pPr marL="3429000" indent="-228600" algn="l" defTabSz="914400" rtl="0" eaLnBrk="1" latinLnBrk="0" hangingPunct="1">
+              <a:lnSpc>
+                <a:spcPct val="90000"/>
+              </a:lnSpc>
+              <a:spcBef>
+                <a:spcPts val="500"/>
+              </a:spcBef>
+              <a:buFont typeface="Arial" panose="020B0604020202020204" pitchFamily="34" charset="0"/>
+              <a:buChar char="•"/>
+              <a:defRPr sz="1800" kern="1200">
+                <a:solidFill>
+                  <a:schemeClr val="tx1"/>
+                </a:solidFill>
+                <a:latin typeface="+mn-lt"/>
+                <a:ea typeface="+mn-ea"/>
+                <a:cs typeface="+mn-cs"/>
+              </a:defRPr>
+            </a:lvl8pPr>
+            <a:lvl9pPr marL="3886200" indent="-228600" algn="l" defTabSz="914400" rtl="0" eaLnBrk="1" latinLnBrk="0" hangingPunct="1">
+              <a:lnSpc>
+                <a:spcPct val="90000"/>
+              </a:lnSpc>
+              <a:spcBef>
+                <a:spcPts val="500"/>
+              </a:spcBef>
+              <a:buFont typeface="Arial" panose="020B0604020202020204" pitchFamily="34" charset="0"/>
+              <a:buChar char="•"/>
+              <a:defRPr sz="1800" kern="1200">
+                <a:solidFill>
+                  <a:schemeClr val="tx1"/>
+                </a:solidFill>
+                <a:latin typeface="+mn-lt"/>
+                <a:ea typeface="+mn-ea"/>
+                <a:cs typeface="+mn-cs"/>
+              </a:defRPr>
+            </a:lvl9pPr>
+          </a:lstStyle>
+          <a:p>
+            <a:r>
+              <a:rPr lang="en-CH" dirty="0"/>
+              <a:t>Documentation created with Sphinx in HTML format. </a:t>
+            </a:r>
+          </a:p>
+          <a:p>
+            <a:r>
+              <a:rPr lang="en-CH" dirty="0"/>
+              <a:t>README.md file created in Github repository. </a:t>
+            </a:r>
+          </a:p>
+          <a:p>
+            <a:endParaRPr lang="en-CH" dirty="0"/>
+          </a:p>
+        </p:txBody>
+      </p:sp>
+      <p:pic>
+        <p:nvPicPr>
+          <p:cNvPr id="4" name="Picture 3" descr="A picture containing table&#10;&#10;Description automatically generated">
+            <a:extLst>
+              <a:ext uri="{FF2B5EF4-FFF2-40B4-BE49-F238E27FC236}">
+                <a16:creationId xmlns:a16="http://schemas.microsoft.com/office/drawing/2014/main" id="{A53C1D47-699D-C44A-B58C-23F1F050449F}"/>
+              </a:ext>
+            </a:extLst>
+          </p:cNvPr>
+          <p:cNvPicPr>
+            <a:picLocks noChangeAspect="1"/>
+          </p:cNvPicPr>
+          <p:nvPr/>
+        </p:nvPicPr>
+        <p:blipFill>
+          <a:blip r:embed="rId2"/>
+          <a:stretch>
+            <a:fillRect/>
+          </a:stretch>
+        </p:blipFill>
+        <p:spPr>
+          <a:xfrm>
+            <a:off x="838200" y="1509394"/>
+            <a:ext cx="3971746" cy="4983481"/>
+          </a:xfrm>
+          <a:prstGeom prst="rect">
+            <a:avLst/>
+          </a:prstGeom>
+        </p:spPr>
+      </p:pic>
+    </p:spTree>
+    <p:extLst>
+      <p:ext uri="{BB962C8B-B14F-4D97-AF65-F5344CB8AC3E}">
+        <p14:creationId xmlns:p14="http://schemas.microsoft.com/office/powerpoint/2010/main" val="1985776978"/>
       </p:ext>
     </p:extLst>
   </p:cSld>

</xml_diff>

<commit_message>
Readme and presentation improvements
</commit_message>
<xml_diff>
--- a/presentation/presentation.pptx
+++ b/presentation/presentation.pptx
@@ -207,7 +207,7 @@
           <a:p>
             <a:fld id="{36541BED-5B3E-461C-B2CD-4B278DFC48C9}" type="datetimeFigureOut">
               <a:rPr lang="fr-CH" smtClean="0"/>
-              <a:t>07.10.2021</a:t>
+              <a:t>10.10.21</a:t>
             </a:fld>
             <a:endParaRPr lang="fr-CH"/>
           </a:p>
@@ -366,7 +366,7 @@
           <a:p>
             <a:fld id="{275AD02D-9BAB-491B-AA83-14F5FB592CC5}" type="slidenum">
               <a:rPr lang="fr-CH" smtClean="0"/>
-              <a:t>‹N°›</a:t>
+              <a:t>‹#›</a:t>
             </a:fld>
             <a:endParaRPr lang="fr-CH"/>
           </a:p>
@@ -708,7 +708,7 @@
           <a:p>
             <a:fld id="{85321271-6040-2E4F-925C-CA786A662EDA}" type="datetimeFigureOut">
               <a:rPr lang="en-CH" smtClean="0"/>
-              <a:t>10/07/2021</a:t>
+              <a:t>10.10.21</a:t>
             </a:fld>
             <a:endParaRPr lang="en-CH"/>
           </a:p>
@@ -762,7 +762,7 @@
           <a:p>
             <a:fld id="{9E413768-8AAB-9B45-A954-C20ACE912A2A}" type="slidenum">
               <a:rPr lang="en-CH" smtClean="0"/>
-              <a:t>‹N°›</a:t>
+              <a:t>‹#›</a:t>
             </a:fld>
             <a:endParaRPr lang="en-CH"/>
           </a:p>
@@ -908,7 +908,7 @@
           <a:p>
             <a:fld id="{85321271-6040-2E4F-925C-CA786A662EDA}" type="datetimeFigureOut">
               <a:rPr lang="en-CH" smtClean="0"/>
-              <a:t>10/07/2021</a:t>
+              <a:t>10.10.21</a:t>
             </a:fld>
             <a:endParaRPr lang="en-CH"/>
           </a:p>
@@ -962,7 +962,7 @@
           <a:p>
             <a:fld id="{9E413768-8AAB-9B45-A954-C20ACE912A2A}" type="slidenum">
               <a:rPr lang="en-CH" smtClean="0"/>
-              <a:t>‹N°›</a:t>
+              <a:t>‹#›</a:t>
             </a:fld>
             <a:endParaRPr lang="en-CH"/>
           </a:p>
@@ -1118,7 +1118,7 @@
           <a:p>
             <a:fld id="{85321271-6040-2E4F-925C-CA786A662EDA}" type="datetimeFigureOut">
               <a:rPr lang="en-CH" smtClean="0"/>
-              <a:t>10/07/2021</a:t>
+              <a:t>10.10.21</a:t>
             </a:fld>
             <a:endParaRPr lang="en-CH"/>
           </a:p>
@@ -1172,7 +1172,7 @@
           <a:p>
             <a:fld id="{9E413768-8AAB-9B45-A954-C20ACE912A2A}" type="slidenum">
               <a:rPr lang="en-CH" smtClean="0"/>
-              <a:t>‹N°›</a:t>
+              <a:t>‹#›</a:t>
             </a:fld>
             <a:endParaRPr lang="en-CH"/>
           </a:p>
@@ -1318,7 +1318,7 @@
           <a:p>
             <a:fld id="{85321271-6040-2E4F-925C-CA786A662EDA}" type="datetimeFigureOut">
               <a:rPr lang="en-CH" smtClean="0"/>
-              <a:t>10/07/2021</a:t>
+              <a:t>10.10.21</a:t>
             </a:fld>
             <a:endParaRPr lang="en-CH"/>
           </a:p>
@@ -1372,7 +1372,7 @@
           <a:p>
             <a:fld id="{9E413768-8AAB-9B45-A954-C20ACE912A2A}" type="slidenum">
               <a:rPr lang="en-CH" smtClean="0"/>
-              <a:t>‹N°›</a:t>
+              <a:t>‹#›</a:t>
             </a:fld>
             <a:endParaRPr lang="en-CH"/>
           </a:p>
@@ -1594,7 +1594,7 @@
           <a:p>
             <a:fld id="{85321271-6040-2E4F-925C-CA786A662EDA}" type="datetimeFigureOut">
               <a:rPr lang="en-CH" smtClean="0"/>
-              <a:t>10/07/2021</a:t>
+              <a:t>10.10.21</a:t>
             </a:fld>
             <a:endParaRPr lang="en-CH"/>
           </a:p>
@@ -1648,7 +1648,7 @@
           <a:p>
             <a:fld id="{9E413768-8AAB-9B45-A954-C20ACE912A2A}" type="slidenum">
               <a:rPr lang="en-CH" smtClean="0"/>
-              <a:t>‹N°›</a:t>
+              <a:t>‹#›</a:t>
             </a:fld>
             <a:endParaRPr lang="en-CH"/>
           </a:p>
@@ -1862,7 +1862,7 @@
           <a:p>
             <a:fld id="{85321271-6040-2E4F-925C-CA786A662EDA}" type="datetimeFigureOut">
               <a:rPr lang="en-CH" smtClean="0"/>
-              <a:t>10/07/2021</a:t>
+              <a:t>10.10.21</a:t>
             </a:fld>
             <a:endParaRPr lang="en-CH"/>
           </a:p>
@@ -1916,7 +1916,7 @@
           <a:p>
             <a:fld id="{9E413768-8AAB-9B45-A954-C20ACE912A2A}" type="slidenum">
               <a:rPr lang="en-CH" smtClean="0"/>
-              <a:t>‹N°›</a:t>
+              <a:t>‹#›</a:t>
             </a:fld>
             <a:endParaRPr lang="en-CH"/>
           </a:p>
@@ -2277,7 +2277,7 @@
           <a:p>
             <a:fld id="{85321271-6040-2E4F-925C-CA786A662EDA}" type="datetimeFigureOut">
               <a:rPr lang="en-CH" smtClean="0"/>
-              <a:t>10/07/2021</a:t>
+              <a:t>10.10.21</a:t>
             </a:fld>
             <a:endParaRPr lang="en-CH"/>
           </a:p>
@@ -2331,7 +2331,7 @@
           <a:p>
             <a:fld id="{9E413768-8AAB-9B45-A954-C20ACE912A2A}" type="slidenum">
               <a:rPr lang="en-CH" smtClean="0"/>
-              <a:t>‹N°›</a:t>
+              <a:t>‹#›</a:t>
             </a:fld>
             <a:endParaRPr lang="en-CH"/>
           </a:p>
@@ -2419,7 +2419,7 @@
           <a:p>
             <a:fld id="{85321271-6040-2E4F-925C-CA786A662EDA}" type="datetimeFigureOut">
               <a:rPr lang="en-CH" smtClean="0"/>
-              <a:t>10/07/2021</a:t>
+              <a:t>10.10.21</a:t>
             </a:fld>
             <a:endParaRPr lang="en-CH"/>
           </a:p>
@@ -2473,7 +2473,7 @@
           <a:p>
             <a:fld id="{9E413768-8AAB-9B45-A954-C20ACE912A2A}" type="slidenum">
               <a:rPr lang="en-CH" smtClean="0"/>
-              <a:t>‹N°›</a:t>
+              <a:t>‹#›</a:t>
             </a:fld>
             <a:endParaRPr lang="en-CH"/>
           </a:p>
@@ -2532,7 +2532,7 @@
           <a:p>
             <a:fld id="{85321271-6040-2E4F-925C-CA786A662EDA}" type="datetimeFigureOut">
               <a:rPr lang="en-CH" smtClean="0"/>
-              <a:t>10/07/2021</a:t>
+              <a:t>10.10.21</a:t>
             </a:fld>
             <a:endParaRPr lang="en-CH"/>
           </a:p>
@@ -2586,7 +2586,7 @@
           <a:p>
             <a:fld id="{9E413768-8AAB-9B45-A954-C20ACE912A2A}" type="slidenum">
               <a:rPr lang="en-CH" smtClean="0"/>
-              <a:t>‹N°›</a:t>
+              <a:t>‹#›</a:t>
             </a:fld>
             <a:endParaRPr lang="en-CH"/>
           </a:p>
@@ -2845,7 +2845,7 @@
           <a:p>
             <a:fld id="{85321271-6040-2E4F-925C-CA786A662EDA}" type="datetimeFigureOut">
               <a:rPr lang="en-CH" smtClean="0"/>
-              <a:t>10/07/2021</a:t>
+              <a:t>10.10.21</a:t>
             </a:fld>
             <a:endParaRPr lang="en-CH"/>
           </a:p>
@@ -2899,7 +2899,7 @@
           <a:p>
             <a:fld id="{9E413768-8AAB-9B45-A954-C20ACE912A2A}" type="slidenum">
               <a:rPr lang="en-CH" smtClean="0"/>
-              <a:t>‹N°›</a:t>
+              <a:t>‹#›</a:t>
             </a:fld>
             <a:endParaRPr lang="en-CH"/>
           </a:p>
@@ -3134,7 +3134,7 @@
           <a:p>
             <a:fld id="{85321271-6040-2E4F-925C-CA786A662EDA}" type="datetimeFigureOut">
               <a:rPr lang="en-CH" smtClean="0"/>
-              <a:t>10/07/2021</a:t>
+              <a:t>10.10.21</a:t>
             </a:fld>
             <a:endParaRPr lang="en-CH"/>
           </a:p>
@@ -3188,7 +3188,7 @@
           <a:p>
             <a:fld id="{9E413768-8AAB-9B45-A954-C20ACE912A2A}" type="slidenum">
               <a:rPr lang="en-CH" smtClean="0"/>
-              <a:t>‹N°›</a:t>
+              <a:t>‹#›</a:t>
             </a:fld>
             <a:endParaRPr lang="en-CH"/>
           </a:p>
@@ -3377,7 +3377,7 @@
           <a:p>
             <a:fld id="{85321271-6040-2E4F-925C-CA786A662EDA}" type="datetimeFigureOut">
               <a:rPr lang="en-CH" smtClean="0"/>
-              <a:t>10/07/2021</a:t>
+              <a:t>10.10.21</a:t>
             </a:fld>
             <a:endParaRPr lang="en-CH"/>
           </a:p>
@@ -3467,7 +3467,7 @@
           <a:p>
             <a:fld id="{9E413768-8AAB-9B45-A954-C20ACE912A2A}" type="slidenum">
               <a:rPr lang="en-CH" smtClean="0"/>
-              <a:t>‹N°›</a:t>
+              <a:t>‹#›</a:t>
             </a:fld>
             <a:endParaRPr lang="en-CH"/>
           </a:p>
@@ -3956,7 +3956,7 @@
         <p:spPr>
           <a:xfrm>
             <a:off x="6303266" y="2068494"/>
-            <a:ext cx="5540933" cy="923330"/>
+            <a:ext cx="5540933" cy="3539430"/>
           </a:xfrm>
           <a:prstGeom prst="rect">
             <a:avLst/>
@@ -3969,370 +3969,166 @@
           </a:bodyPr>
           <a:lstStyle/>
           <a:p>
-            <a:pPr marL="285750" indent="-285750">
+            <a:pPr marL="457200" indent="-457200">
               <a:buFont typeface="Arial" panose="020B0604020202020204" pitchFamily="34" charset="0"/>
               <a:buChar char="•"/>
             </a:pPr>
             <a:r>
-              <a:rPr lang="fr-CH" dirty="0" err="1"/>
-              <a:t>Using</a:t>
-            </a:r>
-            <a:r>
-              <a:rPr lang="fr-CH" dirty="0"/>
-              <a:t> : </a:t>
-            </a:r>
-            <a:r>
-              <a:rPr lang="fr-CH" b="0" i="0" dirty="0" err="1">
-                <a:solidFill>
-                  <a:srgbClr val="4D4D4C"/>
-                </a:solidFill>
-                <a:effectLst/>
-                <a:latin typeface="SFMono-Regular"/>
-              </a:rPr>
+              <a:rPr lang="fr-CH" sz="2800" dirty="0"/>
+              <a:t>The package (nid) </a:t>
+            </a:r>
+            <a:r>
+              <a:rPr lang="fr-CH" sz="2800" dirty="0" err="1"/>
+              <a:t>can</a:t>
+            </a:r>
+            <a:r>
+              <a:rPr lang="fr-CH" sz="2800" dirty="0"/>
+              <a:t> </a:t>
+            </a:r>
+            <a:r>
+              <a:rPr lang="fr-CH" sz="2800" dirty="0" err="1"/>
+              <a:t>be</a:t>
+            </a:r>
+            <a:r>
+              <a:rPr lang="fr-CH" sz="2800" dirty="0"/>
+              <a:t> </a:t>
+            </a:r>
+            <a:r>
+              <a:rPr lang="fr-CH" sz="2800" dirty="0" err="1"/>
+              <a:t>installed</a:t>
+            </a:r>
+            <a:r>
+              <a:rPr lang="fr-CH" sz="2800" dirty="0"/>
+              <a:t> </a:t>
+            </a:r>
+            <a:r>
+              <a:rPr lang="fr-CH" sz="2800" dirty="0" err="1"/>
+              <a:t>simply</a:t>
+            </a:r>
+            <a:r>
+              <a:rPr lang="fr-CH" sz="2800" dirty="0"/>
+              <a:t> </a:t>
+            </a:r>
+            <a:r>
+              <a:rPr lang="fr-CH" sz="2800" dirty="0" err="1"/>
+              <a:t>with</a:t>
+            </a:r>
+            <a:r>
+              <a:rPr lang="fr-CH" sz="2800" dirty="0"/>
+              <a:t> </a:t>
+            </a:r>
+            <a:r>
+              <a:rPr lang="fr-CH" sz="2800" dirty="0" err="1"/>
               <a:t>pip</a:t>
             </a:r>
             <a:r>
-              <a:rPr lang="fr-CH" b="0" i="0" dirty="0">
-                <a:solidFill>
-                  <a:srgbClr val="4D4D4C"/>
-                </a:solidFill>
-                <a:effectLst/>
-                <a:latin typeface="SFMono-Regular"/>
-              </a:rPr>
-              <a:t> </a:t>
-            </a:r>
-            <a:r>
-              <a:rPr lang="fr-CH" b="0" i="0" dirty="0" err="1">
-                <a:solidFill>
-                  <a:srgbClr val="4D4D4C"/>
-                </a:solidFill>
-                <a:effectLst/>
-                <a:latin typeface="SFMono-Regular"/>
-              </a:rPr>
-              <a:t>install</a:t>
-            </a:r>
-            <a:r>
-              <a:rPr lang="fr-CH" b="0" i="0" dirty="0">
-                <a:solidFill>
-                  <a:srgbClr val="4D4D4C"/>
-                </a:solidFill>
-                <a:effectLst/>
-                <a:latin typeface="SFMono-Regular"/>
-              </a:rPr>
-              <a:t> </a:t>
-            </a:r>
-            <a:r>
-              <a:rPr lang="fr-CH" b="0" i="0" dirty="0">
-                <a:solidFill>
-                  <a:srgbClr val="485900"/>
-                </a:solidFill>
-                <a:effectLst/>
-                <a:latin typeface="SFMono-Regular"/>
-                <a:hlinkClick r:id="rId3"/>
-              </a:rPr>
-              <a:t>-e</a:t>
-            </a:r>
-            <a:r>
-              <a:rPr lang="fr-CH" b="0" i="0" dirty="0">
-                <a:solidFill>
-                  <a:srgbClr val="4D4D4C"/>
-                </a:solidFill>
-                <a:effectLst/>
-                <a:latin typeface="SFMono-Regular"/>
-              </a:rPr>
-              <a:t> . </a:t>
-            </a:r>
-          </a:p>
-          <a:p>
-            <a:r>
-              <a:rPr lang="fr-CH" dirty="0">
-                <a:solidFill>
-                  <a:srgbClr val="4D4D4C"/>
-                </a:solidFill>
-                <a:latin typeface="SFMono-Regular"/>
-              </a:rPr>
-              <a:t>It </a:t>
-            </a:r>
-            <a:r>
-              <a:rPr lang="fr-CH" dirty="0" err="1">
-                <a:solidFill>
-                  <a:srgbClr val="4D4D4C"/>
-                </a:solidFill>
-                <a:latin typeface="SFMono-Regular"/>
-              </a:rPr>
-              <a:t>installs</a:t>
-            </a:r>
-            <a:r>
-              <a:rPr lang="fr-CH" dirty="0">
-                <a:solidFill>
-                  <a:srgbClr val="4D4D4C"/>
-                </a:solidFill>
-                <a:latin typeface="SFMono-Regular"/>
-              </a:rPr>
-              <a:t> the local package (nid) in the </a:t>
-            </a:r>
-            <a:r>
-              <a:rPr lang="fr-CH" dirty="0" err="1">
-                <a:solidFill>
-                  <a:srgbClr val="4D4D4C"/>
-                </a:solidFill>
-                <a:latin typeface="SFMono-Regular"/>
-              </a:rPr>
+              <a:rPr lang="fr-CH" sz="2800" dirty="0"/>
+              <a:t> in the </a:t>
+            </a:r>
+            <a:r>
+              <a:rPr lang="fr-CH" sz="2800" dirty="0" err="1"/>
               <a:t>current</a:t>
             </a:r>
             <a:r>
-              <a:rPr lang="fr-CH" dirty="0">
-                <a:solidFill>
-                  <a:srgbClr val="4D4D4C"/>
-                </a:solidFill>
-                <a:latin typeface="SFMono-Regular"/>
-              </a:rPr>
-              <a:t> directory</a:t>
-            </a:r>
-          </a:p>
-          <a:p>
-            <a:pPr marL="285750" indent="-285750">
+              <a:rPr lang="fr-CH" sz="2800" dirty="0"/>
+              <a:t> directory.</a:t>
+            </a:r>
+          </a:p>
+          <a:p>
+            <a:pPr marL="457200" indent="-457200">
               <a:buFont typeface="Arial" panose="020B0604020202020204" pitchFamily="34" charset="0"/>
               <a:buChar char="•"/>
             </a:pPr>
-            <a:endParaRPr lang="fr-CH" dirty="0"/>
-          </a:p>
-        </p:txBody>
-      </p:sp>
-      <p:sp>
-        <p:nvSpPr>
-          <p:cNvPr id="7" name="ZoneTexte 6">
-            <a:extLst>
-              <a:ext uri="{FF2B5EF4-FFF2-40B4-BE49-F238E27FC236}">
-                <a16:creationId xmlns:a16="http://schemas.microsoft.com/office/drawing/2014/main" id="{9419703D-EEAE-4FED-8280-30B206B5BA6B}"/>
-              </a:ext>
-            </a:extLst>
-          </p:cNvPr>
-          <p:cNvSpPr txBox="1"/>
-          <p:nvPr/>
-        </p:nvSpPr>
-        <p:spPr>
-          <a:xfrm>
-            <a:off x="6303266" y="2925089"/>
-            <a:ext cx="5540933" cy="1200329"/>
-          </a:xfrm>
-          <a:prstGeom prst="rect">
-            <a:avLst/>
-          </a:prstGeom>
-          <a:noFill/>
-        </p:spPr>
-        <p:txBody>
-          <a:bodyPr wrap="square" rtlCol="0">
-            <a:spAutoFit/>
-          </a:bodyPr>
-          <a:lstStyle/>
-          <a:p>
-            <a:pPr marL="285750" indent="-285750">
+            <a:r>
+              <a:rPr lang="fr-CH" sz="2800" dirty="0"/>
+              <a:t>The </a:t>
+            </a:r>
+            <a:r>
+              <a:rPr lang="fr-CH" sz="2800" dirty="0" err="1"/>
+              <a:t>requirements</a:t>
+            </a:r>
+            <a:r>
+              <a:rPr lang="fr-CH" sz="2800" dirty="0"/>
+              <a:t> for the package are </a:t>
+            </a:r>
+            <a:r>
+              <a:rPr lang="fr-CH" sz="2800" dirty="0" err="1"/>
+              <a:t>directly</a:t>
+            </a:r>
+            <a:r>
+              <a:rPr lang="fr-CH" sz="2800" dirty="0"/>
+              <a:t> in the setup file.</a:t>
+            </a:r>
+            <a:endParaRPr lang="fr-CH" sz="2800" dirty="0">
+              <a:solidFill>
+                <a:srgbClr val="4D4D4C"/>
+              </a:solidFill>
+            </a:endParaRPr>
+          </a:p>
+          <a:p>
+            <a:pPr marL="457200" indent="-457200">
               <a:buFont typeface="Arial" panose="020B0604020202020204" pitchFamily="34" charset="0"/>
               <a:buChar char="•"/>
             </a:pPr>
             <a:r>
-              <a:rPr lang="fr-CH" dirty="0"/>
+              <a:rPr lang="fr-CH" sz="2800" dirty="0"/>
               <a:t>The </a:t>
             </a:r>
             <a:r>
-              <a:rPr lang="fr-CH" dirty="0" err="1"/>
-              <a:t>requirements</a:t>
-            </a:r>
-            <a:r>
-              <a:rPr lang="fr-CH" dirty="0"/>
-              <a:t> for the package are in the setup.py file </a:t>
-            </a:r>
-            <a:r>
-              <a:rPr lang="fr-CH" dirty="0" err="1"/>
-              <a:t>under</a:t>
-            </a:r>
-            <a:r>
-              <a:rPr lang="fr-CH" dirty="0"/>
-              <a:t> «</a:t>
-            </a:r>
-            <a:r>
-              <a:rPr lang="fr-CH" dirty="0" err="1"/>
-              <a:t>install_requires</a:t>
-            </a:r>
-            <a:r>
-              <a:rPr lang="fr-CH" dirty="0"/>
-              <a:t>»</a:t>
-            </a:r>
-            <a:endParaRPr lang="fr-CH" b="0" i="0" dirty="0">
-              <a:solidFill>
-                <a:srgbClr val="4D4D4C"/>
-              </a:solidFill>
-              <a:effectLst/>
-              <a:latin typeface="SFMono-Regular"/>
-            </a:endParaRPr>
-          </a:p>
-          <a:p>
-            <a:pPr marL="285750" indent="-285750">
-              <a:buFont typeface="Arial" panose="020B0604020202020204" pitchFamily="34" charset="0"/>
-              <a:buChar char="•"/>
-            </a:pPr>
-            <a:r>
-              <a:rPr lang="fr-CH" dirty="0"/>
-              <a:t>This file </a:t>
-            </a:r>
-            <a:r>
-              <a:rPr lang="fr-CH" dirty="0" err="1"/>
-              <a:t>also</a:t>
-            </a:r>
-            <a:r>
-              <a:rPr lang="fr-CH" dirty="0"/>
+              <a:rPr lang="fr-CH" sz="2800" dirty="0" err="1"/>
+              <a:t>project</a:t>
+            </a:r>
+            <a:r>
+              <a:rPr lang="fr-CH" sz="2800" dirty="0"/>
               <a:t> </a:t>
             </a:r>
             <a:r>
-              <a:rPr lang="fr-CH" dirty="0" err="1"/>
-              <a:t>contains</a:t>
-            </a:r>
-            <a:r>
-              <a:rPr lang="fr-CH" dirty="0"/>
+              <a:rPr lang="fr-CH" sz="2800" dirty="0" err="1"/>
+              <a:t>can</a:t>
+            </a:r>
+            <a:r>
+              <a:rPr lang="fr-CH" sz="2800" dirty="0"/>
               <a:t> </a:t>
             </a:r>
             <a:r>
-              <a:rPr lang="fr-CH" dirty="0" err="1"/>
-              <a:t>severals</a:t>
-            </a:r>
-            <a:r>
-              <a:rPr lang="fr-CH" dirty="0"/>
-              <a:t> informations about the package, the </a:t>
-            </a:r>
-            <a:r>
-              <a:rPr lang="fr-CH" dirty="0" err="1"/>
-              <a:t>authors</a:t>
-            </a:r>
-            <a:r>
-              <a:rPr lang="fr-CH" dirty="0"/>
-              <a:t> and the </a:t>
-            </a:r>
-            <a:r>
-              <a:rPr lang="fr-CH" dirty="0" err="1"/>
-              <a:t>license</a:t>
-            </a:r>
-            <a:r>
-              <a:rPr lang="fr-CH" dirty="0"/>
+              <a:rPr lang="fr-CH" sz="2800" dirty="0" err="1"/>
+              <a:t>be</a:t>
+            </a:r>
+            <a:r>
+              <a:rPr lang="fr-CH" sz="2800" dirty="0"/>
               <a:t> </a:t>
             </a:r>
-          </a:p>
-        </p:txBody>
-      </p:sp>
-      <p:sp>
-        <p:nvSpPr>
-          <p:cNvPr id="8" name="ZoneTexte 7">
-            <a:extLst>
-              <a:ext uri="{FF2B5EF4-FFF2-40B4-BE49-F238E27FC236}">
-                <a16:creationId xmlns:a16="http://schemas.microsoft.com/office/drawing/2014/main" id="{79EC5A0C-CBA7-420F-8DB5-138C6AD7EB29}"/>
-              </a:ext>
-            </a:extLst>
-          </p:cNvPr>
-          <p:cNvSpPr txBox="1"/>
-          <p:nvPr/>
-        </p:nvSpPr>
-        <p:spPr>
-          <a:xfrm>
-            <a:off x="6303265" y="4320989"/>
-            <a:ext cx="5540933" cy="1200329"/>
-          </a:xfrm>
-          <a:prstGeom prst="rect">
-            <a:avLst/>
-          </a:prstGeom>
-          <a:noFill/>
-        </p:spPr>
-        <p:txBody>
-          <a:bodyPr wrap="square" rtlCol="0">
-            <a:spAutoFit/>
-          </a:bodyPr>
-          <a:lstStyle/>
-          <a:p>
-            <a:pPr marL="285750" indent="-285750">
-              <a:buFont typeface="Arial" panose="020B0604020202020204" pitchFamily="34" charset="0"/>
-              <a:buChar char="•"/>
-            </a:pPr>
-            <a:r>
-              <a:rPr lang="fr-CH" dirty="0"/>
-              <a:t>The </a:t>
-            </a:r>
-            <a:r>
-              <a:rPr lang="fr-CH" dirty="0" err="1"/>
-              <a:t>project</a:t>
-            </a:r>
-            <a:r>
-              <a:rPr lang="fr-CH" dirty="0"/>
-              <a:t> can </a:t>
-            </a:r>
-            <a:r>
-              <a:rPr lang="fr-CH" dirty="0" err="1"/>
-              <a:t>be</a:t>
-            </a:r>
-            <a:r>
-              <a:rPr lang="fr-CH" dirty="0"/>
+            <a:r>
+              <a:rPr lang="fr-CH" sz="2800" dirty="0" err="1"/>
+              <a:t>fully</a:t>
+            </a:r>
+            <a:r>
+              <a:rPr lang="fr-CH" sz="2800" dirty="0"/>
               <a:t> </a:t>
             </a:r>
             <a:r>
-              <a:rPr lang="fr-CH" dirty="0" err="1"/>
+              <a:rPr lang="fr-CH" sz="2800" dirty="0" err="1"/>
               <a:t>runned</a:t>
             </a:r>
             <a:r>
-              <a:rPr lang="fr-CH" dirty="0"/>
-              <a:t> </a:t>
-            </a:r>
-            <a:r>
-              <a:rPr lang="fr-CH" dirty="0" err="1"/>
-              <a:t>using</a:t>
-            </a:r>
-            <a:r>
-              <a:rPr lang="fr-CH" dirty="0"/>
-              <a:t> : python -m nid, </a:t>
-            </a:r>
-            <a:r>
-              <a:rPr lang="fr-CH" dirty="0" err="1"/>
+              <a:rPr lang="fr-CH" sz="2800" dirty="0"/>
+              <a:t> in command line </a:t>
+            </a:r>
+            <a:r>
+              <a:rPr lang="fr-CH" sz="2800" dirty="0" err="1"/>
               <a:t>with</a:t>
             </a:r>
             <a:r>
-              <a:rPr lang="fr-CH" dirty="0"/>
-              <a:t> the good </a:t>
-            </a:r>
-            <a:r>
-              <a:rPr lang="fr-CH" dirty="0" err="1"/>
-              <a:t>parameters</a:t>
-            </a:r>
-            <a:endParaRPr lang="fr-CH" dirty="0"/>
-          </a:p>
-          <a:p>
-            <a:pPr marL="285750" indent="-285750">
-              <a:buFont typeface="Arial" panose="020B0604020202020204" pitchFamily="34" charset="0"/>
-              <a:buChar char="•"/>
-            </a:pPr>
-            <a:r>
-              <a:rPr lang="fr-CH" dirty="0"/>
-              <a:t>Python –m &lt;module-</a:t>
-            </a:r>
-            <a:r>
-              <a:rPr lang="fr-CH" dirty="0" err="1"/>
-              <a:t>name</a:t>
-            </a:r>
-            <a:r>
-              <a:rPr lang="fr-CH" dirty="0"/>
-              <a:t>&gt; </a:t>
-            </a:r>
-            <a:r>
-              <a:rPr lang="fr-CH" dirty="0" err="1"/>
-              <a:t>simply</a:t>
-            </a:r>
-            <a:r>
-              <a:rPr lang="fr-CH" dirty="0"/>
-              <a:t> </a:t>
-            </a:r>
-            <a:r>
-              <a:rPr lang="fr-CH" dirty="0" err="1"/>
-              <a:t>execute</a:t>
-            </a:r>
-            <a:r>
-              <a:rPr lang="fr-CH" dirty="0"/>
-              <a:t> the __main__ of the package</a:t>
+              <a:rPr lang="fr-CH" sz="2800" dirty="0"/>
+              <a:t> the </a:t>
+            </a:r>
+            <a:r>
+              <a:rPr lang="fr-CH" sz="2800" dirty="0" err="1"/>
+              <a:t>desired</a:t>
+            </a:r>
+            <a:r>
+              <a:rPr lang="fr-CH" sz="2800" dirty="0"/>
+              <a:t> arguments. </a:t>
             </a:r>
           </a:p>
         </p:txBody>
@@ -4352,21 +4148,80 @@
           <p:nvPr/>
         </p:nvPicPr>
         <p:blipFill>
-          <a:blip r:embed="rId4"/>
+          <a:blip r:embed="rId3"/>
           <a:stretch>
             <a:fillRect/>
           </a:stretch>
         </p:blipFill>
         <p:spPr>
           <a:xfrm>
-            <a:off x="152689" y="2175002"/>
-            <a:ext cx="5943311" cy="2601184"/>
+            <a:off x="462884" y="2217912"/>
+            <a:ext cx="5633116" cy="2465422"/>
           </a:xfrm>
           <a:prstGeom prst="rect">
             <a:avLst/>
           </a:prstGeom>
         </p:spPr>
       </p:pic>
+      <p:sp>
+        <p:nvSpPr>
+          <p:cNvPr id="3" name="Rectangle 2">
+            <a:extLst>
+              <a:ext uri="{FF2B5EF4-FFF2-40B4-BE49-F238E27FC236}">
+                <a16:creationId xmlns:a16="http://schemas.microsoft.com/office/drawing/2014/main" id="{E0A8C1B0-0821-B24C-8D46-58FAE2F9D5C4}"/>
+              </a:ext>
+            </a:extLst>
+          </p:cNvPr>
+          <p:cNvSpPr/>
+          <p:nvPr/>
+        </p:nvSpPr>
+        <p:spPr>
+          <a:xfrm>
+            <a:off x="321004" y="5084704"/>
+            <a:ext cx="5916876" cy="523220"/>
+          </a:xfrm>
+          <a:prstGeom prst="rect">
+            <a:avLst/>
+          </a:prstGeom>
+        </p:spPr>
+        <p:txBody>
+          <a:bodyPr wrap="none">
+            <a:spAutoFit/>
+          </a:bodyPr>
+          <a:lstStyle/>
+          <a:p>
+            <a:r>
+              <a:rPr lang="fr-CH" sz="2800" dirty="0"/>
+              <a:t>« </a:t>
+            </a:r>
+            <a:r>
+              <a:rPr lang="fr-CH" sz="2800" i="1" dirty="0"/>
+              <a:t>python -m nid -</a:t>
+            </a:r>
+            <a:r>
+              <a:rPr lang="fr-CH" sz="2800" i="1" dirty="0" err="1"/>
+              <a:t>path</a:t>
+            </a:r>
+            <a:r>
+              <a:rPr lang="fr-CH" sz="2800" i="1" dirty="0"/>
+              <a:t> </a:t>
+            </a:r>
+            <a:r>
+              <a:rPr lang="fr-CH" sz="2800" i="1" dirty="0" err="1"/>
+              <a:t>data_file_path</a:t>
+            </a:r>
+            <a:r>
+              <a:rPr lang="fr-CH" sz="2800" i="1" dirty="0"/>
+              <a:t> </a:t>
+            </a:r>
+            <a:r>
+              <a:rPr lang="fr-CH" sz="2800" dirty="0"/>
+              <a:t> »</a:t>
+            </a:r>
+            <a:endParaRPr lang="en-CH" sz="2800" dirty="0"/>
+          </a:p>
+        </p:txBody>
+      </p:sp>
     </p:spTree>
     <p:extLst>
       <p:ext uri="{BB962C8B-B14F-4D97-AF65-F5344CB8AC3E}">
@@ -4677,7 +4532,7 @@
             </a:r>
             <a:r>
               <a:rPr lang="fr-CH" b="1" dirty="0" err="1"/>
-              <a:t>is</a:t>
+              <a:t>can</a:t>
             </a:r>
             <a:r>
               <a:rPr lang="fr-CH" b="1" dirty="0"/>
@@ -4689,11 +4544,19 @@
             </a:r>
             <a:r>
               <a:rPr lang="fr-CH" b="1" dirty="0"/>
+              <a:t> not </a:t>
+            </a:r>
+            <a:r>
+              <a:rPr lang="fr-CH" b="1" dirty="0" err="1"/>
+              <a:t>be</a:t>
+            </a:r>
+            <a:r>
+              <a:rPr lang="fr-CH" b="1" dirty="0"/>
               <a:t> </a:t>
             </a:r>
             <a:r>
               <a:rPr lang="fr-CH" b="1" dirty="0" err="1"/>
-              <a:t>verified</a:t>
+              <a:t>rejected</a:t>
             </a:r>
             <a:r>
               <a:rPr lang="fr-CH" b="1" dirty="0"/>
@@ -5620,7 +5483,7 @@
         <p:spPr>
           <a:xfrm>
             <a:off x="4002650" y="2705053"/>
-            <a:ext cx="3169085" cy="307777"/>
+            <a:ext cx="5222270" cy="307777"/>
           </a:xfrm>
           <a:prstGeom prst="rect">
             <a:avLst/>
@@ -5635,7 +5498,7 @@
           <a:p>
             <a:r>
               <a:rPr lang="en-CH" sz="1400" dirty="0"/>
-              <a:t>Models in pickle format</a:t>
+              <a:t>Models in pickle format (to avoid retraining fully the model)</a:t>
             </a:r>
           </a:p>
         </p:txBody>
@@ -6767,8 +6630,8 @@
         </p:nvSpPr>
         <p:spPr>
           <a:xfrm>
-            <a:off x="6096000" y="1710493"/>
-            <a:ext cx="6059261" cy="4147535"/>
+            <a:off x="6684021" y="1710493"/>
+            <a:ext cx="5471240" cy="4147535"/>
           </a:xfrm>
           <a:prstGeom prst="rect">
             <a:avLst/>

</xml_diff>

<commit_message>
Presentation & license improvements
</commit_message>
<xml_diff>
--- a/presentation/presentation.pptx
+++ b/presentation/presentation.pptx
@@ -5,7 +5,7 @@
     <p:sldMasterId id="2147483648" r:id="rId1"/>
   </p:sldMasterIdLst>
   <p:notesMasterIdLst>
-    <p:notesMasterId r:id="rId13"/>
+    <p:notesMasterId r:id="rId14"/>
   </p:notesMasterIdLst>
   <p:sldIdLst>
     <p:sldId id="256" r:id="rId2"/>
@@ -18,7 +18,8 @@
     <p:sldId id="266" r:id="rId9"/>
     <p:sldId id="267" r:id="rId10"/>
     <p:sldId id="268" r:id="rId11"/>
-    <p:sldId id="269" r:id="rId12"/>
+    <p:sldId id="270" r:id="rId12"/>
+    <p:sldId id="269" r:id="rId13"/>
   </p:sldIdLst>
   <p:sldSz cx="12192000" cy="6858000"/>
   <p:notesSz cx="6858000" cy="9144000"/>
@@ -207,7 +208,7 @@
           <a:p>
             <a:fld id="{36541BED-5B3E-461C-B2CD-4B278DFC48C9}" type="datetimeFigureOut">
               <a:rPr lang="fr-CH" smtClean="0"/>
-              <a:t>10.10.21</a:t>
+              <a:t>11.10.21</a:t>
             </a:fld>
             <a:endParaRPr lang="fr-CH"/>
           </a:p>
@@ -559,6 +560,90 @@
 </p:notes>
 </file>
 
+<file path=ppt/notesSlides/notesSlide2.xml><?xml version="1.0" encoding="utf-8"?>
+<p:notes xmlns:a="http://schemas.openxmlformats.org/drawingml/2006/main" xmlns:r="http://schemas.openxmlformats.org/officeDocument/2006/relationships" xmlns:p="http://schemas.openxmlformats.org/presentationml/2006/main">
+  <p:cSld>
+    <p:spTree>
+      <p:nvGrpSpPr>
+        <p:cNvPr id="1" name=""/>
+        <p:cNvGrpSpPr/>
+        <p:nvPr/>
+      </p:nvGrpSpPr>
+      <p:grpSpPr>
+        <a:xfrm>
+          <a:off x="0" y="0"/>
+          <a:ext cx="0" cy="0"/>
+          <a:chOff x="0" y="0"/>
+          <a:chExt cx="0" cy="0"/>
+        </a:xfrm>
+      </p:grpSpPr>
+      <p:sp>
+        <p:nvSpPr>
+          <p:cNvPr id="2" name="Espace réservé de l'image des diapositives 1"/>
+          <p:cNvSpPr>
+            <a:spLocks noGrp="1" noRot="1" noChangeAspect="1"/>
+          </p:cNvSpPr>
+          <p:nvPr>
+            <p:ph type="sldImg"/>
+          </p:nvPr>
+        </p:nvSpPr>
+        <p:spPr/>
+      </p:sp>
+      <p:sp>
+        <p:nvSpPr>
+          <p:cNvPr id="3" name="Espace réservé des notes 2"/>
+          <p:cNvSpPr>
+            <a:spLocks noGrp="1"/>
+          </p:cNvSpPr>
+          <p:nvPr>
+            <p:ph type="body" idx="1"/>
+          </p:nvPr>
+        </p:nvSpPr>
+        <p:spPr/>
+        <p:txBody>
+          <a:bodyPr/>
+          <a:lstStyle/>
+          <a:p>
+            <a:endParaRPr lang="fr-CH" dirty="0"/>
+          </a:p>
+        </p:txBody>
+      </p:sp>
+      <p:sp>
+        <p:nvSpPr>
+          <p:cNvPr id="4" name="Espace réservé du numéro de diapositive 3"/>
+          <p:cNvSpPr>
+            <a:spLocks noGrp="1"/>
+          </p:cNvSpPr>
+          <p:nvPr>
+            <p:ph type="sldNum" sz="quarter" idx="5"/>
+          </p:nvPr>
+        </p:nvSpPr>
+        <p:spPr/>
+        <p:txBody>
+          <a:bodyPr/>
+          <a:lstStyle/>
+          <a:p>
+            <a:fld id="{275AD02D-9BAB-491B-AA83-14F5FB592CC5}" type="slidenum">
+              <a:rPr lang="fr-CH" smtClean="0"/>
+              <a:t>11</a:t>
+            </a:fld>
+            <a:endParaRPr lang="fr-CH"/>
+          </a:p>
+        </p:txBody>
+      </p:sp>
+    </p:spTree>
+    <p:extLst>
+      <p:ext uri="{BB962C8B-B14F-4D97-AF65-F5344CB8AC3E}">
+        <p14:creationId xmlns:p14="http://schemas.microsoft.com/office/powerpoint/2010/main" val="2673433258"/>
+      </p:ext>
+    </p:extLst>
+  </p:cSld>
+  <p:clrMapOvr>
+    <a:masterClrMapping/>
+  </p:clrMapOvr>
+</p:notes>
+</file>
+
 <file path=ppt/slideLayouts/slideLayout1.xml><?xml version="1.0" encoding="utf-8"?>
 <p:sldLayout xmlns:a="http://schemas.openxmlformats.org/drawingml/2006/main" xmlns:r="http://schemas.openxmlformats.org/officeDocument/2006/relationships" xmlns:p="http://schemas.openxmlformats.org/presentationml/2006/main" type="title" preserve="1">
   <p:cSld name="Title Slide">
@@ -708,7 +793,7 @@
           <a:p>
             <a:fld id="{85321271-6040-2E4F-925C-CA786A662EDA}" type="datetimeFigureOut">
               <a:rPr lang="en-CH" smtClean="0"/>
-              <a:t>10.10.21</a:t>
+              <a:t>11.10.21</a:t>
             </a:fld>
             <a:endParaRPr lang="en-CH"/>
           </a:p>
@@ -908,7 +993,7 @@
           <a:p>
             <a:fld id="{85321271-6040-2E4F-925C-CA786A662EDA}" type="datetimeFigureOut">
               <a:rPr lang="en-CH" smtClean="0"/>
-              <a:t>10.10.21</a:t>
+              <a:t>11.10.21</a:t>
             </a:fld>
             <a:endParaRPr lang="en-CH"/>
           </a:p>
@@ -1118,7 +1203,7 @@
           <a:p>
             <a:fld id="{85321271-6040-2E4F-925C-CA786A662EDA}" type="datetimeFigureOut">
               <a:rPr lang="en-CH" smtClean="0"/>
-              <a:t>10.10.21</a:t>
+              <a:t>11.10.21</a:t>
             </a:fld>
             <a:endParaRPr lang="en-CH"/>
           </a:p>
@@ -1318,7 +1403,7 @@
           <a:p>
             <a:fld id="{85321271-6040-2E4F-925C-CA786A662EDA}" type="datetimeFigureOut">
               <a:rPr lang="en-CH" smtClean="0"/>
-              <a:t>10.10.21</a:t>
+              <a:t>11.10.21</a:t>
             </a:fld>
             <a:endParaRPr lang="en-CH"/>
           </a:p>
@@ -1594,7 +1679,7 @@
           <a:p>
             <a:fld id="{85321271-6040-2E4F-925C-CA786A662EDA}" type="datetimeFigureOut">
               <a:rPr lang="en-CH" smtClean="0"/>
-              <a:t>10.10.21</a:t>
+              <a:t>11.10.21</a:t>
             </a:fld>
             <a:endParaRPr lang="en-CH"/>
           </a:p>
@@ -1862,7 +1947,7 @@
           <a:p>
             <a:fld id="{85321271-6040-2E4F-925C-CA786A662EDA}" type="datetimeFigureOut">
               <a:rPr lang="en-CH" smtClean="0"/>
-              <a:t>10.10.21</a:t>
+              <a:t>11.10.21</a:t>
             </a:fld>
             <a:endParaRPr lang="en-CH"/>
           </a:p>
@@ -2277,7 +2362,7 @@
           <a:p>
             <a:fld id="{85321271-6040-2E4F-925C-CA786A662EDA}" type="datetimeFigureOut">
               <a:rPr lang="en-CH" smtClean="0"/>
-              <a:t>10.10.21</a:t>
+              <a:t>11.10.21</a:t>
             </a:fld>
             <a:endParaRPr lang="en-CH"/>
           </a:p>
@@ -2419,7 +2504,7 @@
           <a:p>
             <a:fld id="{85321271-6040-2E4F-925C-CA786A662EDA}" type="datetimeFigureOut">
               <a:rPr lang="en-CH" smtClean="0"/>
-              <a:t>10.10.21</a:t>
+              <a:t>11.10.21</a:t>
             </a:fld>
             <a:endParaRPr lang="en-CH"/>
           </a:p>
@@ -2532,7 +2617,7 @@
           <a:p>
             <a:fld id="{85321271-6040-2E4F-925C-CA786A662EDA}" type="datetimeFigureOut">
               <a:rPr lang="en-CH" smtClean="0"/>
-              <a:t>10.10.21</a:t>
+              <a:t>11.10.21</a:t>
             </a:fld>
             <a:endParaRPr lang="en-CH"/>
           </a:p>
@@ -2845,7 +2930,7 @@
           <a:p>
             <a:fld id="{85321271-6040-2E4F-925C-CA786A662EDA}" type="datetimeFigureOut">
               <a:rPr lang="en-CH" smtClean="0"/>
-              <a:t>10.10.21</a:t>
+              <a:t>11.10.21</a:t>
             </a:fld>
             <a:endParaRPr lang="en-CH"/>
           </a:p>
@@ -3134,7 +3219,7 @@
           <a:p>
             <a:fld id="{85321271-6040-2E4F-925C-CA786A662EDA}" type="datetimeFigureOut">
               <a:rPr lang="en-CH" smtClean="0"/>
-              <a:t>10.10.21</a:t>
+              <a:t>11.10.21</a:t>
             </a:fld>
             <a:endParaRPr lang="en-CH"/>
           </a:p>
@@ -3377,7 +3462,7 @@
           <a:p>
             <a:fld id="{85321271-6040-2E4F-925C-CA786A662EDA}" type="datetimeFigureOut">
               <a:rPr lang="en-CH" smtClean="0"/>
-              <a:t>10.10.21</a:t>
+              <a:t>11.10.21</a:t>
             </a:fld>
             <a:endParaRPr lang="en-CH"/>
           </a:p>
@@ -4236,6 +4321,206 @@
 </file>
 
 <file path=ppt/slides/slide11.xml><?xml version="1.0" encoding="utf-8"?>
+<p:sld xmlns:a="http://schemas.openxmlformats.org/drawingml/2006/main" xmlns:r="http://schemas.openxmlformats.org/officeDocument/2006/relationships" xmlns:p="http://schemas.openxmlformats.org/presentationml/2006/main">
+  <p:cSld>
+    <p:spTree>
+      <p:nvGrpSpPr>
+        <p:cNvPr id="1" name=""/>
+        <p:cNvGrpSpPr/>
+        <p:nvPr/>
+      </p:nvGrpSpPr>
+      <p:grpSpPr>
+        <a:xfrm>
+          <a:off x="0" y="0"/>
+          <a:ext cx="0" cy="0"/>
+          <a:chOff x="0" y="0"/>
+          <a:chExt cx="0" cy="0"/>
+        </a:xfrm>
+      </p:grpSpPr>
+      <p:sp>
+        <p:nvSpPr>
+          <p:cNvPr id="2" name="Title 1">
+            <a:extLst>
+              <a:ext uri="{FF2B5EF4-FFF2-40B4-BE49-F238E27FC236}">
+                <a16:creationId xmlns:a16="http://schemas.microsoft.com/office/drawing/2014/main" id="{CF2DE2F5-05C4-EC48-BB6A-68F63F7649E0}"/>
+              </a:ext>
+            </a:extLst>
+          </p:cNvPr>
+          <p:cNvSpPr>
+            <a:spLocks noGrp="1"/>
+          </p:cNvSpPr>
+          <p:nvPr>
+            <p:ph type="title"/>
+          </p:nvPr>
+        </p:nvSpPr>
+        <p:spPr/>
+        <p:txBody>
+          <a:bodyPr/>
+          <a:lstStyle/>
+          <a:p>
+            <a:r>
+              <a:rPr lang="en-CH" b="1" u="sng" dirty="0"/>
+              <a:t>Licensing</a:t>
+            </a:r>
+          </a:p>
+        </p:txBody>
+      </p:sp>
+      <p:sp>
+        <p:nvSpPr>
+          <p:cNvPr id="6" name="ZoneTexte 5">
+            <a:extLst>
+              <a:ext uri="{FF2B5EF4-FFF2-40B4-BE49-F238E27FC236}">
+                <a16:creationId xmlns:a16="http://schemas.microsoft.com/office/drawing/2014/main" id="{D0C0ED02-99CF-4ABD-BA82-5A3CD4722998}"/>
+              </a:ext>
+            </a:extLst>
+          </p:cNvPr>
+          <p:cNvSpPr txBox="1"/>
+          <p:nvPr/>
+        </p:nvSpPr>
+        <p:spPr>
+          <a:xfrm>
+            <a:off x="995320" y="2068494"/>
+            <a:ext cx="10848879" cy="2246769"/>
+          </a:xfrm>
+          <a:prstGeom prst="rect">
+            <a:avLst/>
+          </a:prstGeom>
+          <a:noFill/>
+        </p:spPr>
+        <p:txBody>
+          <a:bodyPr wrap="square" rtlCol="0">
+            <a:spAutoFit/>
+          </a:bodyPr>
+          <a:lstStyle/>
+          <a:p>
+            <a:pPr marL="457200" indent="-457200">
+              <a:buFont typeface="Arial" panose="020B0604020202020204" pitchFamily="34" charset="0"/>
+              <a:buChar char="•"/>
+            </a:pPr>
+            <a:r>
+              <a:rPr lang="fr-CH" sz="2800" dirty="0"/>
+              <a:t>The data are </a:t>
+            </a:r>
+            <a:r>
+              <a:rPr lang="fr-CH" sz="2800" dirty="0" err="1"/>
+              <a:t>licensed</a:t>
+            </a:r>
+            <a:r>
+              <a:rPr lang="fr-CH" sz="2800" dirty="0"/>
+              <a:t> </a:t>
+            </a:r>
+            <a:r>
+              <a:rPr lang="fr-CH" sz="2800" dirty="0" err="1"/>
+              <a:t>under</a:t>
+            </a:r>
+            <a:r>
+              <a:rPr lang="fr-CH" sz="2800" dirty="0"/>
+              <a:t>: </a:t>
+            </a:r>
+            <a:r>
+              <a:rPr lang="fr-CH" sz="2800" b="1" dirty="0"/>
+              <a:t>Open Data Commons Public Domain </a:t>
+            </a:r>
+            <a:r>
+              <a:rPr lang="fr-CH" sz="2800" b="1" dirty="0" err="1"/>
+              <a:t>Dedication</a:t>
+            </a:r>
+            <a:r>
+              <a:rPr lang="fr-CH" sz="2800" b="1" dirty="0"/>
+              <a:t> and License (PDDL).</a:t>
+            </a:r>
+          </a:p>
+          <a:p>
+            <a:pPr marL="457200" indent="-457200">
+              <a:buFont typeface="Arial" panose="020B0604020202020204" pitchFamily="34" charset="0"/>
+              <a:buChar char="•"/>
+            </a:pPr>
+            <a:r>
+              <a:rPr lang="fr-CH" sz="2800" dirty="0"/>
+              <a:t>The code </a:t>
+            </a:r>
+            <a:r>
+              <a:rPr lang="fr-CH" sz="2800" dirty="0" err="1"/>
+              <a:t>is</a:t>
+            </a:r>
+            <a:r>
+              <a:rPr lang="fr-CH" sz="2800" dirty="0"/>
+              <a:t> </a:t>
+            </a:r>
+            <a:r>
+              <a:rPr lang="fr-CH" sz="2800" dirty="0" err="1"/>
+              <a:t>licensed</a:t>
+            </a:r>
+            <a:r>
+              <a:rPr lang="fr-CH" sz="2800" dirty="0"/>
+              <a:t> </a:t>
+            </a:r>
+            <a:r>
+              <a:rPr lang="fr-CH" sz="2800" dirty="0" err="1"/>
+              <a:t>under</a:t>
+            </a:r>
+            <a:r>
+              <a:rPr lang="fr-CH" sz="2800" dirty="0"/>
+              <a:t>: </a:t>
+            </a:r>
+            <a:r>
+              <a:rPr lang="fr-CH" sz="2800" b="1" dirty="0"/>
+              <a:t>MIT License. </a:t>
+            </a:r>
+          </a:p>
+          <a:p>
+            <a:pPr marL="457200" indent="-457200">
+              <a:buFont typeface="Arial" panose="020B0604020202020204" pitchFamily="34" charset="0"/>
+              <a:buChar char="•"/>
+            </a:pPr>
+            <a:r>
+              <a:rPr lang="fr-CH" sz="2800" dirty="0"/>
+              <a:t>All </a:t>
+            </a:r>
+            <a:r>
+              <a:rPr lang="fr-CH" sz="2800" dirty="0" err="1"/>
+              <a:t>details</a:t>
+            </a:r>
+            <a:r>
+              <a:rPr lang="fr-CH" sz="2800" dirty="0"/>
+              <a:t> in </a:t>
+            </a:r>
+            <a:r>
+              <a:rPr lang="fr-CH" sz="2800" i="1" dirty="0"/>
+              <a:t>« </a:t>
+            </a:r>
+            <a:r>
+              <a:rPr lang="fr-CH" sz="2800" i="1" dirty="0" err="1"/>
+              <a:t>LICENSE.txt</a:t>
+            </a:r>
+            <a:r>
+              <a:rPr lang="fr-CH" sz="2800" i="1" dirty="0"/>
+              <a:t> » </a:t>
+            </a:r>
+            <a:r>
+              <a:rPr lang="fr-CH" sz="2800" dirty="0"/>
+              <a:t>.</a:t>
+            </a:r>
+          </a:p>
+          <a:p>
+            <a:endParaRPr lang="fr-CH" sz="2800" dirty="0"/>
+          </a:p>
+        </p:txBody>
+      </p:sp>
+    </p:spTree>
+    <p:extLst>
+      <p:ext uri="{BB962C8B-B14F-4D97-AF65-F5344CB8AC3E}">
+        <p14:creationId xmlns:p14="http://schemas.microsoft.com/office/powerpoint/2010/main" val="3595622745"/>
+      </p:ext>
+    </p:extLst>
+  </p:cSld>
+  <p:clrMapOvr>
+    <a:masterClrMapping/>
+  </p:clrMapOvr>
+</p:sld>
+</file>
+
+<file path=ppt/slides/slide12.xml><?xml version="1.0" encoding="utf-8"?>
 <p:sld xmlns:a="http://schemas.openxmlformats.org/drawingml/2006/main" xmlns:r="http://schemas.openxmlformats.org/officeDocument/2006/relationships" xmlns:p="http://schemas.openxmlformats.org/presentationml/2006/main">
   <p:cSld>
     <p:spTree>

</xml_diff>